<commit_message>
atualizado todos os documentos ate o dia 11-06-2022
</commit_message>
<xml_diff>
--- a/documentacao/apresentacao-11-05-22.pptx
+++ b/documentacao/apresentacao-11-05-22.pptx
@@ -51,24 +51,26 @@
     <p:sldId id="283" r:id="rId45"/>
     <p:sldId id="305" r:id="rId46"/>
     <p:sldId id="306" r:id="rId47"/>
-    <p:sldId id="307" r:id="rId48"/>
-    <p:sldId id="308" r:id="rId49"/>
-    <p:sldId id="311" r:id="rId50"/>
-    <p:sldId id="312" r:id="rId51"/>
-    <p:sldId id="309" r:id="rId52"/>
-    <p:sldId id="310" r:id="rId53"/>
-    <p:sldId id="313" r:id="rId54"/>
-    <p:sldId id="314" r:id="rId55"/>
-    <p:sldId id="315" r:id="rId56"/>
-    <p:sldId id="316" r:id="rId57"/>
-    <p:sldId id="284" r:id="rId58"/>
-    <p:sldId id="285" r:id="rId59"/>
-    <p:sldId id="317" r:id="rId60"/>
-    <p:sldId id="318" r:id="rId61"/>
-    <p:sldId id="319" r:id="rId62"/>
-    <p:sldId id="320" r:id="rId63"/>
-    <p:sldId id="321" r:id="rId64"/>
-    <p:sldId id="287" r:id="rId65"/>
+    <p:sldId id="322" r:id="rId48"/>
+    <p:sldId id="323" r:id="rId49"/>
+    <p:sldId id="307" r:id="rId50"/>
+    <p:sldId id="308" r:id="rId51"/>
+    <p:sldId id="311" r:id="rId52"/>
+    <p:sldId id="312" r:id="rId53"/>
+    <p:sldId id="309" r:id="rId54"/>
+    <p:sldId id="310" r:id="rId55"/>
+    <p:sldId id="313" r:id="rId56"/>
+    <p:sldId id="314" r:id="rId57"/>
+    <p:sldId id="315" r:id="rId58"/>
+    <p:sldId id="316" r:id="rId59"/>
+    <p:sldId id="284" r:id="rId60"/>
+    <p:sldId id="285" r:id="rId61"/>
+    <p:sldId id="317" r:id="rId62"/>
+    <p:sldId id="318" r:id="rId63"/>
+    <p:sldId id="319" r:id="rId64"/>
+    <p:sldId id="320" r:id="rId65"/>
+    <p:sldId id="321" r:id="rId66"/>
+    <p:sldId id="287" r:id="rId67"/>
   </p:sldIdLst>
   <p:sldSz cx="12192000" cy="6858000"/>
   <p:notesSz cx="6858000" cy="9144000"/>
@@ -322,7 +324,7 @@
           <a:p>
             <a:fld id="{03FC92B0-CCF9-467D-ADCD-CBFB2B15EDE7}" type="datetimeFigureOut">
               <a:rPr lang="en-US" smtClean="0"/>
-              <a:t>6/10/2022</a:t>
+              <a:t>6/11/2022</a:t>
             </a:fld>
             <a:endParaRPr lang="en-US"/>
           </a:p>
@@ -376,7 +378,7 @@
           <a:p>
             <a:fld id="{C6B197C3-0CE0-4932-A76E-3B1DB623381B}" type="slidenum">
               <a:rPr lang="en-US" smtClean="0"/>
-              <a:t>‹#›</a:t>
+              <a:t>‹nº›</a:t>
             </a:fld>
             <a:endParaRPr lang="en-US"/>
           </a:p>
@@ -520,7 +522,7 @@
           <a:p>
             <a:fld id="{03FC92B0-CCF9-467D-ADCD-CBFB2B15EDE7}" type="datetimeFigureOut">
               <a:rPr lang="en-US" smtClean="0"/>
-              <a:t>6/10/2022</a:t>
+              <a:t>6/11/2022</a:t>
             </a:fld>
             <a:endParaRPr lang="en-US"/>
           </a:p>
@@ -574,7 +576,7 @@
           <a:p>
             <a:fld id="{C6B197C3-0CE0-4932-A76E-3B1DB623381B}" type="slidenum">
               <a:rPr lang="en-US" smtClean="0"/>
-              <a:t>‹#›</a:t>
+              <a:t>‹nº›</a:t>
             </a:fld>
             <a:endParaRPr lang="en-US"/>
           </a:p>
@@ -728,7 +730,7 @@
           <a:p>
             <a:fld id="{03FC92B0-CCF9-467D-ADCD-CBFB2B15EDE7}" type="datetimeFigureOut">
               <a:rPr lang="en-US" smtClean="0"/>
-              <a:t>6/10/2022</a:t>
+              <a:t>6/11/2022</a:t>
             </a:fld>
             <a:endParaRPr lang="en-US"/>
           </a:p>
@@ -782,7 +784,7 @@
           <a:p>
             <a:fld id="{C6B197C3-0CE0-4932-A76E-3B1DB623381B}" type="slidenum">
               <a:rPr lang="en-US" smtClean="0"/>
-              <a:t>‹#›</a:t>
+              <a:t>‹nº›</a:t>
             </a:fld>
             <a:endParaRPr lang="en-US"/>
           </a:p>
@@ -926,7 +928,7 @@
           <a:p>
             <a:fld id="{03FC92B0-CCF9-467D-ADCD-CBFB2B15EDE7}" type="datetimeFigureOut">
               <a:rPr lang="en-US" smtClean="0"/>
-              <a:t>6/10/2022</a:t>
+              <a:t>6/11/2022</a:t>
             </a:fld>
             <a:endParaRPr lang="en-US"/>
           </a:p>
@@ -980,7 +982,7 @@
           <a:p>
             <a:fld id="{C6B197C3-0CE0-4932-A76E-3B1DB623381B}" type="slidenum">
               <a:rPr lang="en-US" smtClean="0"/>
-              <a:t>‹#›</a:t>
+              <a:t>‹nº›</a:t>
             </a:fld>
             <a:endParaRPr lang="en-US"/>
           </a:p>
@@ -1201,7 +1203,7 @@
           <a:p>
             <a:fld id="{03FC92B0-CCF9-467D-ADCD-CBFB2B15EDE7}" type="datetimeFigureOut">
               <a:rPr lang="en-US" smtClean="0"/>
-              <a:t>6/10/2022</a:t>
+              <a:t>6/11/2022</a:t>
             </a:fld>
             <a:endParaRPr lang="en-US"/>
           </a:p>
@@ -1255,7 +1257,7 @@
           <a:p>
             <a:fld id="{C6B197C3-0CE0-4932-A76E-3B1DB623381B}" type="slidenum">
               <a:rPr lang="en-US" smtClean="0"/>
-              <a:t>‹#›</a:t>
+              <a:t>‹nº›</a:t>
             </a:fld>
             <a:endParaRPr lang="en-US"/>
           </a:p>
@@ -1466,7 +1468,7 @@
           <a:p>
             <a:fld id="{03FC92B0-CCF9-467D-ADCD-CBFB2B15EDE7}" type="datetimeFigureOut">
               <a:rPr lang="en-US" smtClean="0"/>
-              <a:t>6/10/2022</a:t>
+              <a:t>6/11/2022</a:t>
             </a:fld>
             <a:endParaRPr lang="en-US"/>
           </a:p>
@@ -1520,7 +1522,7 @@
           <a:p>
             <a:fld id="{C6B197C3-0CE0-4932-A76E-3B1DB623381B}" type="slidenum">
               <a:rPr lang="en-US" smtClean="0"/>
-              <a:t>‹#›</a:t>
+              <a:t>‹nº›</a:t>
             </a:fld>
             <a:endParaRPr lang="en-US"/>
           </a:p>
@@ -1878,7 +1880,7 @@
           <a:p>
             <a:fld id="{03FC92B0-CCF9-467D-ADCD-CBFB2B15EDE7}" type="datetimeFigureOut">
               <a:rPr lang="en-US" smtClean="0"/>
-              <a:t>6/10/2022</a:t>
+              <a:t>6/11/2022</a:t>
             </a:fld>
             <a:endParaRPr lang="en-US"/>
           </a:p>
@@ -1932,7 +1934,7 @@
           <a:p>
             <a:fld id="{C6B197C3-0CE0-4932-A76E-3B1DB623381B}" type="slidenum">
               <a:rPr lang="en-US" smtClean="0"/>
-              <a:t>‹#›</a:t>
+              <a:t>‹nº›</a:t>
             </a:fld>
             <a:endParaRPr lang="en-US"/>
           </a:p>
@@ -2019,7 +2021,7 @@
           <a:p>
             <a:fld id="{03FC92B0-CCF9-467D-ADCD-CBFB2B15EDE7}" type="datetimeFigureOut">
               <a:rPr lang="en-US" smtClean="0"/>
-              <a:t>6/10/2022</a:t>
+              <a:t>6/11/2022</a:t>
             </a:fld>
             <a:endParaRPr lang="en-US"/>
           </a:p>
@@ -2073,7 +2075,7 @@
           <a:p>
             <a:fld id="{C6B197C3-0CE0-4932-A76E-3B1DB623381B}" type="slidenum">
               <a:rPr lang="en-US" smtClean="0"/>
-              <a:t>‹#›</a:t>
+              <a:t>‹nº›</a:t>
             </a:fld>
             <a:endParaRPr lang="en-US"/>
           </a:p>
@@ -2132,7 +2134,7 @@
           <a:p>
             <a:fld id="{03FC92B0-CCF9-467D-ADCD-CBFB2B15EDE7}" type="datetimeFigureOut">
               <a:rPr lang="en-US" smtClean="0"/>
-              <a:t>6/10/2022</a:t>
+              <a:t>6/11/2022</a:t>
             </a:fld>
             <a:endParaRPr lang="en-US"/>
           </a:p>
@@ -2186,7 +2188,7 @@
           <a:p>
             <a:fld id="{C6B197C3-0CE0-4932-A76E-3B1DB623381B}" type="slidenum">
               <a:rPr lang="en-US" smtClean="0"/>
-              <a:t>‹#›</a:t>
+              <a:t>‹nº›</a:t>
             </a:fld>
             <a:endParaRPr lang="en-US"/>
           </a:p>
@@ -2443,7 +2445,7 @@
           <a:p>
             <a:fld id="{03FC92B0-CCF9-467D-ADCD-CBFB2B15EDE7}" type="datetimeFigureOut">
               <a:rPr lang="en-US" smtClean="0"/>
-              <a:t>6/10/2022</a:t>
+              <a:t>6/11/2022</a:t>
             </a:fld>
             <a:endParaRPr lang="en-US"/>
           </a:p>
@@ -2497,7 +2499,7 @@
           <a:p>
             <a:fld id="{C6B197C3-0CE0-4932-A76E-3B1DB623381B}" type="slidenum">
               <a:rPr lang="en-US" smtClean="0"/>
-              <a:t>‹#›</a:t>
+              <a:t>‹nº›</a:t>
             </a:fld>
             <a:endParaRPr lang="en-US"/>
           </a:p>
@@ -2731,7 +2733,7 @@
           <a:p>
             <a:fld id="{03FC92B0-CCF9-467D-ADCD-CBFB2B15EDE7}" type="datetimeFigureOut">
               <a:rPr lang="en-US" smtClean="0"/>
-              <a:t>6/10/2022</a:t>
+              <a:t>6/11/2022</a:t>
             </a:fld>
             <a:endParaRPr lang="en-US"/>
           </a:p>
@@ -2785,7 +2787,7 @@
           <a:p>
             <a:fld id="{C6B197C3-0CE0-4932-A76E-3B1DB623381B}" type="slidenum">
               <a:rPr lang="en-US" smtClean="0"/>
-              <a:t>‹#›</a:t>
+              <a:t>‹nº›</a:t>
             </a:fld>
             <a:endParaRPr lang="en-US"/>
           </a:p>
@@ -2972,7 +2974,7 @@
           <a:p>
             <a:fld id="{03FC92B0-CCF9-467D-ADCD-CBFB2B15EDE7}" type="datetimeFigureOut">
               <a:rPr lang="en-US" smtClean="0"/>
-              <a:t>6/10/2022</a:t>
+              <a:t>6/11/2022</a:t>
             </a:fld>
             <a:endParaRPr lang="en-US"/>
           </a:p>
@@ -3062,7 +3064,7 @@
           <a:p>
             <a:fld id="{C6B197C3-0CE0-4932-A76E-3B1DB623381B}" type="slidenum">
               <a:rPr lang="en-US" smtClean="0"/>
-              <a:t>‹#›</a:t>
+              <a:t>‹nº›</a:t>
             </a:fld>
             <a:endParaRPr lang="en-US"/>
           </a:p>
@@ -3405,7 +3407,7 @@
                 <a16:creationId xmlns:a16="http://schemas.microsoft.com/office/drawing/2014/main" id="{71B2258F-86CA-4D4D-8270-BC05FCDEBFB3}"/>
               </a:ext>
               <a:ext uri="{C183D7F6-B498-43B3-948B-1728B52AA6E4}">
-                <adec:decorative xmlns:adec="http://schemas.microsoft.com/office/drawing/2017/decorative" val="1"/>
+                <adec:decorative xmlns:adec="http://schemas.microsoft.com/office/drawing/2017/decorative" xmlns="" val="1"/>
               </a:ext>
             </a:extLst>
           </p:cNvPr>
@@ -3652,7 +3654,7 @@
                 <a16:creationId xmlns:a16="http://schemas.microsoft.com/office/drawing/2014/main" id="{9CC67894-1D18-43E0-B8E1-ECF37EB0D4B5}"/>
               </a:ext>
               <a:ext uri="{C183D7F6-B498-43B3-948B-1728B52AA6E4}">
-                <adec:decorative xmlns:adec="http://schemas.microsoft.com/office/drawing/2017/decorative" val="1"/>
+                <adec:decorative xmlns:adec="http://schemas.microsoft.com/office/drawing/2017/decorative" xmlns="" val="1"/>
               </a:ext>
             </a:extLst>
           </p:cNvPr>
@@ -3741,7 +3743,7 @@
                 <a16:creationId xmlns:a16="http://schemas.microsoft.com/office/drawing/2014/main" id="{A13E3398-4840-4DA1-B674-51AE569B24F9}"/>
               </a:ext>
               <a:ext uri="{C183D7F6-B498-43B3-948B-1728B52AA6E4}">
-                <adec:decorative xmlns:adec="http://schemas.microsoft.com/office/drawing/2017/decorative" val="1"/>
+                <adec:decorative xmlns:adec="http://schemas.microsoft.com/office/drawing/2017/decorative" xmlns="" val="1"/>
               </a:ext>
             </a:extLst>
           </p:cNvPr>
@@ -3925,7 +3927,7 @@
                 <a16:creationId xmlns:a16="http://schemas.microsoft.com/office/drawing/2014/main" id="{83306AB0-8BF5-43D5-B5E2-C53EA0783845}"/>
               </a:ext>
               <a:ext uri="{C183D7F6-B498-43B3-948B-1728B52AA6E4}">
-                <adec:decorative xmlns:adec="http://schemas.microsoft.com/office/drawing/2017/decorative" val="1"/>
+                <adec:decorative xmlns:adec="http://schemas.microsoft.com/office/drawing/2017/decorative" xmlns="" val="1"/>
               </a:ext>
             </a:extLst>
           </p:cNvPr>
@@ -4148,7 +4150,7 @@
                 <a16:creationId xmlns:a16="http://schemas.microsoft.com/office/drawing/2014/main" id="{9CC67894-1D18-43E0-B8E1-ECF37EB0D4B5}"/>
               </a:ext>
               <a:ext uri="{C183D7F6-B498-43B3-948B-1728B52AA6E4}">
-                <adec:decorative xmlns:adec="http://schemas.microsoft.com/office/drawing/2017/decorative" val="1"/>
+                <adec:decorative xmlns:adec="http://schemas.microsoft.com/office/drawing/2017/decorative" xmlns="" val="1"/>
               </a:ext>
             </a:extLst>
           </p:cNvPr>
@@ -4237,7 +4239,7 @@
                 <a16:creationId xmlns:a16="http://schemas.microsoft.com/office/drawing/2014/main" id="{A13E3398-4840-4DA1-B674-51AE569B24F9}"/>
               </a:ext>
               <a:ext uri="{C183D7F6-B498-43B3-948B-1728B52AA6E4}">
-                <adec:decorative xmlns:adec="http://schemas.microsoft.com/office/drawing/2017/decorative" val="1"/>
+                <adec:decorative xmlns:adec="http://schemas.microsoft.com/office/drawing/2017/decorative" xmlns="" val="1"/>
               </a:ext>
             </a:extLst>
           </p:cNvPr>
@@ -4421,7 +4423,7 @@
                 <a16:creationId xmlns:a16="http://schemas.microsoft.com/office/drawing/2014/main" id="{83306AB0-8BF5-43D5-B5E2-C53EA0783845}"/>
               </a:ext>
               <a:ext uri="{C183D7F6-B498-43B3-948B-1728B52AA6E4}">
-                <adec:decorative xmlns:adec="http://schemas.microsoft.com/office/drawing/2017/decorative" val="1"/>
+                <adec:decorative xmlns:adec="http://schemas.microsoft.com/office/drawing/2017/decorative" xmlns="" val="1"/>
               </a:ext>
             </a:extLst>
           </p:cNvPr>
@@ -4606,7 +4608,7 @@
                 <a16:creationId xmlns:a16="http://schemas.microsoft.com/office/drawing/2014/main" id="{9CC67894-1D18-43E0-B8E1-ECF37EB0D4B5}"/>
               </a:ext>
               <a:ext uri="{C183D7F6-B498-43B3-948B-1728B52AA6E4}">
-                <adec:decorative xmlns:adec="http://schemas.microsoft.com/office/drawing/2017/decorative" val="1"/>
+                <adec:decorative xmlns:adec="http://schemas.microsoft.com/office/drawing/2017/decorative" xmlns="" val="1"/>
               </a:ext>
             </a:extLst>
           </p:cNvPr>
@@ -4695,7 +4697,7 @@
                 <a16:creationId xmlns:a16="http://schemas.microsoft.com/office/drawing/2014/main" id="{A13E3398-4840-4DA1-B674-51AE569B24F9}"/>
               </a:ext>
               <a:ext uri="{C183D7F6-B498-43B3-948B-1728B52AA6E4}">
-                <adec:decorative xmlns:adec="http://schemas.microsoft.com/office/drawing/2017/decorative" val="1"/>
+                <adec:decorative xmlns:adec="http://schemas.microsoft.com/office/drawing/2017/decorative" xmlns="" val="1"/>
               </a:ext>
             </a:extLst>
           </p:cNvPr>
@@ -4879,7 +4881,7 @@
                 <a16:creationId xmlns:a16="http://schemas.microsoft.com/office/drawing/2014/main" id="{83306AB0-8BF5-43D5-B5E2-C53EA0783845}"/>
               </a:ext>
               <a:ext uri="{C183D7F6-B498-43B3-948B-1728B52AA6E4}">
-                <adec:decorative xmlns:adec="http://schemas.microsoft.com/office/drawing/2017/decorative" val="1"/>
+                <adec:decorative xmlns:adec="http://schemas.microsoft.com/office/drawing/2017/decorative" xmlns="" val="1"/>
               </a:ext>
             </a:extLst>
           </p:cNvPr>
@@ -5064,7 +5066,7 @@
                 <a16:creationId xmlns:a16="http://schemas.microsoft.com/office/drawing/2014/main" id="{9CC67894-1D18-43E0-B8E1-ECF37EB0D4B5}"/>
               </a:ext>
               <a:ext uri="{C183D7F6-B498-43B3-948B-1728B52AA6E4}">
-                <adec:decorative xmlns:adec="http://schemas.microsoft.com/office/drawing/2017/decorative" val="1"/>
+                <adec:decorative xmlns:adec="http://schemas.microsoft.com/office/drawing/2017/decorative" xmlns="" val="1"/>
               </a:ext>
             </a:extLst>
           </p:cNvPr>
@@ -5153,7 +5155,7 @@
                 <a16:creationId xmlns:a16="http://schemas.microsoft.com/office/drawing/2014/main" id="{A13E3398-4840-4DA1-B674-51AE569B24F9}"/>
               </a:ext>
               <a:ext uri="{C183D7F6-B498-43B3-948B-1728B52AA6E4}">
-                <adec:decorative xmlns:adec="http://schemas.microsoft.com/office/drawing/2017/decorative" val="1"/>
+                <adec:decorative xmlns:adec="http://schemas.microsoft.com/office/drawing/2017/decorative" xmlns="" val="1"/>
               </a:ext>
             </a:extLst>
           </p:cNvPr>
@@ -5337,7 +5339,7 @@
                 <a16:creationId xmlns:a16="http://schemas.microsoft.com/office/drawing/2014/main" id="{83306AB0-8BF5-43D5-B5E2-C53EA0783845}"/>
               </a:ext>
               <a:ext uri="{C183D7F6-B498-43B3-948B-1728B52AA6E4}">
-                <adec:decorative xmlns:adec="http://schemas.microsoft.com/office/drawing/2017/decorative" val="1"/>
+                <adec:decorative xmlns:adec="http://schemas.microsoft.com/office/drawing/2017/decorative" xmlns="" val="1"/>
               </a:ext>
             </a:extLst>
           </p:cNvPr>
@@ -5522,7 +5524,7 @@
                 <a16:creationId xmlns:a16="http://schemas.microsoft.com/office/drawing/2014/main" id="{9CC67894-1D18-43E0-B8E1-ECF37EB0D4B5}"/>
               </a:ext>
               <a:ext uri="{C183D7F6-B498-43B3-948B-1728B52AA6E4}">
-                <adec:decorative xmlns:adec="http://schemas.microsoft.com/office/drawing/2017/decorative" val="1"/>
+                <adec:decorative xmlns:adec="http://schemas.microsoft.com/office/drawing/2017/decorative" xmlns="" val="1"/>
               </a:ext>
             </a:extLst>
           </p:cNvPr>
@@ -5611,7 +5613,7 @@
                 <a16:creationId xmlns:a16="http://schemas.microsoft.com/office/drawing/2014/main" id="{A13E3398-4840-4DA1-B674-51AE569B24F9}"/>
               </a:ext>
               <a:ext uri="{C183D7F6-B498-43B3-948B-1728B52AA6E4}">
-                <adec:decorative xmlns:adec="http://schemas.microsoft.com/office/drawing/2017/decorative" val="1"/>
+                <adec:decorative xmlns:adec="http://schemas.microsoft.com/office/drawing/2017/decorative" xmlns="" val="1"/>
               </a:ext>
             </a:extLst>
           </p:cNvPr>
@@ -5795,7 +5797,7 @@
                 <a16:creationId xmlns:a16="http://schemas.microsoft.com/office/drawing/2014/main" id="{83306AB0-8BF5-43D5-B5E2-C53EA0783845}"/>
               </a:ext>
               <a:ext uri="{C183D7F6-B498-43B3-948B-1728B52AA6E4}">
-                <adec:decorative xmlns:adec="http://schemas.microsoft.com/office/drawing/2017/decorative" val="1"/>
+                <adec:decorative xmlns:adec="http://schemas.microsoft.com/office/drawing/2017/decorative" xmlns="" val="1"/>
               </a:ext>
             </a:extLst>
           </p:cNvPr>
@@ -6004,7 +6006,7 @@
                 <a16:creationId xmlns:a16="http://schemas.microsoft.com/office/drawing/2014/main" id="{9CC67894-1D18-43E0-B8E1-ECF37EB0D4B5}"/>
               </a:ext>
               <a:ext uri="{C183D7F6-B498-43B3-948B-1728B52AA6E4}">
-                <adec:decorative xmlns:adec="http://schemas.microsoft.com/office/drawing/2017/decorative" val="1"/>
+                <adec:decorative xmlns:adec="http://schemas.microsoft.com/office/drawing/2017/decorative" xmlns="" val="1"/>
               </a:ext>
             </a:extLst>
           </p:cNvPr>
@@ -6093,7 +6095,7 @@
                 <a16:creationId xmlns:a16="http://schemas.microsoft.com/office/drawing/2014/main" id="{A13E3398-4840-4DA1-B674-51AE569B24F9}"/>
               </a:ext>
               <a:ext uri="{C183D7F6-B498-43B3-948B-1728B52AA6E4}">
-                <adec:decorative xmlns:adec="http://schemas.microsoft.com/office/drawing/2017/decorative" val="1"/>
+                <adec:decorative xmlns:adec="http://schemas.microsoft.com/office/drawing/2017/decorative" xmlns="" val="1"/>
               </a:ext>
             </a:extLst>
           </p:cNvPr>
@@ -6277,7 +6279,7 @@
                 <a16:creationId xmlns:a16="http://schemas.microsoft.com/office/drawing/2014/main" id="{83306AB0-8BF5-43D5-B5E2-C53EA0783845}"/>
               </a:ext>
               <a:ext uri="{C183D7F6-B498-43B3-948B-1728B52AA6E4}">
-                <adec:decorative xmlns:adec="http://schemas.microsoft.com/office/drawing/2017/decorative" val="1"/>
+                <adec:decorative xmlns:adec="http://schemas.microsoft.com/office/drawing/2017/decorative" xmlns="" val="1"/>
               </a:ext>
             </a:extLst>
           </p:cNvPr>
@@ -6458,6 +6460,13 @@
   <p:clrMapOvr>
     <a:masterClrMapping/>
   </p:clrMapOvr>
+  <p:timing>
+    <p:tnLst>
+      <p:par>
+        <p:cTn id="1" dur="indefinite" restart="never" nodeType="tmRoot"/>
+      </p:par>
+    </p:tnLst>
+  </p:timing>
 </p:sld>
 </file>
 
@@ -6494,7 +6503,7 @@
                 <a16:creationId xmlns:a16="http://schemas.microsoft.com/office/drawing/2014/main" id="{9CC67894-1D18-43E0-B8E1-ECF37EB0D4B5}"/>
               </a:ext>
               <a:ext uri="{C183D7F6-B498-43B3-948B-1728B52AA6E4}">
-                <adec:decorative xmlns:adec="http://schemas.microsoft.com/office/drawing/2017/decorative" val="1"/>
+                <adec:decorative xmlns:adec="http://schemas.microsoft.com/office/drawing/2017/decorative" xmlns="" val="1"/>
               </a:ext>
             </a:extLst>
           </p:cNvPr>
@@ -6583,7 +6592,7 @@
                 <a16:creationId xmlns:a16="http://schemas.microsoft.com/office/drawing/2014/main" id="{A13E3398-4840-4DA1-B674-51AE569B24F9}"/>
               </a:ext>
               <a:ext uri="{C183D7F6-B498-43B3-948B-1728B52AA6E4}">
-                <adec:decorative xmlns:adec="http://schemas.microsoft.com/office/drawing/2017/decorative" val="1"/>
+                <adec:decorative xmlns:adec="http://schemas.microsoft.com/office/drawing/2017/decorative" xmlns="" val="1"/>
               </a:ext>
             </a:extLst>
           </p:cNvPr>
@@ -6767,7 +6776,7 @@
                 <a16:creationId xmlns:a16="http://schemas.microsoft.com/office/drawing/2014/main" id="{83306AB0-8BF5-43D5-B5E2-C53EA0783845}"/>
               </a:ext>
               <a:ext uri="{C183D7F6-B498-43B3-948B-1728B52AA6E4}">
-                <adec:decorative xmlns:adec="http://schemas.microsoft.com/office/drawing/2017/decorative" val="1"/>
+                <adec:decorative xmlns:adec="http://schemas.microsoft.com/office/drawing/2017/decorative" xmlns="" val="1"/>
               </a:ext>
             </a:extLst>
           </p:cNvPr>
@@ -6915,6 +6924,13 @@
   <p:clrMapOvr>
     <a:masterClrMapping/>
   </p:clrMapOvr>
+  <p:timing>
+    <p:tnLst>
+      <p:par>
+        <p:cTn id="1" dur="indefinite" restart="never" nodeType="tmRoot"/>
+      </p:par>
+    </p:tnLst>
+  </p:timing>
 </p:sld>
 </file>
 
@@ -6951,7 +6967,7 @@
                 <a16:creationId xmlns:a16="http://schemas.microsoft.com/office/drawing/2014/main" id="{9CC67894-1D18-43E0-B8E1-ECF37EB0D4B5}"/>
               </a:ext>
               <a:ext uri="{C183D7F6-B498-43B3-948B-1728B52AA6E4}">
-                <adec:decorative xmlns:adec="http://schemas.microsoft.com/office/drawing/2017/decorative" val="1"/>
+                <adec:decorative xmlns:adec="http://schemas.microsoft.com/office/drawing/2017/decorative" xmlns="" val="1"/>
               </a:ext>
             </a:extLst>
           </p:cNvPr>
@@ -7040,7 +7056,7 @@
                 <a16:creationId xmlns:a16="http://schemas.microsoft.com/office/drawing/2014/main" id="{A13E3398-4840-4DA1-B674-51AE569B24F9}"/>
               </a:ext>
               <a:ext uri="{C183D7F6-B498-43B3-948B-1728B52AA6E4}">
-                <adec:decorative xmlns:adec="http://schemas.microsoft.com/office/drawing/2017/decorative" val="1"/>
+                <adec:decorative xmlns:adec="http://schemas.microsoft.com/office/drawing/2017/decorative" xmlns="" val="1"/>
               </a:ext>
             </a:extLst>
           </p:cNvPr>
@@ -7224,7 +7240,7 @@
                 <a16:creationId xmlns:a16="http://schemas.microsoft.com/office/drawing/2014/main" id="{83306AB0-8BF5-43D5-B5E2-C53EA0783845}"/>
               </a:ext>
               <a:ext uri="{C183D7F6-B498-43B3-948B-1728B52AA6E4}">
-                <adec:decorative xmlns:adec="http://schemas.microsoft.com/office/drawing/2017/decorative" val="1"/>
+                <adec:decorative xmlns:adec="http://schemas.microsoft.com/office/drawing/2017/decorative" xmlns="" val="1"/>
               </a:ext>
             </a:extLst>
           </p:cNvPr>
@@ -7362,6 +7378,13 @@
   <p:clrMapOvr>
     <a:masterClrMapping/>
   </p:clrMapOvr>
+  <p:timing>
+    <p:tnLst>
+      <p:par>
+        <p:cTn id="1" dur="indefinite" restart="never" nodeType="tmRoot"/>
+      </p:par>
+    </p:tnLst>
+  </p:timing>
 </p:sld>
 </file>
 
@@ -7398,7 +7421,7 @@
                 <a16:creationId xmlns:a16="http://schemas.microsoft.com/office/drawing/2014/main" id="{9CC67894-1D18-43E0-B8E1-ECF37EB0D4B5}"/>
               </a:ext>
               <a:ext uri="{C183D7F6-B498-43B3-948B-1728B52AA6E4}">
-                <adec:decorative xmlns:adec="http://schemas.microsoft.com/office/drawing/2017/decorative" val="1"/>
+                <adec:decorative xmlns:adec="http://schemas.microsoft.com/office/drawing/2017/decorative" xmlns="" val="1"/>
               </a:ext>
             </a:extLst>
           </p:cNvPr>
@@ -7487,7 +7510,7 @@
                 <a16:creationId xmlns:a16="http://schemas.microsoft.com/office/drawing/2014/main" id="{A13E3398-4840-4DA1-B674-51AE569B24F9}"/>
               </a:ext>
               <a:ext uri="{C183D7F6-B498-43B3-948B-1728B52AA6E4}">
-                <adec:decorative xmlns:adec="http://schemas.microsoft.com/office/drawing/2017/decorative" val="1"/>
+                <adec:decorative xmlns:adec="http://schemas.microsoft.com/office/drawing/2017/decorative" xmlns="" val="1"/>
               </a:ext>
             </a:extLst>
           </p:cNvPr>
@@ -7671,7 +7694,7 @@
                 <a16:creationId xmlns:a16="http://schemas.microsoft.com/office/drawing/2014/main" id="{83306AB0-8BF5-43D5-B5E2-C53EA0783845}"/>
               </a:ext>
               <a:ext uri="{C183D7F6-B498-43B3-948B-1728B52AA6E4}">
-                <adec:decorative xmlns:adec="http://schemas.microsoft.com/office/drawing/2017/decorative" val="1"/>
+                <adec:decorative xmlns:adec="http://schemas.microsoft.com/office/drawing/2017/decorative" xmlns="" val="1"/>
               </a:ext>
             </a:extLst>
           </p:cNvPr>
@@ -7852,6 +7875,13 @@
   <p:clrMapOvr>
     <a:masterClrMapping/>
   </p:clrMapOvr>
+  <p:timing>
+    <p:tnLst>
+      <p:par>
+        <p:cTn id="1" dur="indefinite" restart="never" nodeType="tmRoot"/>
+      </p:par>
+    </p:tnLst>
+  </p:timing>
 </p:sld>
 </file>
 
@@ -7888,7 +7918,7 @@
                 <a16:creationId xmlns:a16="http://schemas.microsoft.com/office/drawing/2014/main" id="{9CC67894-1D18-43E0-B8E1-ECF37EB0D4B5}"/>
               </a:ext>
               <a:ext uri="{C183D7F6-B498-43B3-948B-1728B52AA6E4}">
-                <adec:decorative xmlns:adec="http://schemas.microsoft.com/office/drawing/2017/decorative" val="1"/>
+                <adec:decorative xmlns:adec="http://schemas.microsoft.com/office/drawing/2017/decorative" xmlns="" val="1"/>
               </a:ext>
             </a:extLst>
           </p:cNvPr>
@@ -7977,7 +8007,7 @@
                 <a16:creationId xmlns:a16="http://schemas.microsoft.com/office/drawing/2014/main" id="{A13E3398-4840-4DA1-B674-51AE569B24F9}"/>
               </a:ext>
               <a:ext uri="{C183D7F6-B498-43B3-948B-1728B52AA6E4}">
-                <adec:decorative xmlns:adec="http://schemas.microsoft.com/office/drawing/2017/decorative" val="1"/>
+                <adec:decorative xmlns:adec="http://schemas.microsoft.com/office/drawing/2017/decorative" xmlns="" val="1"/>
               </a:ext>
             </a:extLst>
           </p:cNvPr>
@@ -8161,7 +8191,7 @@
                 <a16:creationId xmlns:a16="http://schemas.microsoft.com/office/drawing/2014/main" id="{83306AB0-8BF5-43D5-B5E2-C53EA0783845}"/>
               </a:ext>
               <a:ext uri="{C183D7F6-B498-43B3-948B-1728B52AA6E4}">
-                <adec:decorative xmlns:adec="http://schemas.microsoft.com/office/drawing/2017/decorative" val="1"/>
+                <adec:decorative xmlns:adec="http://schemas.microsoft.com/office/drawing/2017/decorative" xmlns="" val="1"/>
               </a:ext>
             </a:extLst>
           </p:cNvPr>
@@ -8329,6 +8359,13 @@
   <p:clrMapOvr>
     <a:masterClrMapping/>
   </p:clrMapOvr>
+  <p:timing>
+    <p:tnLst>
+      <p:par>
+        <p:cTn id="1" dur="indefinite" restart="never" nodeType="tmRoot"/>
+      </p:par>
+    </p:tnLst>
+  </p:timing>
 </p:sld>
 </file>
 
@@ -8365,7 +8402,7 @@
                 <a16:creationId xmlns:a16="http://schemas.microsoft.com/office/drawing/2014/main" id="{9CC67894-1D18-43E0-B8E1-ECF37EB0D4B5}"/>
               </a:ext>
               <a:ext uri="{C183D7F6-B498-43B3-948B-1728B52AA6E4}">
-                <adec:decorative xmlns:adec="http://schemas.microsoft.com/office/drawing/2017/decorative" val="1"/>
+                <adec:decorative xmlns:adec="http://schemas.microsoft.com/office/drawing/2017/decorative" xmlns="" val="1"/>
               </a:ext>
             </a:extLst>
           </p:cNvPr>
@@ -8454,7 +8491,7 @@
                 <a16:creationId xmlns:a16="http://schemas.microsoft.com/office/drawing/2014/main" id="{A13E3398-4840-4DA1-B674-51AE569B24F9}"/>
               </a:ext>
               <a:ext uri="{C183D7F6-B498-43B3-948B-1728B52AA6E4}">
-                <adec:decorative xmlns:adec="http://schemas.microsoft.com/office/drawing/2017/decorative" val="1"/>
+                <adec:decorative xmlns:adec="http://schemas.microsoft.com/office/drawing/2017/decorative" xmlns="" val="1"/>
               </a:ext>
             </a:extLst>
           </p:cNvPr>
@@ -8638,7 +8675,7 @@
                 <a16:creationId xmlns:a16="http://schemas.microsoft.com/office/drawing/2014/main" id="{83306AB0-8BF5-43D5-B5E2-C53EA0783845}"/>
               </a:ext>
               <a:ext uri="{C183D7F6-B498-43B3-948B-1728B52AA6E4}">
-                <adec:decorative xmlns:adec="http://schemas.microsoft.com/office/drawing/2017/decorative" val="1"/>
+                <adec:decorative xmlns:adec="http://schemas.microsoft.com/office/drawing/2017/decorative" xmlns="" val="1"/>
               </a:ext>
             </a:extLst>
           </p:cNvPr>
@@ -8776,7 +8813,7 @@
                   <a:srgbClr val="FFFFFF"/>
                 </a:solidFill>
               </a:rPr>
-              <a:t>REVISÃO BIBLIOGRAFICA;</a:t>
+              <a:t>REVISÃO BIBLIOGRÁFICA;</a:t>
             </a:r>
           </a:p>
           <a:p>
@@ -8821,7 +8858,7 @@
                   <a:srgbClr val="FFFFFF"/>
                 </a:solidFill>
               </a:rPr>
-              <a:t>PRINCIPAIS ARTEFATOS DESENVOLVIDOS PARA ARQUITETURA E PROJETO DO SISTEMA.</a:t>
+              <a:t>PRINCIPAIS ARTEFATOS DESENVOLVIDOS PARA ARQUITETURA E PROJETO DO SISTEMA;</a:t>
             </a:r>
           </a:p>
           <a:p>
@@ -8917,7 +8954,7 @@
                 <a16:creationId xmlns:a16="http://schemas.microsoft.com/office/drawing/2014/main" id="{9CC67894-1D18-43E0-B8E1-ECF37EB0D4B5}"/>
               </a:ext>
               <a:ext uri="{C183D7F6-B498-43B3-948B-1728B52AA6E4}">
-                <adec:decorative xmlns:adec="http://schemas.microsoft.com/office/drawing/2017/decorative" val="1"/>
+                <adec:decorative xmlns:adec="http://schemas.microsoft.com/office/drawing/2017/decorative" xmlns="" val="1"/>
               </a:ext>
             </a:extLst>
           </p:cNvPr>
@@ -9006,7 +9043,7 @@
                 <a16:creationId xmlns:a16="http://schemas.microsoft.com/office/drawing/2014/main" id="{A13E3398-4840-4DA1-B674-51AE569B24F9}"/>
               </a:ext>
               <a:ext uri="{C183D7F6-B498-43B3-948B-1728B52AA6E4}">
-                <adec:decorative xmlns:adec="http://schemas.microsoft.com/office/drawing/2017/decorative" val="1"/>
+                <adec:decorative xmlns:adec="http://schemas.microsoft.com/office/drawing/2017/decorative" xmlns="" val="1"/>
               </a:ext>
             </a:extLst>
           </p:cNvPr>
@@ -9190,7 +9227,7 @@
                 <a16:creationId xmlns:a16="http://schemas.microsoft.com/office/drawing/2014/main" id="{83306AB0-8BF5-43D5-B5E2-C53EA0783845}"/>
               </a:ext>
               <a:ext uri="{C183D7F6-B498-43B3-948B-1728B52AA6E4}">
-                <adec:decorative xmlns:adec="http://schemas.microsoft.com/office/drawing/2017/decorative" val="1"/>
+                <adec:decorative xmlns:adec="http://schemas.microsoft.com/office/drawing/2017/decorative" xmlns="" val="1"/>
               </a:ext>
             </a:extLst>
           </p:cNvPr>
@@ -9339,6 +9376,13 @@
   <p:clrMapOvr>
     <a:masterClrMapping/>
   </p:clrMapOvr>
+  <p:timing>
+    <p:tnLst>
+      <p:par>
+        <p:cTn id="1" dur="indefinite" restart="never" nodeType="tmRoot"/>
+      </p:par>
+    </p:tnLst>
+  </p:timing>
 </p:sld>
 </file>
 
@@ -9375,7 +9419,7 @@
                 <a16:creationId xmlns:a16="http://schemas.microsoft.com/office/drawing/2014/main" id="{9CC67894-1D18-43E0-B8E1-ECF37EB0D4B5}"/>
               </a:ext>
               <a:ext uri="{C183D7F6-B498-43B3-948B-1728B52AA6E4}">
-                <adec:decorative xmlns:adec="http://schemas.microsoft.com/office/drawing/2017/decorative" val="1"/>
+                <adec:decorative xmlns:adec="http://schemas.microsoft.com/office/drawing/2017/decorative" xmlns="" val="1"/>
               </a:ext>
             </a:extLst>
           </p:cNvPr>
@@ -9464,7 +9508,7 @@
                 <a16:creationId xmlns:a16="http://schemas.microsoft.com/office/drawing/2014/main" id="{A13E3398-4840-4DA1-B674-51AE569B24F9}"/>
               </a:ext>
               <a:ext uri="{C183D7F6-B498-43B3-948B-1728B52AA6E4}">
-                <adec:decorative xmlns:adec="http://schemas.microsoft.com/office/drawing/2017/decorative" val="1"/>
+                <adec:decorative xmlns:adec="http://schemas.microsoft.com/office/drawing/2017/decorative" xmlns="" val="1"/>
               </a:ext>
             </a:extLst>
           </p:cNvPr>
@@ -9648,7 +9692,7 @@
                 <a16:creationId xmlns:a16="http://schemas.microsoft.com/office/drawing/2014/main" id="{83306AB0-8BF5-43D5-B5E2-C53EA0783845}"/>
               </a:ext>
               <a:ext uri="{C183D7F6-B498-43B3-948B-1728B52AA6E4}">
-                <adec:decorative xmlns:adec="http://schemas.microsoft.com/office/drawing/2017/decorative" val="1"/>
+                <adec:decorative xmlns:adec="http://schemas.microsoft.com/office/drawing/2017/decorative" xmlns="" val="1"/>
               </a:ext>
             </a:extLst>
           </p:cNvPr>
@@ -9784,6 +9828,13 @@
   <p:clrMapOvr>
     <a:masterClrMapping/>
   </p:clrMapOvr>
+  <p:timing>
+    <p:tnLst>
+      <p:par>
+        <p:cTn id="1" dur="indefinite" restart="never" nodeType="tmRoot"/>
+      </p:par>
+    </p:tnLst>
+  </p:timing>
 </p:sld>
 </file>
 
@@ -9820,7 +9871,7 @@
                 <a16:creationId xmlns:a16="http://schemas.microsoft.com/office/drawing/2014/main" id="{9CC67894-1D18-43E0-B8E1-ECF37EB0D4B5}"/>
               </a:ext>
               <a:ext uri="{C183D7F6-B498-43B3-948B-1728B52AA6E4}">
-                <adec:decorative xmlns:adec="http://schemas.microsoft.com/office/drawing/2017/decorative" val="1"/>
+                <adec:decorative xmlns:adec="http://schemas.microsoft.com/office/drawing/2017/decorative" xmlns="" val="1"/>
               </a:ext>
             </a:extLst>
           </p:cNvPr>
@@ -9909,7 +9960,7 @@
                 <a16:creationId xmlns:a16="http://schemas.microsoft.com/office/drawing/2014/main" id="{A13E3398-4840-4DA1-B674-51AE569B24F9}"/>
               </a:ext>
               <a:ext uri="{C183D7F6-B498-43B3-948B-1728B52AA6E4}">
-                <adec:decorative xmlns:adec="http://schemas.microsoft.com/office/drawing/2017/decorative" val="1"/>
+                <adec:decorative xmlns:adec="http://schemas.microsoft.com/office/drawing/2017/decorative" xmlns="" val="1"/>
               </a:ext>
             </a:extLst>
           </p:cNvPr>
@@ -10093,7 +10144,7 @@
                 <a16:creationId xmlns:a16="http://schemas.microsoft.com/office/drawing/2014/main" id="{83306AB0-8BF5-43D5-B5E2-C53EA0783845}"/>
               </a:ext>
               <a:ext uri="{C183D7F6-B498-43B3-948B-1728B52AA6E4}">
-                <adec:decorative xmlns:adec="http://schemas.microsoft.com/office/drawing/2017/decorative" val="1"/>
+                <adec:decorative xmlns:adec="http://schemas.microsoft.com/office/drawing/2017/decorative" xmlns="" val="1"/>
               </a:ext>
             </a:extLst>
           </p:cNvPr>
@@ -10288,6 +10339,13 @@
   <p:clrMapOvr>
     <a:masterClrMapping/>
   </p:clrMapOvr>
+  <p:timing>
+    <p:tnLst>
+      <p:par>
+        <p:cTn id="1" dur="indefinite" restart="never" nodeType="tmRoot"/>
+      </p:par>
+    </p:tnLst>
+  </p:timing>
 </p:sld>
 </file>
 
@@ -10324,7 +10382,7 @@
                 <a16:creationId xmlns:a16="http://schemas.microsoft.com/office/drawing/2014/main" id="{9CC67894-1D18-43E0-B8E1-ECF37EB0D4B5}"/>
               </a:ext>
               <a:ext uri="{C183D7F6-B498-43B3-948B-1728B52AA6E4}">
-                <adec:decorative xmlns:adec="http://schemas.microsoft.com/office/drawing/2017/decorative" val="1"/>
+                <adec:decorative xmlns:adec="http://schemas.microsoft.com/office/drawing/2017/decorative" xmlns="" val="1"/>
               </a:ext>
             </a:extLst>
           </p:cNvPr>
@@ -10413,7 +10471,7 @@
                 <a16:creationId xmlns:a16="http://schemas.microsoft.com/office/drawing/2014/main" id="{A13E3398-4840-4DA1-B674-51AE569B24F9}"/>
               </a:ext>
               <a:ext uri="{C183D7F6-B498-43B3-948B-1728B52AA6E4}">
-                <adec:decorative xmlns:adec="http://schemas.microsoft.com/office/drawing/2017/decorative" val="1"/>
+                <adec:decorative xmlns:adec="http://schemas.microsoft.com/office/drawing/2017/decorative" xmlns="" val="1"/>
               </a:ext>
             </a:extLst>
           </p:cNvPr>
@@ -10597,7 +10655,7 @@
                 <a16:creationId xmlns:a16="http://schemas.microsoft.com/office/drawing/2014/main" id="{83306AB0-8BF5-43D5-B5E2-C53EA0783845}"/>
               </a:ext>
               <a:ext uri="{C183D7F6-B498-43B3-948B-1728B52AA6E4}">
-                <adec:decorative xmlns:adec="http://schemas.microsoft.com/office/drawing/2017/decorative" val="1"/>
+                <adec:decorative xmlns:adec="http://schemas.microsoft.com/office/drawing/2017/decorative" xmlns="" val="1"/>
               </a:ext>
             </a:extLst>
           </p:cNvPr>
@@ -11164,6 +11222,13 @@
   <p:clrMapOvr>
     <a:masterClrMapping/>
   </p:clrMapOvr>
+  <p:timing>
+    <p:tnLst>
+      <p:par>
+        <p:cTn id="1" dur="indefinite" restart="never" nodeType="tmRoot"/>
+      </p:par>
+    </p:tnLst>
+  </p:timing>
 </p:sld>
 </file>
 
@@ -11200,7 +11265,7 @@
                 <a16:creationId xmlns:a16="http://schemas.microsoft.com/office/drawing/2014/main" id="{9CC67894-1D18-43E0-B8E1-ECF37EB0D4B5}"/>
               </a:ext>
               <a:ext uri="{C183D7F6-B498-43B3-948B-1728B52AA6E4}">
-                <adec:decorative xmlns:adec="http://schemas.microsoft.com/office/drawing/2017/decorative" val="1"/>
+                <adec:decorative xmlns:adec="http://schemas.microsoft.com/office/drawing/2017/decorative" xmlns="" val="1"/>
               </a:ext>
             </a:extLst>
           </p:cNvPr>
@@ -11289,7 +11354,7 @@
                 <a16:creationId xmlns:a16="http://schemas.microsoft.com/office/drawing/2014/main" id="{A13E3398-4840-4DA1-B674-51AE569B24F9}"/>
               </a:ext>
               <a:ext uri="{C183D7F6-B498-43B3-948B-1728B52AA6E4}">
-                <adec:decorative xmlns:adec="http://schemas.microsoft.com/office/drawing/2017/decorative" val="1"/>
+                <adec:decorative xmlns:adec="http://schemas.microsoft.com/office/drawing/2017/decorative" xmlns="" val="1"/>
               </a:ext>
             </a:extLst>
           </p:cNvPr>
@@ -11473,7 +11538,7 @@
                 <a16:creationId xmlns:a16="http://schemas.microsoft.com/office/drawing/2014/main" id="{83306AB0-8BF5-43D5-B5E2-C53EA0783845}"/>
               </a:ext>
               <a:ext uri="{C183D7F6-B498-43B3-948B-1728B52AA6E4}">
-                <adec:decorative xmlns:adec="http://schemas.microsoft.com/office/drawing/2017/decorative" val="1"/>
+                <adec:decorative xmlns:adec="http://schemas.microsoft.com/office/drawing/2017/decorative" xmlns="" val="1"/>
               </a:ext>
             </a:extLst>
           </p:cNvPr>
@@ -11827,6 +11892,13 @@
   <p:clrMapOvr>
     <a:masterClrMapping/>
   </p:clrMapOvr>
+  <p:timing>
+    <p:tnLst>
+      <p:par>
+        <p:cTn id="1" dur="indefinite" restart="never" nodeType="tmRoot"/>
+      </p:par>
+    </p:tnLst>
+  </p:timing>
 </p:sld>
 </file>
 
@@ -11863,7 +11935,7 @@
                 <a16:creationId xmlns:a16="http://schemas.microsoft.com/office/drawing/2014/main" id="{9CC67894-1D18-43E0-B8E1-ECF37EB0D4B5}"/>
               </a:ext>
               <a:ext uri="{C183D7F6-B498-43B3-948B-1728B52AA6E4}">
-                <adec:decorative xmlns:adec="http://schemas.microsoft.com/office/drawing/2017/decorative" val="1"/>
+                <adec:decorative xmlns:adec="http://schemas.microsoft.com/office/drawing/2017/decorative" xmlns="" val="1"/>
               </a:ext>
             </a:extLst>
           </p:cNvPr>
@@ -11952,7 +12024,7 @@
                 <a16:creationId xmlns:a16="http://schemas.microsoft.com/office/drawing/2014/main" id="{A13E3398-4840-4DA1-B674-51AE569B24F9}"/>
               </a:ext>
               <a:ext uri="{C183D7F6-B498-43B3-948B-1728B52AA6E4}">
-                <adec:decorative xmlns:adec="http://schemas.microsoft.com/office/drawing/2017/decorative" val="1"/>
+                <adec:decorative xmlns:adec="http://schemas.microsoft.com/office/drawing/2017/decorative" xmlns="" val="1"/>
               </a:ext>
             </a:extLst>
           </p:cNvPr>
@@ -12136,7 +12208,7 @@
                 <a16:creationId xmlns:a16="http://schemas.microsoft.com/office/drawing/2014/main" id="{83306AB0-8BF5-43D5-B5E2-C53EA0783845}"/>
               </a:ext>
               <a:ext uri="{C183D7F6-B498-43B3-948B-1728B52AA6E4}">
-                <adec:decorative xmlns:adec="http://schemas.microsoft.com/office/drawing/2017/decorative" val="1"/>
+                <adec:decorative xmlns:adec="http://schemas.microsoft.com/office/drawing/2017/decorative" xmlns="" val="1"/>
               </a:ext>
             </a:extLst>
           </p:cNvPr>
@@ -12507,6 +12579,13 @@
   <p:clrMapOvr>
     <a:masterClrMapping/>
   </p:clrMapOvr>
+  <p:timing>
+    <p:tnLst>
+      <p:par>
+        <p:cTn id="1" dur="indefinite" restart="never" nodeType="tmRoot"/>
+      </p:par>
+    </p:tnLst>
+  </p:timing>
 </p:sld>
 </file>
 
@@ -12543,7 +12622,7 @@
                 <a16:creationId xmlns:a16="http://schemas.microsoft.com/office/drawing/2014/main" id="{9CC67894-1D18-43E0-B8E1-ECF37EB0D4B5}"/>
               </a:ext>
               <a:ext uri="{C183D7F6-B498-43B3-948B-1728B52AA6E4}">
-                <adec:decorative xmlns:adec="http://schemas.microsoft.com/office/drawing/2017/decorative" val="1"/>
+                <adec:decorative xmlns:adec="http://schemas.microsoft.com/office/drawing/2017/decorative" xmlns="" val="1"/>
               </a:ext>
             </a:extLst>
           </p:cNvPr>
@@ -12632,7 +12711,7 @@
                 <a16:creationId xmlns:a16="http://schemas.microsoft.com/office/drawing/2014/main" id="{A13E3398-4840-4DA1-B674-51AE569B24F9}"/>
               </a:ext>
               <a:ext uri="{C183D7F6-B498-43B3-948B-1728B52AA6E4}">
-                <adec:decorative xmlns:adec="http://schemas.microsoft.com/office/drawing/2017/decorative" val="1"/>
+                <adec:decorative xmlns:adec="http://schemas.microsoft.com/office/drawing/2017/decorative" xmlns="" val="1"/>
               </a:ext>
             </a:extLst>
           </p:cNvPr>
@@ -12816,7 +12895,7 @@
                 <a16:creationId xmlns:a16="http://schemas.microsoft.com/office/drawing/2014/main" id="{83306AB0-8BF5-43D5-B5E2-C53EA0783845}"/>
               </a:ext>
               <a:ext uri="{C183D7F6-B498-43B3-948B-1728B52AA6E4}">
-                <adec:decorative xmlns:adec="http://schemas.microsoft.com/office/drawing/2017/decorative" val="1"/>
+                <adec:decorative xmlns:adec="http://schemas.microsoft.com/office/drawing/2017/decorative" xmlns="" val="1"/>
               </a:ext>
             </a:extLst>
           </p:cNvPr>
@@ -13122,6 +13201,13 @@
   <p:clrMapOvr>
     <a:masterClrMapping/>
   </p:clrMapOvr>
+  <p:timing>
+    <p:tnLst>
+      <p:par>
+        <p:cTn id="1" dur="indefinite" restart="never" nodeType="tmRoot"/>
+      </p:par>
+    </p:tnLst>
+  </p:timing>
 </p:sld>
 </file>
 
@@ -13182,6 +13268,13 @@
   <p:clrMapOvr>
     <a:masterClrMapping/>
   </p:clrMapOvr>
+  <p:timing>
+    <p:tnLst>
+      <p:par>
+        <p:cTn id="1" dur="indefinite" restart="never" nodeType="tmRoot"/>
+      </p:par>
+    </p:tnLst>
+  </p:timing>
 </p:sld>
 </file>
 
@@ -13218,7 +13311,7 @@
                 <a16:creationId xmlns:a16="http://schemas.microsoft.com/office/drawing/2014/main" id="{9CC67894-1D18-43E0-B8E1-ECF37EB0D4B5}"/>
               </a:ext>
               <a:ext uri="{C183D7F6-B498-43B3-948B-1728B52AA6E4}">
-                <adec:decorative xmlns:adec="http://schemas.microsoft.com/office/drawing/2017/decorative" val="1"/>
+                <adec:decorative xmlns:adec="http://schemas.microsoft.com/office/drawing/2017/decorative" xmlns="" val="1"/>
               </a:ext>
             </a:extLst>
           </p:cNvPr>
@@ -13307,7 +13400,7 @@
                 <a16:creationId xmlns:a16="http://schemas.microsoft.com/office/drawing/2014/main" id="{A13E3398-4840-4DA1-B674-51AE569B24F9}"/>
               </a:ext>
               <a:ext uri="{C183D7F6-B498-43B3-948B-1728B52AA6E4}">
-                <adec:decorative xmlns:adec="http://schemas.microsoft.com/office/drawing/2017/decorative" val="1"/>
+                <adec:decorative xmlns:adec="http://schemas.microsoft.com/office/drawing/2017/decorative" xmlns="" val="1"/>
               </a:ext>
             </a:extLst>
           </p:cNvPr>
@@ -13491,7 +13584,7 @@
                 <a16:creationId xmlns:a16="http://schemas.microsoft.com/office/drawing/2014/main" id="{83306AB0-8BF5-43D5-B5E2-C53EA0783845}"/>
               </a:ext>
               <a:ext uri="{C183D7F6-B498-43B3-948B-1728B52AA6E4}">
-                <adec:decorative xmlns:adec="http://schemas.microsoft.com/office/drawing/2017/decorative" val="1"/>
+                <adec:decorative xmlns:adec="http://schemas.microsoft.com/office/drawing/2017/decorative" xmlns="" val="1"/>
               </a:ext>
             </a:extLst>
           </p:cNvPr>
@@ -13639,6 +13732,13 @@
   <p:clrMapOvr>
     <a:masterClrMapping/>
   </p:clrMapOvr>
+  <p:timing>
+    <p:tnLst>
+      <p:par>
+        <p:cTn id="1" dur="indefinite" restart="never" nodeType="tmRoot"/>
+      </p:par>
+    </p:tnLst>
+  </p:timing>
 </p:sld>
 </file>
 
@@ -13675,7 +13775,7 @@
                 <a16:creationId xmlns:a16="http://schemas.microsoft.com/office/drawing/2014/main" id="{9CC67894-1D18-43E0-B8E1-ECF37EB0D4B5}"/>
               </a:ext>
               <a:ext uri="{C183D7F6-B498-43B3-948B-1728B52AA6E4}">
-                <adec:decorative xmlns:adec="http://schemas.microsoft.com/office/drawing/2017/decorative" val="1"/>
+                <adec:decorative xmlns:adec="http://schemas.microsoft.com/office/drawing/2017/decorative" xmlns="" val="1"/>
               </a:ext>
             </a:extLst>
           </p:cNvPr>
@@ -13764,7 +13864,7 @@
                 <a16:creationId xmlns:a16="http://schemas.microsoft.com/office/drawing/2014/main" id="{A13E3398-4840-4DA1-B674-51AE569B24F9}"/>
               </a:ext>
               <a:ext uri="{C183D7F6-B498-43B3-948B-1728B52AA6E4}">
-                <adec:decorative xmlns:adec="http://schemas.microsoft.com/office/drawing/2017/decorative" val="1"/>
+                <adec:decorative xmlns:adec="http://schemas.microsoft.com/office/drawing/2017/decorative" xmlns="" val="1"/>
               </a:ext>
             </a:extLst>
           </p:cNvPr>
@@ -13948,7 +14048,7 @@
                 <a16:creationId xmlns:a16="http://schemas.microsoft.com/office/drawing/2014/main" id="{83306AB0-8BF5-43D5-B5E2-C53EA0783845}"/>
               </a:ext>
               <a:ext uri="{C183D7F6-B498-43B3-948B-1728B52AA6E4}">
-                <adec:decorative xmlns:adec="http://schemas.microsoft.com/office/drawing/2017/decorative" val="1"/>
+                <adec:decorative xmlns:adec="http://schemas.microsoft.com/office/drawing/2017/decorative" xmlns="" val="1"/>
               </a:ext>
             </a:extLst>
           </p:cNvPr>
@@ -14050,8 +14150,8 @@
         </p:nvSpPr>
         <p:spPr>
           <a:xfrm>
-            <a:off x="491612" y="2202427"/>
-            <a:ext cx="11700387" cy="4237702"/>
+            <a:off x="3048" y="2202427"/>
+            <a:ext cx="12188951" cy="4237702"/>
           </a:xfrm>
         </p:spPr>
         <p:txBody>
@@ -14176,6 +14276,13 @@
   <p:clrMapOvr>
     <a:masterClrMapping/>
   </p:clrMapOvr>
+  <p:timing>
+    <p:tnLst>
+      <p:par>
+        <p:cTn id="1" dur="indefinite" restart="never" nodeType="tmRoot"/>
+      </p:par>
+    </p:tnLst>
+  </p:timing>
 </p:sld>
 </file>
 
@@ -14212,7 +14319,7 @@
                 <a16:creationId xmlns:a16="http://schemas.microsoft.com/office/drawing/2014/main" id="{9CC67894-1D18-43E0-B8E1-ECF37EB0D4B5}"/>
               </a:ext>
               <a:ext uri="{C183D7F6-B498-43B3-948B-1728B52AA6E4}">
-                <adec:decorative xmlns:adec="http://schemas.microsoft.com/office/drawing/2017/decorative" val="1"/>
+                <adec:decorative xmlns:adec="http://schemas.microsoft.com/office/drawing/2017/decorative" xmlns="" val="1"/>
               </a:ext>
             </a:extLst>
           </p:cNvPr>
@@ -14301,7 +14408,7 @@
                 <a16:creationId xmlns:a16="http://schemas.microsoft.com/office/drawing/2014/main" id="{A13E3398-4840-4DA1-B674-51AE569B24F9}"/>
               </a:ext>
               <a:ext uri="{C183D7F6-B498-43B3-948B-1728B52AA6E4}">
-                <adec:decorative xmlns:adec="http://schemas.microsoft.com/office/drawing/2017/decorative" val="1"/>
+                <adec:decorative xmlns:adec="http://schemas.microsoft.com/office/drawing/2017/decorative" xmlns="" val="1"/>
               </a:ext>
             </a:extLst>
           </p:cNvPr>
@@ -14485,7 +14592,7 @@
                 <a16:creationId xmlns:a16="http://schemas.microsoft.com/office/drawing/2014/main" id="{83306AB0-8BF5-43D5-B5E2-C53EA0783845}"/>
               </a:ext>
               <a:ext uri="{C183D7F6-B498-43B3-948B-1728B52AA6E4}">
-                <adec:decorative xmlns:adec="http://schemas.microsoft.com/office/drawing/2017/decorative" val="1"/>
+                <adec:decorative xmlns:adec="http://schemas.microsoft.com/office/drawing/2017/decorative" xmlns="" val="1"/>
               </a:ext>
             </a:extLst>
           </p:cNvPr>
@@ -14626,6 +14733,13 @@
   <p:clrMapOvr>
     <a:masterClrMapping/>
   </p:clrMapOvr>
+  <p:timing>
+    <p:tnLst>
+      <p:par>
+        <p:cTn id="1" dur="indefinite" restart="never" nodeType="tmRoot"/>
+      </p:par>
+    </p:tnLst>
+  </p:timing>
 </p:sld>
 </file>
 
@@ -14662,7 +14776,7 @@
                 <a16:creationId xmlns:a16="http://schemas.microsoft.com/office/drawing/2014/main" id="{9CC67894-1D18-43E0-B8E1-ECF37EB0D4B5}"/>
               </a:ext>
               <a:ext uri="{C183D7F6-B498-43B3-948B-1728B52AA6E4}">
-                <adec:decorative xmlns:adec="http://schemas.microsoft.com/office/drawing/2017/decorative" val="1"/>
+                <adec:decorative xmlns:adec="http://schemas.microsoft.com/office/drawing/2017/decorative" xmlns="" val="1"/>
               </a:ext>
             </a:extLst>
           </p:cNvPr>
@@ -14751,7 +14865,7 @@
                 <a16:creationId xmlns:a16="http://schemas.microsoft.com/office/drawing/2014/main" id="{A13E3398-4840-4DA1-B674-51AE569B24F9}"/>
               </a:ext>
               <a:ext uri="{C183D7F6-B498-43B3-948B-1728B52AA6E4}">
-                <adec:decorative xmlns:adec="http://schemas.microsoft.com/office/drawing/2017/decorative" val="1"/>
+                <adec:decorative xmlns:adec="http://schemas.microsoft.com/office/drawing/2017/decorative" xmlns="" val="1"/>
               </a:ext>
             </a:extLst>
           </p:cNvPr>
@@ -14935,7 +15049,7 @@
                 <a16:creationId xmlns:a16="http://schemas.microsoft.com/office/drawing/2014/main" id="{83306AB0-8BF5-43D5-B5E2-C53EA0783845}"/>
               </a:ext>
               <a:ext uri="{C183D7F6-B498-43B3-948B-1728B52AA6E4}">
-                <adec:decorative xmlns:adec="http://schemas.microsoft.com/office/drawing/2017/decorative" val="1"/>
+                <adec:decorative xmlns:adec="http://schemas.microsoft.com/office/drawing/2017/decorative" xmlns="" val="1"/>
               </a:ext>
             </a:extLst>
           </p:cNvPr>
@@ -15158,6 +15272,13 @@
   <p:clrMapOvr>
     <a:masterClrMapping/>
   </p:clrMapOvr>
+  <p:timing>
+    <p:tnLst>
+      <p:par>
+        <p:cTn id="1" dur="indefinite" restart="never" nodeType="tmRoot"/>
+      </p:par>
+    </p:tnLst>
+  </p:timing>
 </p:sld>
 </file>
 
@@ -15194,7 +15315,7 @@
                 <a16:creationId xmlns:a16="http://schemas.microsoft.com/office/drawing/2014/main" id="{9CC67894-1D18-43E0-B8E1-ECF37EB0D4B5}"/>
               </a:ext>
               <a:ext uri="{C183D7F6-B498-43B3-948B-1728B52AA6E4}">
-                <adec:decorative xmlns:adec="http://schemas.microsoft.com/office/drawing/2017/decorative" val="1"/>
+                <adec:decorative xmlns:adec="http://schemas.microsoft.com/office/drawing/2017/decorative" xmlns="" val="1"/>
               </a:ext>
             </a:extLst>
           </p:cNvPr>
@@ -15283,7 +15404,7 @@
                 <a16:creationId xmlns:a16="http://schemas.microsoft.com/office/drawing/2014/main" id="{A13E3398-4840-4DA1-B674-51AE569B24F9}"/>
               </a:ext>
               <a:ext uri="{C183D7F6-B498-43B3-948B-1728B52AA6E4}">
-                <adec:decorative xmlns:adec="http://schemas.microsoft.com/office/drawing/2017/decorative" val="1"/>
+                <adec:decorative xmlns:adec="http://schemas.microsoft.com/office/drawing/2017/decorative" xmlns="" val="1"/>
               </a:ext>
             </a:extLst>
           </p:cNvPr>
@@ -15467,7 +15588,7 @@
                 <a16:creationId xmlns:a16="http://schemas.microsoft.com/office/drawing/2014/main" id="{83306AB0-8BF5-43D5-B5E2-C53EA0783845}"/>
               </a:ext>
               <a:ext uri="{C183D7F6-B498-43B3-948B-1728B52AA6E4}">
-                <adec:decorative xmlns:adec="http://schemas.microsoft.com/office/drawing/2017/decorative" val="1"/>
+                <adec:decorative xmlns:adec="http://schemas.microsoft.com/office/drawing/2017/decorative" xmlns="" val="1"/>
               </a:ext>
             </a:extLst>
           </p:cNvPr>
@@ -15693,6 +15814,13 @@
   <p:clrMapOvr>
     <a:masterClrMapping/>
   </p:clrMapOvr>
+  <p:timing>
+    <p:tnLst>
+      <p:par>
+        <p:cTn id="1" dur="indefinite" restart="never" nodeType="tmRoot"/>
+      </p:par>
+    </p:tnLst>
+  </p:timing>
 </p:sld>
 </file>
 
@@ -15729,7 +15857,7 @@
                 <a16:creationId xmlns:a16="http://schemas.microsoft.com/office/drawing/2014/main" id="{9CC67894-1D18-43E0-B8E1-ECF37EB0D4B5}"/>
               </a:ext>
               <a:ext uri="{C183D7F6-B498-43B3-948B-1728B52AA6E4}">
-                <adec:decorative xmlns:adec="http://schemas.microsoft.com/office/drawing/2017/decorative" val="1"/>
+                <adec:decorative xmlns:adec="http://schemas.microsoft.com/office/drawing/2017/decorative" xmlns="" val="1"/>
               </a:ext>
             </a:extLst>
           </p:cNvPr>
@@ -15818,7 +15946,7 @@
                 <a16:creationId xmlns:a16="http://schemas.microsoft.com/office/drawing/2014/main" id="{A13E3398-4840-4DA1-B674-51AE569B24F9}"/>
               </a:ext>
               <a:ext uri="{C183D7F6-B498-43B3-948B-1728B52AA6E4}">
-                <adec:decorative xmlns:adec="http://schemas.microsoft.com/office/drawing/2017/decorative" val="1"/>
+                <adec:decorative xmlns:adec="http://schemas.microsoft.com/office/drawing/2017/decorative" xmlns="" val="1"/>
               </a:ext>
             </a:extLst>
           </p:cNvPr>
@@ -16002,7 +16130,7 @@
                 <a16:creationId xmlns:a16="http://schemas.microsoft.com/office/drawing/2014/main" id="{83306AB0-8BF5-43D5-B5E2-C53EA0783845}"/>
               </a:ext>
               <a:ext uri="{C183D7F6-B498-43B3-948B-1728B52AA6E4}">
-                <adec:decorative xmlns:adec="http://schemas.microsoft.com/office/drawing/2017/decorative" val="1"/>
+                <adec:decorative xmlns:adec="http://schemas.microsoft.com/office/drawing/2017/decorative" xmlns="" val="1"/>
               </a:ext>
             </a:extLst>
           </p:cNvPr>
@@ -16210,6 +16338,13 @@
   <p:clrMapOvr>
     <a:masterClrMapping/>
   </p:clrMapOvr>
+  <p:timing>
+    <p:tnLst>
+      <p:par>
+        <p:cTn id="1" dur="indefinite" restart="never" nodeType="tmRoot"/>
+      </p:par>
+    </p:tnLst>
+  </p:timing>
 </p:sld>
 </file>
 
@@ -16246,7 +16381,7 @@
                 <a16:creationId xmlns:a16="http://schemas.microsoft.com/office/drawing/2014/main" id="{9CC67894-1D18-43E0-B8E1-ECF37EB0D4B5}"/>
               </a:ext>
               <a:ext uri="{C183D7F6-B498-43B3-948B-1728B52AA6E4}">
-                <adec:decorative xmlns:adec="http://schemas.microsoft.com/office/drawing/2017/decorative" val="1"/>
+                <adec:decorative xmlns:adec="http://schemas.microsoft.com/office/drawing/2017/decorative" xmlns="" val="1"/>
               </a:ext>
             </a:extLst>
           </p:cNvPr>
@@ -16335,7 +16470,7 @@
                 <a16:creationId xmlns:a16="http://schemas.microsoft.com/office/drawing/2014/main" id="{A13E3398-4840-4DA1-B674-51AE569B24F9}"/>
               </a:ext>
               <a:ext uri="{C183D7F6-B498-43B3-948B-1728B52AA6E4}">
-                <adec:decorative xmlns:adec="http://schemas.microsoft.com/office/drawing/2017/decorative" val="1"/>
+                <adec:decorative xmlns:adec="http://schemas.microsoft.com/office/drawing/2017/decorative" xmlns="" val="1"/>
               </a:ext>
             </a:extLst>
           </p:cNvPr>
@@ -16519,7 +16654,7 @@
                 <a16:creationId xmlns:a16="http://schemas.microsoft.com/office/drawing/2014/main" id="{83306AB0-8BF5-43D5-B5E2-C53EA0783845}"/>
               </a:ext>
               <a:ext uri="{C183D7F6-B498-43B3-948B-1728B52AA6E4}">
-                <adec:decorative xmlns:adec="http://schemas.microsoft.com/office/drawing/2017/decorative" val="1"/>
+                <adec:decorative xmlns:adec="http://schemas.microsoft.com/office/drawing/2017/decorative" xmlns="" val="1"/>
               </a:ext>
             </a:extLst>
           </p:cNvPr>
@@ -16660,6 +16795,13 @@
   <p:clrMapOvr>
     <a:masterClrMapping/>
   </p:clrMapOvr>
+  <p:timing>
+    <p:tnLst>
+      <p:par>
+        <p:cTn id="1" dur="indefinite" restart="never" nodeType="tmRoot"/>
+      </p:par>
+    </p:tnLst>
+  </p:timing>
 </p:sld>
 </file>
 
@@ -16728,6 +16870,13 @@
   <p:clrMapOvr>
     <a:masterClrMapping/>
   </p:clrMapOvr>
+  <p:timing>
+    <p:tnLst>
+      <p:par>
+        <p:cTn id="1" dur="indefinite" restart="never" nodeType="tmRoot"/>
+      </p:par>
+    </p:tnLst>
+  </p:timing>
 </p:sld>
 </file>
 
@@ -16764,7 +16913,7 @@
                 <a16:creationId xmlns:a16="http://schemas.microsoft.com/office/drawing/2014/main" id="{9CC67894-1D18-43E0-B8E1-ECF37EB0D4B5}"/>
               </a:ext>
               <a:ext uri="{C183D7F6-B498-43B3-948B-1728B52AA6E4}">
-                <adec:decorative xmlns:adec="http://schemas.microsoft.com/office/drawing/2017/decorative" val="1"/>
+                <adec:decorative xmlns:adec="http://schemas.microsoft.com/office/drawing/2017/decorative" xmlns="" val="1"/>
               </a:ext>
             </a:extLst>
           </p:cNvPr>
@@ -16853,7 +17002,7 @@
                 <a16:creationId xmlns:a16="http://schemas.microsoft.com/office/drawing/2014/main" id="{A13E3398-4840-4DA1-B674-51AE569B24F9}"/>
               </a:ext>
               <a:ext uri="{C183D7F6-B498-43B3-948B-1728B52AA6E4}">
-                <adec:decorative xmlns:adec="http://schemas.microsoft.com/office/drawing/2017/decorative" val="1"/>
+                <adec:decorative xmlns:adec="http://schemas.microsoft.com/office/drawing/2017/decorative" xmlns="" val="1"/>
               </a:ext>
             </a:extLst>
           </p:cNvPr>
@@ -17037,7 +17186,7 @@
                 <a16:creationId xmlns:a16="http://schemas.microsoft.com/office/drawing/2014/main" id="{83306AB0-8BF5-43D5-B5E2-C53EA0783845}"/>
               </a:ext>
               <a:ext uri="{C183D7F6-B498-43B3-948B-1728B52AA6E4}">
-                <adec:decorative xmlns:adec="http://schemas.microsoft.com/office/drawing/2017/decorative" val="1"/>
+                <adec:decorative xmlns:adec="http://schemas.microsoft.com/office/drawing/2017/decorative" xmlns="" val="1"/>
               </a:ext>
             </a:extLst>
           </p:cNvPr>
@@ -17186,6 +17335,13 @@
   <p:clrMapOvr>
     <a:masterClrMapping/>
   </p:clrMapOvr>
+  <p:timing>
+    <p:tnLst>
+      <p:par>
+        <p:cTn id="1" dur="indefinite" restart="never" nodeType="tmRoot"/>
+      </p:par>
+    </p:tnLst>
+  </p:timing>
 </p:sld>
 </file>
 
@@ -17216,13 +17372,7 @@
       </p:grpSpPr>
       <p:pic>
         <p:nvPicPr>
-          <p:cNvPr id="6" name="Picture 5" descr="Diagram&#10;&#10;Description automatically generated">
-            <a:extLst>
-              <a:ext uri="{FF2B5EF4-FFF2-40B4-BE49-F238E27FC236}">
-                <a16:creationId xmlns:a16="http://schemas.microsoft.com/office/drawing/2014/main" id="{BEFF4551-8301-44B7-8FAC-0A5F258A7ED5}"/>
-              </a:ext>
-            </a:extLst>
-          </p:cNvPr>
+          <p:cNvPr id="2" name="Imagem 1"/>
           <p:cNvPicPr>
             <a:picLocks noChangeAspect="1"/>
           </p:cNvPicPr>
@@ -17242,8 +17392,8 @@
         </p:blipFill>
         <p:spPr>
           <a:xfrm>
-            <a:off x="2295331" y="-306"/>
-            <a:ext cx="7600999" cy="6858306"/>
+            <a:off x="1150237" y="0"/>
+            <a:ext cx="9891525" cy="6858000"/>
           </a:xfrm>
           <a:prstGeom prst="rect">
             <a:avLst/>
@@ -17260,6 +17410,13 @@
   <p:clrMapOvr>
     <a:masterClrMapping/>
   </p:clrMapOvr>
+  <p:timing>
+    <p:tnLst>
+      <p:par>
+        <p:cTn id="1" dur="indefinite" restart="never" nodeType="tmRoot"/>
+      </p:par>
+    </p:tnLst>
+  </p:timing>
 </p:sld>
 </file>
 
@@ -17296,7 +17453,7 @@
                 <a16:creationId xmlns:a16="http://schemas.microsoft.com/office/drawing/2014/main" id="{9CC67894-1D18-43E0-B8E1-ECF37EB0D4B5}"/>
               </a:ext>
               <a:ext uri="{C183D7F6-B498-43B3-948B-1728B52AA6E4}">
-                <adec:decorative xmlns:adec="http://schemas.microsoft.com/office/drawing/2017/decorative" val="1"/>
+                <adec:decorative xmlns:adec="http://schemas.microsoft.com/office/drawing/2017/decorative" xmlns="" val="1"/>
               </a:ext>
             </a:extLst>
           </p:cNvPr>
@@ -17385,7 +17542,7 @@
                 <a16:creationId xmlns:a16="http://schemas.microsoft.com/office/drawing/2014/main" id="{A13E3398-4840-4DA1-B674-51AE569B24F9}"/>
               </a:ext>
               <a:ext uri="{C183D7F6-B498-43B3-948B-1728B52AA6E4}">
-                <adec:decorative xmlns:adec="http://schemas.microsoft.com/office/drawing/2017/decorative" val="1"/>
+                <adec:decorative xmlns:adec="http://schemas.microsoft.com/office/drawing/2017/decorative" xmlns="" val="1"/>
               </a:ext>
             </a:extLst>
           </p:cNvPr>
@@ -17569,7 +17726,7 @@
                 <a16:creationId xmlns:a16="http://schemas.microsoft.com/office/drawing/2014/main" id="{83306AB0-8BF5-43D5-B5E2-C53EA0783845}"/>
               </a:ext>
               <a:ext uri="{C183D7F6-B498-43B3-948B-1728B52AA6E4}">
-                <adec:decorative xmlns:adec="http://schemas.microsoft.com/office/drawing/2017/decorative" val="1"/>
+                <adec:decorative xmlns:adec="http://schemas.microsoft.com/office/drawing/2017/decorative" xmlns="" val="1"/>
               </a:ext>
             </a:extLst>
           </p:cNvPr>
@@ -17703,7 +17860,15 @@
                   <a:srgbClr val="FFFFFF"/>
                 </a:solidFill>
               </a:rPr>
-              <a:t>ACESSAR MÓDULO TESTE</a:t>
+              <a:t>ACESSAR MÓDULO </a:t>
+            </a:r>
+            <a:r>
+              <a:rPr lang="pt-BR" sz="5000" dirty="0" smtClean="0">
+                <a:solidFill>
+                  <a:srgbClr val="FFFFFF"/>
+                </a:solidFill>
+              </a:rPr>
+              <a:t>TESTE DE CONHECIMENTO</a:t>
             </a:r>
           </a:p>
         </p:txBody>
@@ -17718,6 +17883,13 @@
   <p:clrMapOvr>
     <a:masterClrMapping/>
   </p:clrMapOvr>
+  <p:timing>
+    <p:tnLst>
+      <p:par>
+        <p:cTn id="1" dur="indefinite" restart="never" nodeType="tmRoot"/>
+      </p:par>
+    </p:tnLst>
+  </p:timing>
 </p:sld>
 </file>
 
@@ -17740,13 +17912,7 @@
       </p:grpSpPr>
       <p:pic>
         <p:nvPicPr>
-          <p:cNvPr id="4" name="Picture 3" descr="Diagram&#10;&#10;Description automatically generated">
-            <a:extLst>
-              <a:ext uri="{FF2B5EF4-FFF2-40B4-BE49-F238E27FC236}">
-                <a16:creationId xmlns:a16="http://schemas.microsoft.com/office/drawing/2014/main" id="{7353AD13-5160-3455-46C9-50EB800E1079}"/>
-              </a:ext>
-            </a:extLst>
-          </p:cNvPr>
+          <p:cNvPr id="2" name="Imagem 1"/>
           <p:cNvPicPr>
             <a:picLocks noChangeAspect="1"/>
           </p:cNvPicPr>
@@ -17766,8 +17932,8 @@
         </p:blipFill>
         <p:spPr>
           <a:xfrm>
-            <a:off x="1091514" y="0"/>
-            <a:ext cx="10008973" cy="6858000"/>
+            <a:off x="972946" y="0"/>
+            <a:ext cx="10246110" cy="6858000"/>
           </a:xfrm>
           <a:prstGeom prst="rect">
             <a:avLst/>
@@ -17820,7 +17986,7 @@
                 <a16:creationId xmlns:a16="http://schemas.microsoft.com/office/drawing/2014/main" id="{9CC67894-1D18-43E0-B8E1-ECF37EB0D4B5}"/>
               </a:ext>
               <a:ext uri="{C183D7F6-B498-43B3-948B-1728B52AA6E4}">
-                <adec:decorative xmlns:adec="http://schemas.microsoft.com/office/drawing/2017/decorative" val="1"/>
+                <adec:decorative xmlns:adec="http://schemas.microsoft.com/office/drawing/2017/decorative" xmlns="" val="1"/>
               </a:ext>
             </a:extLst>
           </p:cNvPr>
@@ -17909,7 +18075,7 @@
                 <a16:creationId xmlns:a16="http://schemas.microsoft.com/office/drawing/2014/main" id="{A13E3398-4840-4DA1-B674-51AE569B24F9}"/>
               </a:ext>
               <a:ext uri="{C183D7F6-B498-43B3-948B-1728B52AA6E4}">
-                <adec:decorative xmlns:adec="http://schemas.microsoft.com/office/drawing/2017/decorative" val="1"/>
+                <adec:decorative xmlns:adec="http://schemas.microsoft.com/office/drawing/2017/decorative" xmlns="" val="1"/>
               </a:ext>
             </a:extLst>
           </p:cNvPr>
@@ -18093,7 +18259,7 @@
                 <a16:creationId xmlns:a16="http://schemas.microsoft.com/office/drawing/2014/main" id="{83306AB0-8BF5-43D5-B5E2-C53EA0783845}"/>
               </a:ext>
               <a:ext uri="{C183D7F6-B498-43B3-948B-1728B52AA6E4}">
-                <adec:decorative xmlns:adec="http://schemas.microsoft.com/office/drawing/2017/decorative" val="1"/>
+                <adec:decorative xmlns:adec="http://schemas.microsoft.com/office/drawing/2017/decorative" xmlns="" val="1"/>
               </a:ext>
             </a:extLst>
           </p:cNvPr>
@@ -18278,7 +18444,7 @@
                 <a16:creationId xmlns:a16="http://schemas.microsoft.com/office/drawing/2014/main" id="{9CC67894-1D18-43E0-B8E1-ECF37EB0D4B5}"/>
               </a:ext>
               <a:ext uri="{C183D7F6-B498-43B3-948B-1728B52AA6E4}">
-                <adec:decorative xmlns:adec="http://schemas.microsoft.com/office/drawing/2017/decorative" val="1"/>
+                <adec:decorative xmlns:adec="http://schemas.microsoft.com/office/drawing/2017/decorative" xmlns="" val="1"/>
               </a:ext>
             </a:extLst>
           </p:cNvPr>
@@ -18367,7 +18533,7 @@
                 <a16:creationId xmlns:a16="http://schemas.microsoft.com/office/drawing/2014/main" id="{A13E3398-4840-4DA1-B674-51AE569B24F9}"/>
               </a:ext>
               <a:ext uri="{C183D7F6-B498-43B3-948B-1728B52AA6E4}">
-                <adec:decorative xmlns:adec="http://schemas.microsoft.com/office/drawing/2017/decorative" val="1"/>
+                <adec:decorative xmlns:adec="http://schemas.microsoft.com/office/drawing/2017/decorative" xmlns="" val="1"/>
               </a:ext>
             </a:extLst>
           </p:cNvPr>
@@ -18551,7 +18717,7 @@
                 <a16:creationId xmlns:a16="http://schemas.microsoft.com/office/drawing/2014/main" id="{83306AB0-8BF5-43D5-B5E2-C53EA0783845}"/>
               </a:ext>
               <a:ext uri="{C183D7F6-B498-43B3-948B-1728B52AA6E4}">
-                <adec:decorative xmlns:adec="http://schemas.microsoft.com/office/drawing/2017/decorative" val="1"/>
+                <adec:decorative xmlns:adec="http://schemas.microsoft.com/office/drawing/2017/decorative" xmlns="" val="1"/>
               </a:ext>
             </a:extLst>
           </p:cNvPr>
@@ -18705,6 +18871,13 @@
   <p:clrMapOvr>
     <a:masterClrMapping/>
   </p:clrMapOvr>
+  <p:timing>
+    <p:tnLst>
+      <p:par>
+        <p:cTn id="1" dur="indefinite" restart="never" nodeType="tmRoot"/>
+      </p:par>
+    </p:tnLst>
+  </p:timing>
 </p:sld>
 </file>
 
@@ -18727,13 +18900,7 @@
       </p:grpSpPr>
       <p:pic>
         <p:nvPicPr>
-          <p:cNvPr id="4" name="Picture 3" descr="Diagram&#10;&#10;Description automatically generated">
-            <a:extLst>
-              <a:ext uri="{FF2B5EF4-FFF2-40B4-BE49-F238E27FC236}">
-                <a16:creationId xmlns:a16="http://schemas.microsoft.com/office/drawing/2014/main" id="{DA057E5B-5482-40C1-33D4-0F2DEFA3C2CE}"/>
-              </a:ext>
-            </a:extLst>
-          </p:cNvPr>
+          <p:cNvPr id="2" name="Imagem 1"/>
           <p:cNvPicPr>
             <a:picLocks noChangeAspect="1"/>
           </p:cNvPicPr>
@@ -18753,8 +18920,8 @@
         </p:blipFill>
         <p:spPr>
           <a:xfrm>
-            <a:off x="1159808" y="0"/>
-            <a:ext cx="9872383" cy="6858000"/>
+            <a:off x="1084057" y="0"/>
+            <a:ext cx="10298205" cy="6858000"/>
           </a:xfrm>
           <a:prstGeom prst="rect">
             <a:avLst/>
@@ -18807,7 +18974,7 @@
                 <a16:creationId xmlns:a16="http://schemas.microsoft.com/office/drawing/2014/main" id="{9CC67894-1D18-43E0-B8E1-ECF37EB0D4B5}"/>
               </a:ext>
               <a:ext uri="{C183D7F6-B498-43B3-948B-1728B52AA6E4}">
-                <adec:decorative xmlns:adec="http://schemas.microsoft.com/office/drawing/2017/decorative" val="1"/>
+                <adec:decorative xmlns:adec="http://schemas.microsoft.com/office/drawing/2017/decorative" xmlns="" val="1"/>
               </a:ext>
             </a:extLst>
           </p:cNvPr>
@@ -18896,7 +19063,7 @@
                 <a16:creationId xmlns:a16="http://schemas.microsoft.com/office/drawing/2014/main" id="{A13E3398-4840-4DA1-B674-51AE569B24F9}"/>
               </a:ext>
               <a:ext uri="{C183D7F6-B498-43B3-948B-1728B52AA6E4}">
-                <adec:decorative xmlns:adec="http://schemas.microsoft.com/office/drawing/2017/decorative" val="1"/>
+                <adec:decorative xmlns:adec="http://schemas.microsoft.com/office/drawing/2017/decorative" xmlns="" val="1"/>
               </a:ext>
             </a:extLst>
           </p:cNvPr>
@@ -19080,7 +19247,7 @@
                 <a16:creationId xmlns:a16="http://schemas.microsoft.com/office/drawing/2014/main" id="{83306AB0-8BF5-43D5-B5E2-C53EA0783845}"/>
               </a:ext>
               <a:ext uri="{C183D7F6-B498-43B3-948B-1728B52AA6E4}">
-                <adec:decorative xmlns:adec="http://schemas.microsoft.com/office/drawing/2017/decorative" val="1"/>
+                <adec:decorative xmlns:adec="http://schemas.microsoft.com/office/drawing/2017/decorative" xmlns="" val="1"/>
               </a:ext>
             </a:extLst>
           </p:cNvPr>
@@ -19214,8 +19381,21 @@
                   <a:srgbClr val="FFFFFF"/>
                 </a:solidFill>
               </a:rPr>
-              <a:t>ACESSAR MÓDULO APOIADOR</a:t>
-            </a:r>
+              <a:t>ACESSAR MÓDULO </a:t>
+            </a:r>
+            <a:r>
+              <a:rPr lang="pt-BR" sz="5000" dirty="0" smtClean="0">
+                <a:solidFill>
+                  <a:srgbClr val="FFFFFF"/>
+                </a:solidFill>
+              </a:rPr>
+              <a:t>DOAÇÃO</a:t>
+            </a:r>
+            <a:endParaRPr lang="pt-BR" sz="5000" dirty="0">
+              <a:solidFill>
+                <a:srgbClr val="FFFFFF"/>
+              </a:solidFill>
+            </a:endParaRPr>
           </a:p>
         </p:txBody>
       </p:sp>
@@ -19251,13 +19431,7 @@
       </p:grpSpPr>
       <p:pic>
         <p:nvPicPr>
-          <p:cNvPr id="4" name="Picture 3" descr="Diagram&#10;&#10;Description automatically generated">
-            <a:extLst>
-              <a:ext uri="{FF2B5EF4-FFF2-40B4-BE49-F238E27FC236}">
-                <a16:creationId xmlns:a16="http://schemas.microsoft.com/office/drawing/2014/main" id="{CCCCDFE7-17CC-B701-19BA-B31C0F0F293A}"/>
-              </a:ext>
-            </a:extLst>
-          </p:cNvPr>
+          <p:cNvPr id="3" name="Imagem 2"/>
           <p:cNvPicPr>
             <a:picLocks noChangeAspect="1"/>
           </p:cNvPicPr>
@@ -19277,8 +19451,8 @@
         </p:blipFill>
         <p:spPr>
           <a:xfrm>
-            <a:off x="1697420" y="0"/>
-            <a:ext cx="8797159" cy="6858000"/>
+            <a:off x="1541351" y="0"/>
+            <a:ext cx="9109297" cy="6858000"/>
           </a:xfrm>
           <a:prstGeom prst="rect">
             <a:avLst/>
@@ -19331,7 +19505,7 @@
                 <a16:creationId xmlns:a16="http://schemas.microsoft.com/office/drawing/2014/main" id="{9CC67894-1D18-43E0-B8E1-ECF37EB0D4B5}"/>
               </a:ext>
               <a:ext uri="{C183D7F6-B498-43B3-948B-1728B52AA6E4}">
-                <adec:decorative xmlns:adec="http://schemas.microsoft.com/office/drawing/2017/decorative" val="1"/>
+                <adec:decorative xmlns:adec="http://schemas.microsoft.com/office/drawing/2017/decorative" xmlns="" val="1"/>
               </a:ext>
             </a:extLst>
           </p:cNvPr>
@@ -19420,7 +19594,7 @@
                 <a16:creationId xmlns:a16="http://schemas.microsoft.com/office/drawing/2014/main" id="{A13E3398-4840-4DA1-B674-51AE569B24F9}"/>
               </a:ext>
               <a:ext uri="{C183D7F6-B498-43B3-948B-1728B52AA6E4}">
-                <adec:decorative xmlns:adec="http://schemas.microsoft.com/office/drawing/2017/decorative" val="1"/>
+                <adec:decorative xmlns:adec="http://schemas.microsoft.com/office/drawing/2017/decorative" xmlns="" val="1"/>
               </a:ext>
             </a:extLst>
           </p:cNvPr>
@@ -19604,7 +19778,7 @@
                 <a16:creationId xmlns:a16="http://schemas.microsoft.com/office/drawing/2014/main" id="{83306AB0-8BF5-43D5-B5E2-C53EA0783845}"/>
               </a:ext>
               <a:ext uri="{C183D7F6-B498-43B3-948B-1728B52AA6E4}">
-                <adec:decorative xmlns:adec="http://schemas.microsoft.com/office/drawing/2017/decorative" val="1"/>
+                <adec:decorative xmlns:adec="http://schemas.microsoft.com/office/drawing/2017/decorative" xmlns="" val="1"/>
               </a:ext>
             </a:extLst>
           </p:cNvPr>
@@ -19775,13 +19949,7 @@
       </p:grpSpPr>
       <p:pic>
         <p:nvPicPr>
-          <p:cNvPr id="4" name="Picture 3" descr="Diagram&#10;&#10;Description automatically generated">
-            <a:extLst>
-              <a:ext uri="{FF2B5EF4-FFF2-40B4-BE49-F238E27FC236}">
-                <a16:creationId xmlns:a16="http://schemas.microsoft.com/office/drawing/2014/main" id="{09FD67BA-440F-0FC0-BAF9-53B8FBA74E90}"/>
-              </a:ext>
-            </a:extLst>
-          </p:cNvPr>
+          <p:cNvPr id="2" name="Imagem 1"/>
           <p:cNvPicPr>
             <a:picLocks noChangeAspect="1"/>
           </p:cNvPicPr>
@@ -19801,8 +19969,8 @@
         </p:blipFill>
         <p:spPr>
           <a:xfrm>
-            <a:off x="1529602" y="0"/>
-            <a:ext cx="9132795" cy="6858000"/>
+            <a:off x="1475730" y="23337"/>
+            <a:ext cx="9240540" cy="6811326"/>
           </a:xfrm>
           <a:prstGeom prst="rect">
             <a:avLst/>
@@ -19855,7 +20023,7 @@
                 <a16:creationId xmlns:a16="http://schemas.microsoft.com/office/drawing/2014/main" id="{9CC67894-1D18-43E0-B8E1-ECF37EB0D4B5}"/>
               </a:ext>
               <a:ext uri="{C183D7F6-B498-43B3-948B-1728B52AA6E4}">
-                <adec:decorative xmlns:adec="http://schemas.microsoft.com/office/drawing/2017/decorative" val="1"/>
+                <adec:decorative xmlns:adec="http://schemas.microsoft.com/office/drawing/2017/decorative" xmlns="" val="1"/>
               </a:ext>
             </a:extLst>
           </p:cNvPr>
@@ -19944,7 +20112,7 @@
                 <a16:creationId xmlns:a16="http://schemas.microsoft.com/office/drawing/2014/main" id="{A13E3398-4840-4DA1-B674-51AE569B24F9}"/>
               </a:ext>
               <a:ext uri="{C183D7F6-B498-43B3-948B-1728B52AA6E4}">
-                <adec:decorative xmlns:adec="http://schemas.microsoft.com/office/drawing/2017/decorative" val="1"/>
+                <adec:decorative xmlns:adec="http://schemas.microsoft.com/office/drawing/2017/decorative" xmlns="" val="1"/>
               </a:ext>
             </a:extLst>
           </p:cNvPr>
@@ -20128,7 +20296,7 @@
                 <a16:creationId xmlns:a16="http://schemas.microsoft.com/office/drawing/2014/main" id="{83306AB0-8BF5-43D5-B5E2-C53EA0783845}"/>
               </a:ext>
               <a:ext uri="{C183D7F6-B498-43B3-948B-1728B52AA6E4}">
-                <adec:decorative xmlns:adec="http://schemas.microsoft.com/office/drawing/2017/decorative" val="1"/>
+                <adec:decorative xmlns:adec="http://schemas.microsoft.com/office/drawing/2017/decorative" xmlns="" val="1"/>
               </a:ext>
             </a:extLst>
           </p:cNvPr>
@@ -20299,13 +20467,7 @@
       </p:grpSpPr>
       <p:pic>
         <p:nvPicPr>
-          <p:cNvPr id="5" name="Picture 4" descr="Diagram&#10;&#10;Description automatically generated">
-            <a:extLst>
-              <a:ext uri="{FF2B5EF4-FFF2-40B4-BE49-F238E27FC236}">
-                <a16:creationId xmlns:a16="http://schemas.microsoft.com/office/drawing/2014/main" id="{5C673942-97CE-C590-7489-660F296025E4}"/>
-              </a:ext>
-            </a:extLst>
-          </p:cNvPr>
+          <p:cNvPr id="2" name="Imagem 1"/>
           <p:cNvPicPr>
             <a:picLocks noChangeAspect="1"/>
           </p:cNvPicPr>
@@ -20379,7 +20541,7 @@
                 <a16:creationId xmlns:a16="http://schemas.microsoft.com/office/drawing/2014/main" id="{9CC67894-1D18-43E0-B8E1-ECF37EB0D4B5}"/>
               </a:ext>
               <a:ext uri="{C183D7F6-B498-43B3-948B-1728B52AA6E4}">
-                <adec:decorative xmlns:adec="http://schemas.microsoft.com/office/drawing/2017/decorative" val="1"/>
+                <adec:decorative xmlns:adec="http://schemas.microsoft.com/office/drawing/2017/decorative" xmlns="" val="1"/>
               </a:ext>
             </a:extLst>
           </p:cNvPr>
@@ -20468,7 +20630,7 @@
                 <a16:creationId xmlns:a16="http://schemas.microsoft.com/office/drawing/2014/main" id="{A13E3398-4840-4DA1-B674-51AE569B24F9}"/>
               </a:ext>
               <a:ext uri="{C183D7F6-B498-43B3-948B-1728B52AA6E4}">
-                <adec:decorative xmlns:adec="http://schemas.microsoft.com/office/drawing/2017/decorative" val="1"/>
+                <adec:decorative xmlns:adec="http://schemas.microsoft.com/office/drawing/2017/decorative" xmlns="" val="1"/>
               </a:ext>
             </a:extLst>
           </p:cNvPr>
@@ -20652,7 +20814,7 @@
                 <a16:creationId xmlns:a16="http://schemas.microsoft.com/office/drawing/2014/main" id="{83306AB0-8BF5-43D5-B5E2-C53EA0783845}"/>
               </a:ext>
               <a:ext uri="{C183D7F6-B498-43B3-948B-1728B52AA6E4}">
-                <adec:decorative xmlns:adec="http://schemas.microsoft.com/office/drawing/2017/decorative" val="1"/>
+                <adec:decorative xmlns:adec="http://schemas.microsoft.com/office/drawing/2017/decorative" xmlns="" val="1"/>
               </a:ext>
             </a:extLst>
           </p:cNvPr>
@@ -20773,7 +20935,7 @@
                   <a:srgbClr val="FFFFFF"/>
                 </a:solidFill>
               </a:rPr>
-              <a:t>DIAGRAMA DE CLASSE</a:t>
+              <a:t>CASOS DE USO</a:t>
             </a:r>
           </a:p>
           <a:p>
@@ -20781,20 +20943,38 @@
               <a:buNone/>
             </a:pPr>
             <a:r>
-              <a:rPr lang="pt-BR" sz="5000" dirty="0">
+              <a:rPr lang="pt-BR" sz="5000" dirty="0" smtClean="0">
                 <a:solidFill>
                   <a:srgbClr val="FFFFFF"/>
                 </a:solidFill>
               </a:rPr>
-              <a:t>ENTIDADES</a:t>
-            </a:r>
+              <a:t>ACESSO AO MÓDULO </a:t>
+            </a:r>
+          </a:p>
+          <a:p>
+            <a:pPr marL="0" indent="0" algn="ctr">
+              <a:buNone/>
+            </a:pPr>
+            <a:r>
+              <a:rPr lang="pt-BR" sz="5000" dirty="0" smtClean="0">
+                <a:solidFill>
+                  <a:srgbClr val="FFFFFF"/>
+                </a:solidFill>
+              </a:rPr>
+              <a:t>FALE CONOSCO</a:t>
+            </a:r>
+            <a:endParaRPr lang="pt-BR" sz="5000" dirty="0">
+              <a:solidFill>
+                <a:srgbClr val="FFFFFF"/>
+              </a:solidFill>
+            </a:endParaRPr>
           </a:p>
         </p:txBody>
       </p:sp>
     </p:spTree>
     <p:extLst>
       <p:ext uri="{BB962C8B-B14F-4D97-AF65-F5344CB8AC3E}">
-        <p14:creationId xmlns:p14="http://schemas.microsoft.com/office/powerpoint/2010/main" val="1576130580"/>
+        <p14:creationId xmlns:p14="http://schemas.microsoft.com/office/powerpoint/2010/main" val="3459608327"/>
       </p:ext>
     </p:extLst>
   </p:cSld>
@@ -20823,13 +21003,7 @@
       </p:grpSpPr>
       <p:pic>
         <p:nvPicPr>
-          <p:cNvPr id="5" name="Picture 4" descr="Diagram&#10;&#10;Description automatically generated">
-            <a:extLst>
-              <a:ext uri="{FF2B5EF4-FFF2-40B4-BE49-F238E27FC236}">
-                <a16:creationId xmlns:a16="http://schemas.microsoft.com/office/drawing/2014/main" id="{3DE754C0-FDEB-9F84-0267-87E8AEC19BE3}"/>
-              </a:ext>
-            </a:extLst>
-          </p:cNvPr>
+          <p:cNvPr id="3" name="Imagem 2"/>
           <p:cNvPicPr>
             <a:picLocks noChangeAspect="1"/>
           </p:cNvPicPr>
@@ -20849,8 +21023,8 @@
         </p:blipFill>
         <p:spPr>
           <a:xfrm>
-            <a:off x="2245479" y="0"/>
-            <a:ext cx="7701041" cy="6858000"/>
+            <a:off x="1100488" y="0"/>
+            <a:ext cx="9991024" cy="6858000"/>
           </a:xfrm>
           <a:prstGeom prst="rect">
             <a:avLst/>
@@ -20860,7 +21034,7 @@
     </p:spTree>
     <p:extLst>
       <p:ext uri="{BB962C8B-B14F-4D97-AF65-F5344CB8AC3E}">
-        <p14:creationId xmlns:p14="http://schemas.microsoft.com/office/powerpoint/2010/main" val="3773046818"/>
+        <p14:creationId xmlns:p14="http://schemas.microsoft.com/office/powerpoint/2010/main" val="2217779308"/>
       </p:ext>
     </p:extLst>
   </p:cSld>
@@ -20903,7 +21077,7 @@
                 <a16:creationId xmlns:a16="http://schemas.microsoft.com/office/drawing/2014/main" id="{9CC67894-1D18-43E0-B8E1-ECF37EB0D4B5}"/>
               </a:ext>
               <a:ext uri="{C183D7F6-B498-43B3-948B-1728B52AA6E4}">
-                <adec:decorative xmlns:adec="http://schemas.microsoft.com/office/drawing/2017/decorative" val="1"/>
+                <adec:decorative xmlns:adec="http://schemas.microsoft.com/office/drawing/2017/decorative" xmlns="" val="1"/>
               </a:ext>
             </a:extLst>
           </p:cNvPr>
@@ -20992,7 +21166,7 @@
                 <a16:creationId xmlns:a16="http://schemas.microsoft.com/office/drawing/2014/main" id="{A13E3398-4840-4DA1-B674-51AE569B24F9}"/>
               </a:ext>
               <a:ext uri="{C183D7F6-B498-43B3-948B-1728B52AA6E4}">
-                <adec:decorative xmlns:adec="http://schemas.microsoft.com/office/drawing/2017/decorative" val="1"/>
+                <adec:decorative xmlns:adec="http://schemas.microsoft.com/office/drawing/2017/decorative" xmlns="" val="1"/>
               </a:ext>
             </a:extLst>
           </p:cNvPr>
@@ -21176,7 +21350,7 @@
                 <a16:creationId xmlns:a16="http://schemas.microsoft.com/office/drawing/2014/main" id="{83306AB0-8BF5-43D5-B5E2-C53EA0783845}"/>
               </a:ext>
               <a:ext uri="{C183D7F6-B498-43B3-948B-1728B52AA6E4}">
-                <adec:decorative xmlns:adec="http://schemas.microsoft.com/office/drawing/2017/decorative" val="1"/>
+                <adec:decorative xmlns:adec="http://schemas.microsoft.com/office/drawing/2017/decorative" xmlns="" val="1"/>
               </a:ext>
             </a:extLst>
           </p:cNvPr>
@@ -21297,7 +21471,7 @@
                   <a:srgbClr val="FFFFFF"/>
                 </a:solidFill>
               </a:rPr>
-              <a:t>DIAGRAMA DE PACOTE</a:t>
+              <a:t>DIAGRAMA DE CLASSE</a:t>
             </a:r>
           </a:p>
           <a:p>
@@ -21310,7 +21484,7 @@
                   <a:srgbClr val="FFFFFF"/>
                 </a:solidFill>
               </a:rPr>
-              <a:t>VISÃO ESTRUTURAL</a:t>
+              <a:t>ENTIDADES</a:t>
             </a:r>
           </a:p>
         </p:txBody>
@@ -21318,7 +21492,7 @@
     </p:spTree>
     <p:extLst>
       <p:ext uri="{BB962C8B-B14F-4D97-AF65-F5344CB8AC3E}">
-        <p14:creationId xmlns:p14="http://schemas.microsoft.com/office/powerpoint/2010/main" val="3562256947"/>
+        <p14:creationId xmlns:p14="http://schemas.microsoft.com/office/powerpoint/2010/main" val="1576130580"/>
       </p:ext>
     </p:extLst>
   </p:cSld>
@@ -21361,7 +21535,7 @@
                 <a16:creationId xmlns:a16="http://schemas.microsoft.com/office/drawing/2014/main" id="{9CC67894-1D18-43E0-B8E1-ECF37EB0D4B5}"/>
               </a:ext>
               <a:ext uri="{C183D7F6-B498-43B3-948B-1728B52AA6E4}">
-                <adec:decorative xmlns:adec="http://schemas.microsoft.com/office/drawing/2017/decorative" val="1"/>
+                <adec:decorative xmlns:adec="http://schemas.microsoft.com/office/drawing/2017/decorative" xmlns="" val="1"/>
               </a:ext>
             </a:extLst>
           </p:cNvPr>
@@ -21450,7 +21624,7 @@
                 <a16:creationId xmlns:a16="http://schemas.microsoft.com/office/drawing/2014/main" id="{A13E3398-4840-4DA1-B674-51AE569B24F9}"/>
               </a:ext>
               <a:ext uri="{C183D7F6-B498-43B3-948B-1728B52AA6E4}">
-                <adec:decorative xmlns:adec="http://schemas.microsoft.com/office/drawing/2017/decorative" val="1"/>
+                <adec:decorative xmlns:adec="http://schemas.microsoft.com/office/drawing/2017/decorative" xmlns="" val="1"/>
               </a:ext>
             </a:extLst>
           </p:cNvPr>
@@ -21634,7 +21808,7 @@
                 <a16:creationId xmlns:a16="http://schemas.microsoft.com/office/drawing/2014/main" id="{83306AB0-8BF5-43D5-B5E2-C53EA0783845}"/>
               </a:ext>
               <a:ext uri="{C183D7F6-B498-43B3-948B-1728B52AA6E4}">
-                <adec:decorative xmlns:adec="http://schemas.microsoft.com/office/drawing/2017/decorative" val="1"/>
+                <adec:decorative xmlns:adec="http://schemas.microsoft.com/office/drawing/2017/decorative" xmlns="" val="1"/>
               </a:ext>
             </a:extLst>
           </p:cNvPr>
@@ -21788,6 +21962,13 @@
   <p:clrMapOvr>
     <a:masterClrMapping/>
   </p:clrMapOvr>
+  <p:timing>
+    <p:tnLst>
+      <p:par>
+        <p:cTn id="1" dur="indefinite" restart="never" nodeType="tmRoot"/>
+      </p:par>
+    </p:tnLst>
+  </p:timing>
 </p:sld>
 </file>
 
@@ -21813,7 +21994,7 @@
           <p:cNvPr id="5" name="Picture 4" descr="Diagram&#10;&#10;Description automatically generated">
             <a:extLst>
               <a:ext uri="{FF2B5EF4-FFF2-40B4-BE49-F238E27FC236}">
-                <a16:creationId xmlns:a16="http://schemas.microsoft.com/office/drawing/2014/main" id="{CDAD05D9-5FFE-98AA-ECF5-324743D740B9}"/>
+                <a16:creationId xmlns:a16="http://schemas.microsoft.com/office/drawing/2014/main" id="{3DE754C0-FDEB-9F84-0267-87E8AEC19BE3}"/>
               </a:ext>
             </a:extLst>
           </p:cNvPr>
@@ -21836,8 +22017,8 @@
         </p:blipFill>
         <p:spPr>
           <a:xfrm>
-            <a:off x="1409046" y="694943"/>
-            <a:ext cx="9373908" cy="5468113"/>
+            <a:off x="2245479" y="0"/>
+            <a:ext cx="7701041" cy="6858000"/>
           </a:xfrm>
           <a:prstGeom prst="rect">
             <a:avLst/>
@@ -21847,7 +22028,7 @@
     </p:spTree>
     <p:extLst>
       <p:ext uri="{BB962C8B-B14F-4D97-AF65-F5344CB8AC3E}">
-        <p14:creationId xmlns:p14="http://schemas.microsoft.com/office/powerpoint/2010/main" val="678261811"/>
+        <p14:creationId xmlns:p14="http://schemas.microsoft.com/office/powerpoint/2010/main" val="3773046818"/>
       </p:ext>
     </p:extLst>
   </p:cSld>
@@ -21890,7 +22071,7 @@
                 <a16:creationId xmlns:a16="http://schemas.microsoft.com/office/drawing/2014/main" id="{9CC67894-1D18-43E0-B8E1-ECF37EB0D4B5}"/>
               </a:ext>
               <a:ext uri="{C183D7F6-B498-43B3-948B-1728B52AA6E4}">
-                <adec:decorative xmlns:adec="http://schemas.microsoft.com/office/drawing/2017/decorative" val="1"/>
+                <adec:decorative xmlns:adec="http://schemas.microsoft.com/office/drawing/2017/decorative" xmlns="" val="1"/>
               </a:ext>
             </a:extLst>
           </p:cNvPr>
@@ -21979,7 +22160,7 @@
                 <a16:creationId xmlns:a16="http://schemas.microsoft.com/office/drawing/2014/main" id="{A13E3398-4840-4DA1-B674-51AE569B24F9}"/>
               </a:ext>
               <a:ext uri="{C183D7F6-B498-43B3-948B-1728B52AA6E4}">
-                <adec:decorative xmlns:adec="http://schemas.microsoft.com/office/drawing/2017/decorative" val="1"/>
+                <adec:decorative xmlns:adec="http://schemas.microsoft.com/office/drawing/2017/decorative" xmlns="" val="1"/>
               </a:ext>
             </a:extLst>
           </p:cNvPr>
@@ -22163,7 +22344,7 @@
                 <a16:creationId xmlns:a16="http://schemas.microsoft.com/office/drawing/2014/main" id="{83306AB0-8BF5-43D5-B5E2-C53EA0783845}"/>
               </a:ext>
               <a:ext uri="{C183D7F6-B498-43B3-948B-1728B52AA6E4}">
-                <adec:decorative xmlns:adec="http://schemas.microsoft.com/office/drawing/2017/decorative" val="1"/>
+                <adec:decorative xmlns:adec="http://schemas.microsoft.com/office/drawing/2017/decorative" xmlns="" val="1"/>
               </a:ext>
             </a:extLst>
           </p:cNvPr>
@@ -22297,7 +22478,7 @@
                   <a:srgbClr val="FFFFFF"/>
                 </a:solidFill>
               </a:rPr>
-              <a:t>ESTRUTURA MVC</a:t>
+              <a:t>VISÃO ESTRUTURAL</a:t>
             </a:r>
           </a:p>
         </p:txBody>
@@ -22305,7 +22486,7 @@
     </p:spTree>
     <p:extLst>
       <p:ext uri="{BB962C8B-B14F-4D97-AF65-F5344CB8AC3E}">
-        <p14:creationId xmlns:p14="http://schemas.microsoft.com/office/powerpoint/2010/main" val="573250337"/>
+        <p14:creationId xmlns:p14="http://schemas.microsoft.com/office/powerpoint/2010/main" val="3562256947"/>
       </p:ext>
     </p:extLst>
   </p:cSld>
@@ -22334,10 +22515,10 @@
       </p:grpSpPr>
       <p:pic>
         <p:nvPicPr>
-          <p:cNvPr id="5" name="Picture 4" descr="Diagram, engineering drawing&#10;&#10;Description automatically generated">
-            <a:extLst>
-              <a:ext uri="{FF2B5EF4-FFF2-40B4-BE49-F238E27FC236}">
-                <a16:creationId xmlns:a16="http://schemas.microsoft.com/office/drawing/2014/main" id="{43D0CD06-EAA7-8797-6081-CF3112418246}"/>
+          <p:cNvPr id="5" name="Picture 4" descr="Diagram&#10;&#10;Description automatically generated">
+            <a:extLst>
+              <a:ext uri="{FF2B5EF4-FFF2-40B4-BE49-F238E27FC236}">
+                <a16:creationId xmlns:a16="http://schemas.microsoft.com/office/drawing/2014/main" id="{CDAD05D9-5FFE-98AA-ECF5-324743D740B9}"/>
               </a:ext>
             </a:extLst>
           </p:cNvPr>
@@ -22360,8 +22541,8 @@
         </p:blipFill>
         <p:spPr>
           <a:xfrm>
-            <a:off x="403700" y="0"/>
-            <a:ext cx="11384600" cy="6858000"/>
+            <a:off x="1409046" y="694943"/>
+            <a:ext cx="9373908" cy="5468113"/>
           </a:xfrm>
           <a:prstGeom prst="rect">
             <a:avLst/>
@@ -22371,7 +22552,7 @@
     </p:spTree>
     <p:extLst>
       <p:ext uri="{BB962C8B-B14F-4D97-AF65-F5344CB8AC3E}">
-        <p14:creationId xmlns:p14="http://schemas.microsoft.com/office/powerpoint/2010/main" val="2491130075"/>
+        <p14:creationId xmlns:p14="http://schemas.microsoft.com/office/powerpoint/2010/main" val="678261811"/>
       </p:ext>
     </p:extLst>
   </p:cSld>
@@ -22414,7 +22595,7 @@
                 <a16:creationId xmlns:a16="http://schemas.microsoft.com/office/drawing/2014/main" id="{9CC67894-1D18-43E0-B8E1-ECF37EB0D4B5}"/>
               </a:ext>
               <a:ext uri="{C183D7F6-B498-43B3-948B-1728B52AA6E4}">
-                <adec:decorative xmlns:adec="http://schemas.microsoft.com/office/drawing/2017/decorative" val="1"/>
+                <adec:decorative xmlns:adec="http://schemas.microsoft.com/office/drawing/2017/decorative" xmlns="" val="1"/>
               </a:ext>
             </a:extLst>
           </p:cNvPr>
@@ -22503,7 +22684,7 @@
                 <a16:creationId xmlns:a16="http://schemas.microsoft.com/office/drawing/2014/main" id="{A13E3398-4840-4DA1-B674-51AE569B24F9}"/>
               </a:ext>
               <a:ext uri="{C183D7F6-B498-43B3-948B-1728B52AA6E4}">
-                <adec:decorative xmlns:adec="http://schemas.microsoft.com/office/drawing/2017/decorative" val="1"/>
+                <adec:decorative xmlns:adec="http://schemas.microsoft.com/office/drawing/2017/decorative" xmlns="" val="1"/>
               </a:ext>
             </a:extLst>
           </p:cNvPr>
@@ -22687,7 +22868,7 @@
                 <a16:creationId xmlns:a16="http://schemas.microsoft.com/office/drawing/2014/main" id="{83306AB0-8BF5-43D5-B5E2-C53EA0783845}"/>
               </a:ext>
               <a:ext uri="{C183D7F6-B498-43B3-948B-1728B52AA6E4}">
-                <adec:decorative xmlns:adec="http://schemas.microsoft.com/office/drawing/2017/decorative" val="1"/>
+                <adec:decorative xmlns:adec="http://schemas.microsoft.com/office/drawing/2017/decorative" xmlns="" val="1"/>
               </a:ext>
             </a:extLst>
           </p:cNvPr>
@@ -22808,7 +22989,7 @@
                   <a:srgbClr val="FFFFFF"/>
                 </a:solidFill>
               </a:rPr>
-              <a:t>DIAGRAMA DE SEQUENCIA</a:t>
+              <a:t>DIAGRAMA DE PACOTE</a:t>
             </a:r>
           </a:p>
           <a:p>
@@ -22821,7 +23002,7 @@
                   <a:srgbClr val="FFFFFF"/>
                 </a:solidFill>
               </a:rPr>
-              <a:t>REST API</a:t>
+              <a:t>ESTRUTURA MVC</a:t>
             </a:r>
           </a:p>
         </p:txBody>
@@ -22829,7 +23010,7 @@
     </p:spTree>
     <p:extLst>
       <p:ext uri="{BB962C8B-B14F-4D97-AF65-F5344CB8AC3E}">
-        <p14:creationId xmlns:p14="http://schemas.microsoft.com/office/powerpoint/2010/main" val="2117410437"/>
+        <p14:creationId xmlns:p14="http://schemas.microsoft.com/office/powerpoint/2010/main" val="573250337"/>
       </p:ext>
     </p:extLst>
   </p:cSld>
@@ -22856,41 +23037,12 @@
           <a:chExt cx="0" cy="0"/>
         </a:xfrm>
       </p:grpSpPr>
-      <p:sp>
-        <p:nvSpPr>
-          <p:cNvPr id="2" name="Title 1">
-            <a:extLst>
-              <a:ext uri="{FF2B5EF4-FFF2-40B4-BE49-F238E27FC236}">
-                <a16:creationId xmlns:a16="http://schemas.microsoft.com/office/drawing/2014/main" id="{8BA34FF9-BC38-DFE8-3863-62C92B530FED}"/>
-              </a:ext>
-            </a:extLst>
-          </p:cNvPr>
-          <p:cNvSpPr>
-            <a:spLocks noGrp="1"/>
-          </p:cNvSpPr>
-          <p:nvPr>
-            <p:ph type="title"/>
-          </p:nvPr>
-        </p:nvSpPr>
-        <p:spPr/>
-        <p:txBody>
-          <a:bodyPr/>
-          <a:lstStyle/>
-          <a:p>
-            <a:r>
-              <a:rPr lang="pt-BR"/>
-              <a:t>Genérico para todas as requisições Rest API</a:t>
-            </a:r>
-            <a:endParaRPr lang="en-US" dirty="0"/>
-          </a:p>
-        </p:txBody>
-      </p:sp>
       <p:pic>
         <p:nvPicPr>
-          <p:cNvPr id="5" name="Picture 4" descr="Diagram&#10;&#10;Description automatically generated">
-            <a:extLst>
-              <a:ext uri="{FF2B5EF4-FFF2-40B4-BE49-F238E27FC236}">
-                <a16:creationId xmlns:a16="http://schemas.microsoft.com/office/drawing/2014/main" id="{F43B57F2-5F24-A8FA-E255-7E44FA87D952}"/>
+          <p:cNvPr id="5" name="Picture 4" descr="Diagram, engineering drawing&#10;&#10;Description automatically generated">
+            <a:extLst>
+              <a:ext uri="{FF2B5EF4-FFF2-40B4-BE49-F238E27FC236}">
+                <a16:creationId xmlns:a16="http://schemas.microsoft.com/office/drawing/2014/main" id="{43D0CD06-EAA7-8797-6081-CF3112418246}"/>
               </a:ext>
             </a:extLst>
           </p:cNvPr>
@@ -22913,8 +23065,8 @@
         </p:blipFill>
         <p:spPr>
           <a:xfrm>
-            <a:off x="580298" y="1513162"/>
-            <a:ext cx="10421804" cy="5601482"/>
+            <a:off x="403700" y="0"/>
+            <a:ext cx="11384600" cy="6858000"/>
           </a:xfrm>
           <a:prstGeom prst="rect">
             <a:avLst/>
@@ -22924,7 +23076,7 @@
     </p:spTree>
     <p:extLst>
       <p:ext uri="{BB962C8B-B14F-4D97-AF65-F5344CB8AC3E}">
-        <p14:creationId xmlns:p14="http://schemas.microsoft.com/office/powerpoint/2010/main" val="1617756287"/>
+        <p14:creationId xmlns:p14="http://schemas.microsoft.com/office/powerpoint/2010/main" val="2491130075"/>
       </p:ext>
     </p:extLst>
   </p:cSld>
@@ -22967,7 +23119,7 @@
                 <a16:creationId xmlns:a16="http://schemas.microsoft.com/office/drawing/2014/main" id="{9CC67894-1D18-43E0-B8E1-ECF37EB0D4B5}"/>
               </a:ext>
               <a:ext uri="{C183D7F6-B498-43B3-948B-1728B52AA6E4}">
-                <adec:decorative xmlns:adec="http://schemas.microsoft.com/office/drawing/2017/decorative" val="1"/>
+                <adec:decorative xmlns:adec="http://schemas.microsoft.com/office/drawing/2017/decorative" xmlns="" val="1"/>
               </a:ext>
             </a:extLst>
           </p:cNvPr>
@@ -23056,7 +23208,7 @@
                 <a16:creationId xmlns:a16="http://schemas.microsoft.com/office/drawing/2014/main" id="{A13E3398-4840-4DA1-B674-51AE569B24F9}"/>
               </a:ext>
               <a:ext uri="{C183D7F6-B498-43B3-948B-1728B52AA6E4}">
-                <adec:decorative xmlns:adec="http://schemas.microsoft.com/office/drawing/2017/decorative" val="1"/>
+                <adec:decorative xmlns:adec="http://schemas.microsoft.com/office/drawing/2017/decorative" xmlns="" val="1"/>
               </a:ext>
             </a:extLst>
           </p:cNvPr>
@@ -23240,7 +23392,7 @@
                 <a16:creationId xmlns:a16="http://schemas.microsoft.com/office/drawing/2014/main" id="{83306AB0-8BF5-43D5-B5E2-C53EA0783845}"/>
               </a:ext>
               <a:ext uri="{C183D7F6-B498-43B3-948B-1728B52AA6E4}">
-                <adec:decorative xmlns:adec="http://schemas.microsoft.com/office/drawing/2017/decorative" val="1"/>
+                <adec:decorative xmlns:adec="http://schemas.microsoft.com/office/drawing/2017/decorative" xmlns="" val="1"/>
               </a:ext>
             </a:extLst>
           </p:cNvPr>
@@ -23374,7 +23526,7 @@
                   <a:srgbClr val="FFFFFF"/>
                 </a:solidFill>
               </a:rPr>
-              <a:t>WEB</a:t>
+              <a:t>REST API</a:t>
             </a:r>
           </a:p>
         </p:txBody>
@@ -23382,7 +23534,7 @@
     </p:spTree>
     <p:extLst>
       <p:ext uri="{BB962C8B-B14F-4D97-AF65-F5344CB8AC3E}">
-        <p14:creationId xmlns:p14="http://schemas.microsoft.com/office/powerpoint/2010/main" val="694969404"/>
+        <p14:creationId xmlns:p14="http://schemas.microsoft.com/office/powerpoint/2010/main" val="2117410437"/>
       </p:ext>
     </p:extLst>
   </p:cSld>
@@ -23431,8 +23583,8 @@
           <a:lstStyle/>
           <a:p>
             <a:r>
-              <a:rPr lang="pt-BR" dirty="0"/>
-              <a:t>Genérico para todas as sequências Web</a:t>
+              <a:rPr lang="pt-BR"/>
+              <a:t>Genérico para todas as requisições Rest API</a:t>
             </a:r>
             <a:endParaRPr lang="en-US" dirty="0"/>
           </a:p>
@@ -23440,10 +23592,10 @@
       </p:sp>
       <p:pic>
         <p:nvPicPr>
-          <p:cNvPr id="4" name="Picture 3" descr="Diagram&#10;&#10;Description automatically generated">
-            <a:extLst>
-              <a:ext uri="{FF2B5EF4-FFF2-40B4-BE49-F238E27FC236}">
-                <a16:creationId xmlns:a16="http://schemas.microsoft.com/office/drawing/2014/main" id="{57A7390D-FE2A-D9EE-72DD-A4EB99EF5670}"/>
+          <p:cNvPr id="5" name="Picture 4" descr="Diagram&#10;&#10;Description automatically generated">
+            <a:extLst>
+              <a:ext uri="{FF2B5EF4-FFF2-40B4-BE49-F238E27FC236}">
+                <a16:creationId xmlns:a16="http://schemas.microsoft.com/office/drawing/2014/main" id="{F43B57F2-5F24-A8FA-E255-7E44FA87D952}"/>
               </a:ext>
             </a:extLst>
           </p:cNvPr>
@@ -23466,8 +23618,8 @@
         </p:blipFill>
         <p:spPr>
           <a:xfrm>
-            <a:off x="475465" y="1414839"/>
-            <a:ext cx="11241069" cy="5601482"/>
+            <a:off x="580298" y="1513162"/>
+            <a:ext cx="10421804" cy="5601482"/>
           </a:xfrm>
           <a:prstGeom prst="rect">
             <a:avLst/>
@@ -23477,7 +23629,7 @@
     </p:spTree>
     <p:extLst>
       <p:ext uri="{BB962C8B-B14F-4D97-AF65-F5344CB8AC3E}">
-        <p14:creationId xmlns:p14="http://schemas.microsoft.com/office/powerpoint/2010/main" val="3167476347"/>
+        <p14:creationId xmlns:p14="http://schemas.microsoft.com/office/powerpoint/2010/main" val="1617756287"/>
       </p:ext>
     </p:extLst>
   </p:cSld>
@@ -23520,7 +23672,7 @@
                 <a16:creationId xmlns:a16="http://schemas.microsoft.com/office/drawing/2014/main" id="{9CC67894-1D18-43E0-B8E1-ECF37EB0D4B5}"/>
               </a:ext>
               <a:ext uri="{C183D7F6-B498-43B3-948B-1728B52AA6E4}">
-                <adec:decorative xmlns:adec="http://schemas.microsoft.com/office/drawing/2017/decorative" val="1"/>
+                <adec:decorative xmlns:adec="http://schemas.microsoft.com/office/drawing/2017/decorative" xmlns="" val="1"/>
               </a:ext>
             </a:extLst>
           </p:cNvPr>
@@ -23609,7 +23761,7 @@
                 <a16:creationId xmlns:a16="http://schemas.microsoft.com/office/drawing/2014/main" id="{A13E3398-4840-4DA1-B674-51AE569B24F9}"/>
               </a:ext>
               <a:ext uri="{C183D7F6-B498-43B3-948B-1728B52AA6E4}">
-                <adec:decorative xmlns:adec="http://schemas.microsoft.com/office/drawing/2017/decorative" val="1"/>
+                <adec:decorative xmlns:adec="http://schemas.microsoft.com/office/drawing/2017/decorative" xmlns="" val="1"/>
               </a:ext>
             </a:extLst>
           </p:cNvPr>
@@ -23793,7 +23945,7 @@
                 <a16:creationId xmlns:a16="http://schemas.microsoft.com/office/drawing/2014/main" id="{83306AB0-8BF5-43D5-B5E2-C53EA0783845}"/>
               </a:ext>
               <a:ext uri="{C183D7F6-B498-43B3-948B-1728B52AA6E4}">
-                <adec:decorative xmlns:adec="http://schemas.microsoft.com/office/drawing/2017/decorative" val="1"/>
+                <adec:decorative xmlns:adec="http://schemas.microsoft.com/office/drawing/2017/decorative" xmlns="" val="1"/>
               </a:ext>
             </a:extLst>
           </p:cNvPr>
@@ -23914,7 +24066,20 @@
                   <a:srgbClr val="FFFFFF"/>
                 </a:solidFill>
               </a:rPr>
-              <a:t>MODELO INICIAL DE INTERFACE DE USUÁRIO</a:t>
+              <a:t>DIAGRAMA DE SEQUENCIA</a:t>
+            </a:r>
+          </a:p>
+          <a:p>
+            <a:pPr marL="0" indent="0" algn="ctr">
+              <a:buNone/>
+            </a:pPr>
+            <a:r>
+              <a:rPr lang="pt-BR" sz="5000" dirty="0">
+                <a:solidFill>
+                  <a:srgbClr val="FFFFFF"/>
+                </a:solidFill>
+              </a:rPr>
+              <a:t>WEB</a:t>
             </a:r>
           </a:p>
         </p:txBody>
@@ -23922,7 +24087,7 @@
     </p:spTree>
     <p:extLst>
       <p:ext uri="{BB962C8B-B14F-4D97-AF65-F5344CB8AC3E}">
-        <p14:creationId xmlns:p14="http://schemas.microsoft.com/office/powerpoint/2010/main" val="3436296277"/>
+        <p14:creationId xmlns:p14="http://schemas.microsoft.com/office/powerpoint/2010/main" val="694969404"/>
       </p:ext>
     </p:extLst>
   </p:cSld>
@@ -23949,12 +24114,41 @@
           <a:chExt cx="0" cy="0"/>
         </a:xfrm>
       </p:grpSpPr>
+      <p:sp>
+        <p:nvSpPr>
+          <p:cNvPr id="2" name="Title 1">
+            <a:extLst>
+              <a:ext uri="{FF2B5EF4-FFF2-40B4-BE49-F238E27FC236}">
+                <a16:creationId xmlns:a16="http://schemas.microsoft.com/office/drawing/2014/main" id="{8BA34FF9-BC38-DFE8-3863-62C92B530FED}"/>
+              </a:ext>
+            </a:extLst>
+          </p:cNvPr>
+          <p:cNvSpPr>
+            <a:spLocks noGrp="1"/>
+          </p:cNvSpPr>
+          <p:nvPr>
+            <p:ph type="title"/>
+          </p:nvPr>
+        </p:nvSpPr>
+        <p:spPr/>
+        <p:txBody>
+          <a:bodyPr/>
+          <a:lstStyle/>
+          <a:p>
+            <a:r>
+              <a:rPr lang="pt-BR" dirty="0"/>
+              <a:t>Genérico para todas as sequências Web</a:t>
+            </a:r>
+            <a:endParaRPr lang="en-US" dirty="0"/>
+          </a:p>
+        </p:txBody>
+      </p:sp>
       <p:pic>
         <p:nvPicPr>
-          <p:cNvPr id="3" name="Picture 2" descr="Graphical user interface, text, application, Word&#10;&#10;Description automatically generated">
-            <a:extLst>
-              <a:ext uri="{FF2B5EF4-FFF2-40B4-BE49-F238E27FC236}">
-                <a16:creationId xmlns:a16="http://schemas.microsoft.com/office/drawing/2014/main" id="{1F6394F5-65EA-E06D-9198-F319C5F6EAB5}"/>
+          <p:cNvPr id="4" name="Picture 3" descr="Diagram&#10;&#10;Description automatically generated">
+            <a:extLst>
+              <a:ext uri="{FF2B5EF4-FFF2-40B4-BE49-F238E27FC236}">
+                <a16:creationId xmlns:a16="http://schemas.microsoft.com/office/drawing/2014/main" id="{57A7390D-FE2A-D9EE-72DD-A4EB99EF5670}"/>
               </a:ext>
             </a:extLst>
           </p:cNvPr>
@@ -23977,8 +24171,8 @@
         </p:blipFill>
         <p:spPr>
           <a:xfrm>
-            <a:off x="518334" y="156706"/>
-            <a:ext cx="11155332" cy="6544588"/>
+            <a:off x="475465" y="1414839"/>
+            <a:ext cx="11241069" cy="5601482"/>
           </a:xfrm>
           <a:prstGeom prst="rect">
             <a:avLst/>
@@ -23988,7 +24182,7 @@
     </p:spTree>
     <p:extLst>
       <p:ext uri="{BB962C8B-B14F-4D97-AF65-F5344CB8AC3E}">
-        <p14:creationId xmlns:p14="http://schemas.microsoft.com/office/powerpoint/2010/main" val="3201399576"/>
+        <p14:creationId xmlns:p14="http://schemas.microsoft.com/office/powerpoint/2010/main" val="3167476347"/>
       </p:ext>
     </p:extLst>
   </p:cSld>
@@ -24001,6 +24195,14 @@
 <file path=ppt/slides/slide59.xml><?xml version="1.0" encoding="utf-8"?>
 <p:sld xmlns:a="http://schemas.openxmlformats.org/drawingml/2006/main" xmlns:r="http://schemas.openxmlformats.org/officeDocument/2006/relationships" xmlns:p="http://schemas.openxmlformats.org/presentationml/2006/main">
   <p:cSld>
+    <p:bg>
+      <p:bgPr>
+        <a:solidFill>
+          <a:schemeClr val="bg1"/>
+        </a:solidFill>
+        <a:effectLst/>
+      </p:bgPr>
+    </p:bg>
     <p:spTree>
       <p:nvGrpSpPr>
         <p:cNvPr id="1" name=""/>
@@ -24015,12 +24217,193 @@
           <a:chExt cx="0" cy="0"/>
         </a:xfrm>
       </p:grpSpPr>
+      <p:sp useBgFill="1">
+        <p:nvSpPr>
+          <p:cNvPr id="26" name="!!BGRectangle">
+            <a:extLst>
+              <a:ext uri="{FF2B5EF4-FFF2-40B4-BE49-F238E27FC236}">
+                <a16:creationId xmlns:a16="http://schemas.microsoft.com/office/drawing/2014/main" id="{9CC67894-1D18-43E0-B8E1-ECF37EB0D4B5}"/>
+              </a:ext>
+              <a:ext uri="{C183D7F6-B498-43B3-948B-1728B52AA6E4}">
+                <adec:decorative xmlns:adec="http://schemas.microsoft.com/office/drawing/2017/decorative" xmlns="" val="1"/>
+              </a:ext>
+            </a:extLst>
+          </p:cNvPr>
+          <p:cNvSpPr>
+            <a:spLocks noGrp="1" noRot="1" noChangeAspect="1" noMove="1" noResize="1" noEditPoints="1" noAdjustHandles="1" noChangeArrowheads="1" noChangeShapeType="1" noTextEdit="1"/>
+          </p:cNvSpPr>
+          <p:nvPr>
+            <p:extLst>
+              <p:ext uri="{386F3935-93C4-4BCD-93E2-E3B085C9AB24}">
+                <p16:designElem xmlns:p16="http://schemas.microsoft.com/office/powerpoint/2015/main" val="1"/>
+              </p:ext>
+            </p:extLst>
+          </p:nvPr>
+        </p:nvSpPr>
+        <p:spPr>
+          <a:xfrm>
+            <a:off x="3048" y="-6182"/>
+            <a:ext cx="12188952" cy="6858000"/>
+          </a:xfrm>
+          <a:prstGeom prst="rect">
+            <a:avLst/>
+          </a:prstGeom>
+          <a:ln>
+            <a:noFill/>
+          </a:ln>
+        </p:spPr>
+        <p:style>
+          <a:lnRef idx="2">
+            <a:schemeClr val="accent1">
+              <a:shade val="50000"/>
+            </a:schemeClr>
+          </a:lnRef>
+          <a:fillRef idx="1">
+            <a:schemeClr val="accent1"/>
+          </a:fillRef>
+          <a:effectRef idx="0">
+            <a:schemeClr val="accent1"/>
+          </a:effectRef>
+          <a:fontRef idx="minor">
+            <a:schemeClr val="lt1"/>
+          </a:fontRef>
+        </p:style>
+        <p:txBody>
+          <a:bodyPr rtlCol="0" anchor="ctr"/>
+          <a:lstStyle/>
+          <a:p>
+            <a:pPr marL="0" marR="0" lvl="0" indent="0" algn="ctr" defTabSz="914400" rtl="0" eaLnBrk="1" fontAlgn="auto" latinLnBrk="0" hangingPunct="1">
+              <a:lnSpc>
+                <a:spcPct val="100000"/>
+              </a:lnSpc>
+              <a:spcBef>
+                <a:spcPts val="0"/>
+              </a:spcBef>
+              <a:spcAft>
+                <a:spcPts val="0"/>
+              </a:spcAft>
+              <a:buClrTx/>
+              <a:buSzTx/>
+              <a:buFontTx/>
+              <a:buNone/>
+              <a:tabLst/>
+              <a:defRPr/>
+            </a:pPr>
+            <a:endParaRPr kumimoji="0" lang="en-US" sz="1800" b="0" i="0" u="none" strike="noStrike" kern="1200" cap="none" spc="0" normalizeH="0" baseline="0" noProof="0">
+              <a:ln>
+                <a:noFill/>
+              </a:ln>
+              <a:solidFill>
+                <a:prstClr val="white"/>
+              </a:solidFill>
+              <a:effectLst/>
+              <a:uLnTx/>
+              <a:uFillTx/>
+              <a:latin typeface="Calibri" panose="020F0502020204030204"/>
+              <a:ea typeface="+mn-ea"/>
+              <a:cs typeface="+mn-cs"/>
+            </a:endParaRPr>
+          </a:p>
+        </p:txBody>
+      </p:sp>
+      <p:sp>
+        <p:nvSpPr>
+          <p:cNvPr id="28" name="Rectangle 27">
+            <a:extLst>
+              <a:ext uri="{FF2B5EF4-FFF2-40B4-BE49-F238E27FC236}">
+                <a16:creationId xmlns:a16="http://schemas.microsoft.com/office/drawing/2014/main" id="{A13E3398-4840-4DA1-B674-51AE569B24F9}"/>
+              </a:ext>
+              <a:ext uri="{C183D7F6-B498-43B3-948B-1728B52AA6E4}">
+                <adec:decorative xmlns:adec="http://schemas.microsoft.com/office/drawing/2017/decorative" xmlns="" val="1"/>
+              </a:ext>
+            </a:extLst>
+          </p:cNvPr>
+          <p:cNvSpPr>
+            <a:spLocks noGrp="1" noRot="1" noChangeAspect="1" noMove="1" noResize="1" noEditPoints="1" noAdjustHandles="1" noChangeArrowheads="1" noChangeShapeType="1" noTextEdit="1"/>
+          </p:cNvSpPr>
+          <p:nvPr>
+            <p:extLst>
+              <p:ext uri="{386F3935-93C4-4BCD-93E2-E3B085C9AB24}">
+                <p16:designElem xmlns:p16="http://schemas.microsoft.com/office/powerpoint/2015/main" val="1"/>
+              </p:ext>
+            </p:extLst>
+          </p:nvPr>
+        </p:nvSpPr>
+        <p:spPr>
+          <a:xfrm>
+            <a:off x="0" y="0"/>
+            <a:ext cx="12188952" cy="6858000"/>
+          </a:xfrm>
+          <a:prstGeom prst="rect">
+            <a:avLst/>
+          </a:prstGeom>
+          <a:solidFill>
+            <a:srgbClr val="000000"/>
+          </a:solidFill>
+          <a:ln>
+            <a:noFill/>
+          </a:ln>
+        </p:spPr>
+        <p:style>
+          <a:lnRef idx="2">
+            <a:schemeClr val="accent1">
+              <a:shade val="50000"/>
+            </a:schemeClr>
+          </a:lnRef>
+          <a:fillRef idx="1">
+            <a:schemeClr val="accent1"/>
+          </a:fillRef>
+          <a:effectRef idx="0">
+            <a:schemeClr val="accent1"/>
+          </a:effectRef>
+          <a:fontRef idx="minor">
+            <a:schemeClr val="lt1"/>
+          </a:fontRef>
+        </p:style>
+        <p:txBody>
+          <a:bodyPr rtlCol="0" anchor="ctr"/>
+          <a:lstStyle/>
+          <a:p>
+            <a:pPr marL="0" marR="0" lvl="0" indent="0" algn="ctr" defTabSz="914400" rtl="0" eaLnBrk="1" fontAlgn="auto" latinLnBrk="0" hangingPunct="1">
+              <a:lnSpc>
+                <a:spcPct val="100000"/>
+              </a:lnSpc>
+              <a:spcBef>
+                <a:spcPts val="0"/>
+              </a:spcBef>
+              <a:spcAft>
+                <a:spcPts val="0"/>
+              </a:spcAft>
+              <a:buClrTx/>
+              <a:buSzTx/>
+              <a:buFontTx/>
+              <a:buNone/>
+              <a:tabLst/>
+              <a:defRPr/>
+            </a:pPr>
+            <a:endParaRPr kumimoji="0" lang="en-US" sz="1800" b="0" i="0" u="none" strike="noStrike" kern="1200" cap="none" spc="0" normalizeH="0" baseline="0" noProof="0">
+              <a:ln>
+                <a:noFill/>
+              </a:ln>
+              <a:solidFill>
+                <a:prstClr val="white"/>
+              </a:solidFill>
+              <a:effectLst/>
+              <a:uLnTx/>
+              <a:uFillTx/>
+              <a:latin typeface="Calibri" panose="020F0502020204030204"/>
+              <a:ea typeface="+mn-ea"/>
+              <a:cs typeface="+mn-cs"/>
+            </a:endParaRPr>
+          </a:p>
+        </p:txBody>
+      </p:sp>
       <p:pic>
         <p:nvPicPr>
-          <p:cNvPr id="4" name="Picture 3" descr="Graphical user interface&#10;&#10;Description automatically generated">
-            <a:extLst>
-              <a:ext uri="{FF2B5EF4-FFF2-40B4-BE49-F238E27FC236}">
-                <a16:creationId xmlns:a16="http://schemas.microsoft.com/office/drawing/2014/main" id="{550AA350-28B9-6B79-3143-27740BD1B144}"/>
+          <p:cNvPr id="5" name="Picture 4" descr="Logo&#10;&#10;Description automatically generated">
+            <a:extLst>
+              <a:ext uri="{FF2B5EF4-FFF2-40B4-BE49-F238E27FC236}">
+                <a16:creationId xmlns:a16="http://schemas.microsoft.com/office/drawing/2014/main" id="{1485635D-4D96-E6AD-65A7-BBB6DBDB904F}"/>
               </a:ext>
             </a:extLst>
           </p:cNvPr>
@@ -24029,32 +24412,222 @@
           </p:cNvPicPr>
           <p:nvPr/>
         </p:nvPicPr>
-        <p:blipFill>
+        <p:blipFill rotWithShape="1">
           <a:blip r:embed="rId2">
-            <a:extLst>
+            <a:alphaModFix amt="50000"/>
+            <a:extLst>
+              <a:ext uri="{BEBA8EAE-BF5A-486C-A8C5-ECC9F3942E4B}">
+                <a14:imgProps xmlns:a14="http://schemas.microsoft.com/office/drawing/2010/main">
+                  <a14:imgLayer r:embed="rId3">
+                    <a14:imgEffect>
+                      <a14:sharpenSoften amount="-20000"/>
+                    </a14:imgEffect>
+                    <a14:imgEffect>
+                      <a14:brightnessContrast bright="-30000"/>
+                    </a14:imgEffect>
+                  </a14:imgLayer>
+                </a14:imgProps>
+              </a:ext>
               <a:ext uri="{28A0092B-C50C-407E-A947-70E740481C1C}">
                 <a14:useLocalDpi xmlns:a14="http://schemas.microsoft.com/office/drawing/2010/main" val="0"/>
               </a:ext>
             </a:extLst>
           </a:blip>
-          <a:stretch>
-            <a:fillRect/>
-          </a:stretch>
+          <a:srcRect t="17370" r="-2" b="26379"/>
+          <a:stretch/>
         </p:blipFill>
         <p:spPr>
           <a:xfrm>
-            <a:off x="518334" y="156706"/>
-            <a:ext cx="11155332" cy="6544588"/>
+            <a:off x="-3048" y="1"/>
+            <a:ext cx="12191980" cy="6857999"/>
           </a:xfrm>
           <a:prstGeom prst="rect">
             <a:avLst/>
           </a:prstGeom>
         </p:spPr>
       </p:pic>
+      <p:sp>
+        <p:nvSpPr>
+          <p:cNvPr id="2" name="Title 1">
+            <a:extLst>
+              <a:ext uri="{FF2B5EF4-FFF2-40B4-BE49-F238E27FC236}">
+                <a16:creationId xmlns:a16="http://schemas.microsoft.com/office/drawing/2014/main" id="{57542169-E59A-481B-15D1-67FB940F43E9}"/>
+              </a:ext>
+            </a:extLst>
+          </p:cNvPr>
+          <p:cNvSpPr>
+            <a:spLocks noGrp="1"/>
+          </p:cNvSpPr>
+          <p:nvPr>
+            <p:ph type="title"/>
+          </p:nvPr>
+        </p:nvSpPr>
+        <p:spPr>
+          <a:xfrm>
+            <a:off x="943276" y="712268"/>
+            <a:ext cx="10410524" cy="1193533"/>
+          </a:xfrm>
+        </p:spPr>
+        <p:txBody>
+          <a:bodyPr>
+            <a:normAutofit/>
+          </a:bodyPr>
+          <a:lstStyle/>
+          <a:p>
+            <a:r>
+              <a:rPr lang="pt-BR" sz="6500" b="1" dirty="0">
+                <a:solidFill>
+                  <a:srgbClr val="FFFFFF"/>
+                </a:solidFill>
+              </a:rPr>
+              <a:t>ARTEFATOS</a:t>
+            </a:r>
+            <a:endParaRPr lang="en-US" sz="6500" b="1" dirty="0">
+              <a:solidFill>
+                <a:srgbClr val="FFFFFF"/>
+              </a:solidFill>
+            </a:endParaRPr>
+          </a:p>
+        </p:txBody>
+      </p:sp>
+      <p:sp>
+        <p:nvSpPr>
+          <p:cNvPr id="30" name="!!Line">
+            <a:extLst>
+              <a:ext uri="{FF2B5EF4-FFF2-40B4-BE49-F238E27FC236}">
+                <a16:creationId xmlns:a16="http://schemas.microsoft.com/office/drawing/2014/main" id="{83306AB0-8BF5-43D5-B5E2-C53EA0783845}"/>
+              </a:ext>
+              <a:ext uri="{C183D7F6-B498-43B3-948B-1728B52AA6E4}">
+                <adec:decorative xmlns:adec="http://schemas.microsoft.com/office/drawing/2017/decorative" xmlns="" val="1"/>
+              </a:ext>
+            </a:extLst>
+          </p:cNvPr>
+          <p:cNvSpPr>
+            <a:spLocks noGrp="1" noRot="1" noChangeAspect="1" noMove="1" noResize="1" noEditPoints="1" noAdjustHandles="1" noChangeArrowheads="1" noChangeShapeType="1" noTextEdit="1"/>
+          </p:cNvSpPr>
+          <p:nvPr>
+            <p:extLst>
+              <p:ext uri="{386F3935-93C4-4BCD-93E2-E3B085C9AB24}">
+                <p16:designElem xmlns:p16="http://schemas.microsoft.com/office/powerpoint/2015/main" val="1"/>
+              </p:ext>
+            </p:extLst>
+          </p:nvPr>
+        </p:nvSpPr>
+        <p:spPr>
+          <a:xfrm>
+            <a:off x="762000" y="826324"/>
+            <a:ext cx="27432" cy="914400"/>
+          </a:xfrm>
+          <a:prstGeom prst="rect">
+            <a:avLst/>
+          </a:prstGeom>
+          <a:solidFill>
+            <a:srgbClr val="FFFFFF"/>
+          </a:solidFill>
+          <a:ln>
+            <a:noFill/>
+          </a:ln>
+        </p:spPr>
+        <p:style>
+          <a:lnRef idx="2">
+            <a:schemeClr val="accent1">
+              <a:shade val="50000"/>
+            </a:schemeClr>
+          </a:lnRef>
+          <a:fillRef idx="1">
+            <a:schemeClr val="accent1"/>
+          </a:fillRef>
+          <a:effectRef idx="0">
+            <a:schemeClr val="accent1"/>
+          </a:effectRef>
+          <a:fontRef idx="minor">
+            <a:schemeClr val="lt1"/>
+          </a:fontRef>
+        </p:style>
+        <p:txBody>
+          <a:bodyPr rtlCol="0" anchor="ctr"/>
+          <a:lstStyle/>
+          <a:p>
+            <a:pPr marL="0" marR="0" lvl="0" indent="0" algn="ctr" defTabSz="914400" rtl="0" eaLnBrk="1" fontAlgn="auto" latinLnBrk="0" hangingPunct="1">
+              <a:lnSpc>
+                <a:spcPct val="100000"/>
+              </a:lnSpc>
+              <a:spcBef>
+                <a:spcPts val="0"/>
+              </a:spcBef>
+              <a:spcAft>
+                <a:spcPts val="0"/>
+              </a:spcAft>
+              <a:buClrTx/>
+              <a:buSzTx/>
+              <a:buFontTx/>
+              <a:buNone/>
+              <a:tabLst/>
+              <a:defRPr/>
+            </a:pPr>
+            <a:endParaRPr kumimoji="0" lang="en-US" sz="1800" b="0" i="0" u="none" strike="noStrike" kern="1200" cap="none" spc="0" normalizeH="0" baseline="0" noProof="0">
+              <a:ln>
+                <a:noFill/>
+              </a:ln>
+              <a:solidFill>
+                <a:prstClr val="white"/>
+              </a:solidFill>
+              <a:effectLst/>
+              <a:uLnTx/>
+              <a:uFillTx/>
+              <a:latin typeface="Calibri" panose="020F0502020204030204"/>
+              <a:ea typeface="+mn-ea"/>
+              <a:cs typeface="+mn-cs"/>
+            </a:endParaRPr>
+          </a:p>
+        </p:txBody>
+      </p:sp>
+      <p:sp>
+        <p:nvSpPr>
+          <p:cNvPr id="3" name="Content Placeholder 2">
+            <a:extLst>
+              <a:ext uri="{FF2B5EF4-FFF2-40B4-BE49-F238E27FC236}">
+                <a16:creationId xmlns:a16="http://schemas.microsoft.com/office/drawing/2014/main" id="{83FCD086-7677-FA17-701D-63D5D7664A00}"/>
+              </a:ext>
+            </a:extLst>
+          </p:cNvPr>
+          <p:cNvSpPr>
+            <a:spLocks noGrp="1"/>
+          </p:cNvSpPr>
+          <p:nvPr>
+            <p:ph idx="1"/>
+          </p:nvPr>
+        </p:nvSpPr>
+        <p:spPr>
+          <a:xfrm>
+            <a:off x="943276" y="2236995"/>
+            <a:ext cx="10410524" cy="4126782"/>
+          </a:xfrm>
+        </p:spPr>
+        <p:txBody>
+          <a:bodyPr anchor="ctr">
+            <a:normAutofit/>
+          </a:bodyPr>
+          <a:lstStyle/>
+          <a:p>
+            <a:pPr marL="0" indent="0" algn="ctr">
+              <a:buNone/>
+            </a:pPr>
+            <a:r>
+              <a:rPr lang="pt-BR" sz="5000" dirty="0">
+                <a:solidFill>
+                  <a:srgbClr val="FFFFFF"/>
+                </a:solidFill>
+              </a:rPr>
+              <a:t>MODELO INICIAL DE INTERFACE DE USUÁRIO</a:t>
+            </a:r>
+          </a:p>
+        </p:txBody>
+      </p:sp>
     </p:spTree>
     <p:extLst>
       <p:ext uri="{BB962C8B-B14F-4D97-AF65-F5344CB8AC3E}">
-        <p14:creationId xmlns:p14="http://schemas.microsoft.com/office/powerpoint/2010/main" val="4223881699"/>
+        <p14:creationId xmlns:p14="http://schemas.microsoft.com/office/powerpoint/2010/main" val="3436296277"/>
       </p:ext>
     </p:extLst>
   </p:cSld>
@@ -24097,7 +24670,7 @@
                 <a16:creationId xmlns:a16="http://schemas.microsoft.com/office/drawing/2014/main" id="{9CC67894-1D18-43E0-B8E1-ECF37EB0D4B5}"/>
               </a:ext>
               <a:ext uri="{C183D7F6-B498-43B3-948B-1728B52AA6E4}">
-                <adec:decorative xmlns:adec="http://schemas.microsoft.com/office/drawing/2017/decorative" val="1"/>
+                <adec:decorative xmlns:adec="http://schemas.microsoft.com/office/drawing/2017/decorative" xmlns="" val="1"/>
               </a:ext>
             </a:extLst>
           </p:cNvPr>
@@ -24186,7 +24759,7 @@
                 <a16:creationId xmlns:a16="http://schemas.microsoft.com/office/drawing/2014/main" id="{A13E3398-4840-4DA1-B674-51AE569B24F9}"/>
               </a:ext>
               <a:ext uri="{C183D7F6-B498-43B3-948B-1728B52AA6E4}">
-                <adec:decorative xmlns:adec="http://schemas.microsoft.com/office/drawing/2017/decorative" val="1"/>
+                <adec:decorative xmlns:adec="http://schemas.microsoft.com/office/drawing/2017/decorative" xmlns="" val="1"/>
               </a:ext>
             </a:extLst>
           </p:cNvPr>
@@ -24370,7 +24943,7 @@
                 <a16:creationId xmlns:a16="http://schemas.microsoft.com/office/drawing/2014/main" id="{83306AB0-8BF5-43D5-B5E2-C53EA0783845}"/>
               </a:ext>
               <a:ext uri="{C183D7F6-B498-43B3-948B-1728B52AA6E4}">
-                <adec:decorative xmlns:adec="http://schemas.microsoft.com/office/drawing/2017/decorative" val="1"/>
+                <adec:decorative xmlns:adec="http://schemas.microsoft.com/office/drawing/2017/decorative" xmlns="" val="1"/>
               </a:ext>
             </a:extLst>
           </p:cNvPr>
@@ -24546,10 +25119,10 @@
       </p:grpSpPr>
       <p:pic>
         <p:nvPicPr>
-          <p:cNvPr id="3" name="Picture 2" descr="Table&#10;&#10;Description automatically generated">
-            <a:extLst>
-              <a:ext uri="{FF2B5EF4-FFF2-40B4-BE49-F238E27FC236}">
-                <a16:creationId xmlns:a16="http://schemas.microsoft.com/office/drawing/2014/main" id="{E485D4A4-EA7B-8814-60B5-A1BED2AA010D}"/>
+          <p:cNvPr id="3" name="Picture 2" descr="Graphical user interface, text, application, Word&#10;&#10;Description automatically generated">
+            <a:extLst>
+              <a:ext uri="{FF2B5EF4-FFF2-40B4-BE49-F238E27FC236}">
+                <a16:creationId xmlns:a16="http://schemas.microsoft.com/office/drawing/2014/main" id="{1F6394F5-65EA-E06D-9198-F319C5F6EAB5}"/>
               </a:ext>
             </a:extLst>
           </p:cNvPr>
@@ -24583,7 +25156,7 @@
     </p:spTree>
     <p:extLst>
       <p:ext uri="{BB962C8B-B14F-4D97-AF65-F5344CB8AC3E}">
-        <p14:creationId xmlns:p14="http://schemas.microsoft.com/office/powerpoint/2010/main" val="978339327"/>
+        <p14:creationId xmlns:p14="http://schemas.microsoft.com/office/powerpoint/2010/main" val="3201399576"/>
       </p:ext>
     </p:extLst>
   </p:cSld>
@@ -24596,14 +25169,6 @@
 <file path=ppt/slides/slide61.xml><?xml version="1.0" encoding="utf-8"?>
 <p:sld xmlns:a="http://schemas.openxmlformats.org/drawingml/2006/main" xmlns:r="http://schemas.openxmlformats.org/officeDocument/2006/relationships" xmlns:p="http://schemas.openxmlformats.org/presentationml/2006/main">
   <p:cSld>
-    <p:bg>
-      <p:bgPr>
-        <a:solidFill>
-          <a:schemeClr val="bg1"/>
-        </a:solidFill>
-        <a:effectLst/>
-      </p:bgPr>
-    </p:bg>
     <p:spTree>
       <p:nvGrpSpPr>
         <p:cNvPr id="1" name=""/>
@@ -24618,193 +25183,12 @@
           <a:chExt cx="0" cy="0"/>
         </a:xfrm>
       </p:grpSpPr>
-      <p:sp useBgFill="1">
-        <p:nvSpPr>
-          <p:cNvPr id="26" name="!!BGRectangle">
-            <a:extLst>
-              <a:ext uri="{FF2B5EF4-FFF2-40B4-BE49-F238E27FC236}">
-                <a16:creationId xmlns:a16="http://schemas.microsoft.com/office/drawing/2014/main" id="{9CC67894-1D18-43E0-B8E1-ECF37EB0D4B5}"/>
-              </a:ext>
-              <a:ext uri="{C183D7F6-B498-43B3-948B-1728B52AA6E4}">
-                <adec:decorative xmlns:adec="http://schemas.microsoft.com/office/drawing/2017/decorative" val="1"/>
-              </a:ext>
-            </a:extLst>
-          </p:cNvPr>
-          <p:cNvSpPr>
-            <a:spLocks noGrp="1" noRot="1" noChangeAspect="1" noMove="1" noResize="1" noEditPoints="1" noAdjustHandles="1" noChangeArrowheads="1" noChangeShapeType="1" noTextEdit="1"/>
-          </p:cNvSpPr>
-          <p:nvPr>
-            <p:extLst>
-              <p:ext uri="{386F3935-93C4-4BCD-93E2-E3B085C9AB24}">
-                <p16:designElem xmlns:p16="http://schemas.microsoft.com/office/powerpoint/2015/main" val="1"/>
-              </p:ext>
-            </p:extLst>
-          </p:nvPr>
-        </p:nvSpPr>
-        <p:spPr>
-          <a:xfrm>
-            <a:off x="3048" y="-6182"/>
-            <a:ext cx="12188952" cy="6858000"/>
-          </a:xfrm>
-          <a:prstGeom prst="rect">
-            <a:avLst/>
-          </a:prstGeom>
-          <a:ln>
-            <a:noFill/>
-          </a:ln>
-        </p:spPr>
-        <p:style>
-          <a:lnRef idx="2">
-            <a:schemeClr val="accent1">
-              <a:shade val="50000"/>
-            </a:schemeClr>
-          </a:lnRef>
-          <a:fillRef idx="1">
-            <a:schemeClr val="accent1"/>
-          </a:fillRef>
-          <a:effectRef idx="0">
-            <a:schemeClr val="accent1"/>
-          </a:effectRef>
-          <a:fontRef idx="minor">
-            <a:schemeClr val="lt1"/>
-          </a:fontRef>
-        </p:style>
-        <p:txBody>
-          <a:bodyPr rtlCol="0" anchor="ctr"/>
-          <a:lstStyle/>
-          <a:p>
-            <a:pPr marL="0" marR="0" lvl="0" indent="0" algn="ctr" defTabSz="914400" rtl="0" eaLnBrk="1" fontAlgn="auto" latinLnBrk="0" hangingPunct="1">
-              <a:lnSpc>
-                <a:spcPct val="100000"/>
-              </a:lnSpc>
-              <a:spcBef>
-                <a:spcPts val="0"/>
-              </a:spcBef>
-              <a:spcAft>
-                <a:spcPts val="0"/>
-              </a:spcAft>
-              <a:buClrTx/>
-              <a:buSzTx/>
-              <a:buFontTx/>
-              <a:buNone/>
-              <a:tabLst/>
-              <a:defRPr/>
-            </a:pPr>
-            <a:endParaRPr kumimoji="0" lang="en-US" sz="1800" b="0" i="0" u="none" strike="noStrike" kern="1200" cap="none" spc="0" normalizeH="0" baseline="0" noProof="0">
-              <a:ln>
-                <a:noFill/>
-              </a:ln>
-              <a:solidFill>
-                <a:prstClr val="white"/>
-              </a:solidFill>
-              <a:effectLst/>
-              <a:uLnTx/>
-              <a:uFillTx/>
-              <a:latin typeface="Calibri" panose="020F0502020204030204"/>
-              <a:ea typeface="+mn-ea"/>
-              <a:cs typeface="+mn-cs"/>
-            </a:endParaRPr>
-          </a:p>
-        </p:txBody>
-      </p:sp>
-      <p:sp>
-        <p:nvSpPr>
-          <p:cNvPr id="28" name="Rectangle 27">
-            <a:extLst>
-              <a:ext uri="{FF2B5EF4-FFF2-40B4-BE49-F238E27FC236}">
-                <a16:creationId xmlns:a16="http://schemas.microsoft.com/office/drawing/2014/main" id="{A13E3398-4840-4DA1-B674-51AE569B24F9}"/>
-              </a:ext>
-              <a:ext uri="{C183D7F6-B498-43B3-948B-1728B52AA6E4}">
-                <adec:decorative xmlns:adec="http://schemas.microsoft.com/office/drawing/2017/decorative" val="1"/>
-              </a:ext>
-            </a:extLst>
-          </p:cNvPr>
-          <p:cNvSpPr>
-            <a:spLocks noGrp="1" noRot="1" noChangeAspect="1" noMove="1" noResize="1" noEditPoints="1" noAdjustHandles="1" noChangeArrowheads="1" noChangeShapeType="1" noTextEdit="1"/>
-          </p:cNvSpPr>
-          <p:nvPr>
-            <p:extLst>
-              <p:ext uri="{386F3935-93C4-4BCD-93E2-E3B085C9AB24}">
-                <p16:designElem xmlns:p16="http://schemas.microsoft.com/office/powerpoint/2015/main" val="1"/>
-              </p:ext>
-            </p:extLst>
-          </p:nvPr>
-        </p:nvSpPr>
-        <p:spPr>
-          <a:xfrm>
-            <a:off x="0" y="0"/>
-            <a:ext cx="12188952" cy="6858000"/>
-          </a:xfrm>
-          <a:prstGeom prst="rect">
-            <a:avLst/>
-          </a:prstGeom>
-          <a:solidFill>
-            <a:srgbClr val="000000"/>
-          </a:solidFill>
-          <a:ln>
-            <a:noFill/>
-          </a:ln>
-        </p:spPr>
-        <p:style>
-          <a:lnRef idx="2">
-            <a:schemeClr val="accent1">
-              <a:shade val="50000"/>
-            </a:schemeClr>
-          </a:lnRef>
-          <a:fillRef idx="1">
-            <a:schemeClr val="accent1"/>
-          </a:fillRef>
-          <a:effectRef idx="0">
-            <a:schemeClr val="accent1"/>
-          </a:effectRef>
-          <a:fontRef idx="minor">
-            <a:schemeClr val="lt1"/>
-          </a:fontRef>
-        </p:style>
-        <p:txBody>
-          <a:bodyPr rtlCol="0" anchor="ctr"/>
-          <a:lstStyle/>
-          <a:p>
-            <a:pPr marL="0" marR="0" lvl="0" indent="0" algn="ctr" defTabSz="914400" rtl="0" eaLnBrk="1" fontAlgn="auto" latinLnBrk="0" hangingPunct="1">
-              <a:lnSpc>
-                <a:spcPct val="100000"/>
-              </a:lnSpc>
-              <a:spcBef>
-                <a:spcPts val="0"/>
-              </a:spcBef>
-              <a:spcAft>
-                <a:spcPts val="0"/>
-              </a:spcAft>
-              <a:buClrTx/>
-              <a:buSzTx/>
-              <a:buFontTx/>
-              <a:buNone/>
-              <a:tabLst/>
-              <a:defRPr/>
-            </a:pPr>
-            <a:endParaRPr kumimoji="0" lang="en-US" sz="1800" b="0" i="0" u="none" strike="noStrike" kern="1200" cap="none" spc="0" normalizeH="0" baseline="0" noProof="0">
-              <a:ln>
-                <a:noFill/>
-              </a:ln>
-              <a:solidFill>
-                <a:prstClr val="white"/>
-              </a:solidFill>
-              <a:effectLst/>
-              <a:uLnTx/>
-              <a:uFillTx/>
-              <a:latin typeface="Calibri" panose="020F0502020204030204"/>
-              <a:ea typeface="+mn-ea"/>
-              <a:cs typeface="+mn-cs"/>
-            </a:endParaRPr>
-          </a:p>
-        </p:txBody>
-      </p:sp>
       <p:pic>
         <p:nvPicPr>
-          <p:cNvPr id="5" name="Picture 4" descr="Logo&#10;&#10;Description automatically generated">
-            <a:extLst>
-              <a:ext uri="{FF2B5EF4-FFF2-40B4-BE49-F238E27FC236}">
-                <a16:creationId xmlns:a16="http://schemas.microsoft.com/office/drawing/2014/main" id="{1485635D-4D96-E6AD-65A7-BBB6DBDB904F}"/>
+          <p:cNvPr id="4" name="Picture 3" descr="Graphical user interface&#10;&#10;Description automatically generated">
+            <a:extLst>
+              <a:ext uri="{FF2B5EF4-FFF2-40B4-BE49-F238E27FC236}">
+                <a16:creationId xmlns:a16="http://schemas.microsoft.com/office/drawing/2014/main" id="{550AA350-28B9-6B79-3143-27740BD1B144}"/>
               </a:ext>
             </a:extLst>
           </p:cNvPr>
@@ -24813,235 +25197,32 @@
           </p:cNvPicPr>
           <p:nvPr/>
         </p:nvPicPr>
-        <p:blipFill rotWithShape="1">
+        <p:blipFill>
           <a:blip r:embed="rId2">
-            <a:alphaModFix amt="50000"/>
-            <a:extLst>
-              <a:ext uri="{BEBA8EAE-BF5A-486C-A8C5-ECC9F3942E4B}">
-                <a14:imgProps xmlns:a14="http://schemas.microsoft.com/office/drawing/2010/main">
-                  <a14:imgLayer r:embed="rId3">
-                    <a14:imgEffect>
-                      <a14:sharpenSoften amount="-20000"/>
-                    </a14:imgEffect>
-                    <a14:imgEffect>
-                      <a14:brightnessContrast bright="-30000"/>
-                    </a14:imgEffect>
-                  </a14:imgLayer>
-                </a14:imgProps>
-              </a:ext>
+            <a:extLst>
               <a:ext uri="{28A0092B-C50C-407E-A947-70E740481C1C}">
                 <a14:useLocalDpi xmlns:a14="http://schemas.microsoft.com/office/drawing/2010/main" val="0"/>
               </a:ext>
             </a:extLst>
           </a:blip>
-          <a:srcRect t="17370" r="-2" b="26379"/>
-          <a:stretch/>
+          <a:stretch>
+            <a:fillRect/>
+          </a:stretch>
         </p:blipFill>
         <p:spPr>
           <a:xfrm>
-            <a:off x="-3048" y="1"/>
-            <a:ext cx="12191980" cy="6857999"/>
+            <a:off x="518334" y="156706"/>
+            <a:ext cx="11155332" cy="6544588"/>
           </a:xfrm>
           <a:prstGeom prst="rect">
             <a:avLst/>
           </a:prstGeom>
         </p:spPr>
       </p:pic>
-      <p:sp>
-        <p:nvSpPr>
-          <p:cNvPr id="2" name="Title 1">
-            <a:extLst>
-              <a:ext uri="{FF2B5EF4-FFF2-40B4-BE49-F238E27FC236}">
-                <a16:creationId xmlns:a16="http://schemas.microsoft.com/office/drawing/2014/main" id="{57542169-E59A-481B-15D1-67FB940F43E9}"/>
-              </a:ext>
-            </a:extLst>
-          </p:cNvPr>
-          <p:cNvSpPr>
-            <a:spLocks noGrp="1"/>
-          </p:cNvSpPr>
-          <p:nvPr>
-            <p:ph type="title"/>
-          </p:nvPr>
-        </p:nvSpPr>
-        <p:spPr>
-          <a:xfrm>
-            <a:off x="943276" y="712268"/>
-            <a:ext cx="10410524" cy="1193533"/>
-          </a:xfrm>
-        </p:spPr>
-        <p:txBody>
-          <a:bodyPr>
-            <a:normAutofit/>
-          </a:bodyPr>
-          <a:lstStyle/>
-          <a:p>
-            <a:r>
-              <a:rPr lang="pt-BR" sz="6500" b="1" dirty="0">
-                <a:solidFill>
-                  <a:srgbClr val="FFFFFF"/>
-                </a:solidFill>
-              </a:rPr>
-              <a:t>DEMONSTRAÇÃO FUNCIONAL</a:t>
-            </a:r>
-            <a:endParaRPr lang="en-US" sz="6500" b="1" dirty="0">
-              <a:solidFill>
-                <a:srgbClr val="FFFFFF"/>
-              </a:solidFill>
-            </a:endParaRPr>
-          </a:p>
-        </p:txBody>
-      </p:sp>
-      <p:sp>
-        <p:nvSpPr>
-          <p:cNvPr id="30" name="!!Line">
-            <a:extLst>
-              <a:ext uri="{FF2B5EF4-FFF2-40B4-BE49-F238E27FC236}">
-                <a16:creationId xmlns:a16="http://schemas.microsoft.com/office/drawing/2014/main" id="{83306AB0-8BF5-43D5-B5E2-C53EA0783845}"/>
-              </a:ext>
-              <a:ext uri="{C183D7F6-B498-43B3-948B-1728B52AA6E4}">
-                <adec:decorative xmlns:adec="http://schemas.microsoft.com/office/drawing/2017/decorative" val="1"/>
-              </a:ext>
-            </a:extLst>
-          </p:cNvPr>
-          <p:cNvSpPr>
-            <a:spLocks noGrp="1" noRot="1" noChangeAspect="1" noMove="1" noResize="1" noEditPoints="1" noAdjustHandles="1" noChangeArrowheads="1" noChangeShapeType="1" noTextEdit="1"/>
-          </p:cNvSpPr>
-          <p:nvPr>
-            <p:extLst>
-              <p:ext uri="{386F3935-93C4-4BCD-93E2-E3B085C9AB24}">
-                <p16:designElem xmlns:p16="http://schemas.microsoft.com/office/powerpoint/2015/main" val="1"/>
-              </p:ext>
-            </p:extLst>
-          </p:nvPr>
-        </p:nvSpPr>
-        <p:spPr>
-          <a:xfrm>
-            <a:off x="762000" y="826324"/>
-            <a:ext cx="27432" cy="914400"/>
-          </a:xfrm>
-          <a:prstGeom prst="rect">
-            <a:avLst/>
-          </a:prstGeom>
-          <a:solidFill>
-            <a:srgbClr val="FFFFFF"/>
-          </a:solidFill>
-          <a:ln>
-            <a:noFill/>
-          </a:ln>
-        </p:spPr>
-        <p:style>
-          <a:lnRef idx="2">
-            <a:schemeClr val="accent1">
-              <a:shade val="50000"/>
-            </a:schemeClr>
-          </a:lnRef>
-          <a:fillRef idx="1">
-            <a:schemeClr val="accent1"/>
-          </a:fillRef>
-          <a:effectRef idx="0">
-            <a:schemeClr val="accent1"/>
-          </a:effectRef>
-          <a:fontRef idx="minor">
-            <a:schemeClr val="lt1"/>
-          </a:fontRef>
-        </p:style>
-        <p:txBody>
-          <a:bodyPr rtlCol="0" anchor="ctr"/>
-          <a:lstStyle/>
-          <a:p>
-            <a:pPr marL="0" marR="0" lvl="0" indent="0" algn="ctr" defTabSz="914400" rtl="0" eaLnBrk="1" fontAlgn="auto" latinLnBrk="0" hangingPunct="1">
-              <a:lnSpc>
-                <a:spcPct val="100000"/>
-              </a:lnSpc>
-              <a:spcBef>
-                <a:spcPts val="0"/>
-              </a:spcBef>
-              <a:spcAft>
-                <a:spcPts val="0"/>
-              </a:spcAft>
-              <a:buClrTx/>
-              <a:buSzTx/>
-              <a:buFontTx/>
-              <a:buNone/>
-              <a:tabLst/>
-              <a:defRPr/>
-            </a:pPr>
-            <a:endParaRPr kumimoji="0" lang="en-US" sz="1800" b="0" i="0" u="none" strike="noStrike" kern="1200" cap="none" spc="0" normalizeH="0" baseline="0" noProof="0">
-              <a:ln>
-                <a:noFill/>
-              </a:ln>
-              <a:solidFill>
-                <a:prstClr val="white"/>
-              </a:solidFill>
-              <a:effectLst/>
-              <a:uLnTx/>
-              <a:uFillTx/>
-              <a:latin typeface="Calibri" panose="020F0502020204030204"/>
-              <a:ea typeface="+mn-ea"/>
-              <a:cs typeface="+mn-cs"/>
-            </a:endParaRPr>
-          </a:p>
-        </p:txBody>
-      </p:sp>
-      <p:sp>
-        <p:nvSpPr>
-          <p:cNvPr id="3" name="Content Placeholder 2">
-            <a:extLst>
-              <a:ext uri="{FF2B5EF4-FFF2-40B4-BE49-F238E27FC236}">
-                <a16:creationId xmlns:a16="http://schemas.microsoft.com/office/drawing/2014/main" id="{83FCD086-7677-FA17-701D-63D5D7664A00}"/>
-              </a:ext>
-            </a:extLst>
-          </p:cNvPr>
-          <p:cNvSpPr>
-            <a:spLocks noGrp="1"/>
-          </p:cNvSpPr>
-          <p:nvPr>
-            <p:ph idx="1"/>
-          </p:nvPr>
-        </p:nvSpPr>
-        <p:spPr>
-          <a:xfrm>
-            <a:off x="943276" y="2236995"/>
-            <a:ext cx="10410524" cy="4126782"/>
-          </a:xfrm>
-        </p:spPr>
-        <p:txBody>
-          <a:bodyPr anchor="ctr">
-            <a:normAutofit/>
-          </a:bodyPr>
-          <a:lstStyle/>
-          <a:p>
-            <a:pPr marL="0" indent="0" algn="ctr">
-              <a:buNone/>
-            </a:pPr>
-            <a:r>
-              <a:rPr lang="pt-BR" sz="5000" dirty="0">
-                <a:solidFill>
-                  <a:srgbClr val="FFFFFF"/>
-                </a:solidFill>
-              </a:rPr>
-              <a:t>Back-</a:t>
-            </a:r>
-            <a:r>
-              <a:rPr lang="pt-BR" sz="5000" dirty="0" err="1">
-                <a:solidFill>
-                  <a:srgbClr val="FFFFFF"/>
-                </a:solidFill>
-              </a:rPr>
-              <a:t>end</a:t>
-            </a:r>
-            <a:endParaRPr lang="pt-BR" sz="5000" dirty="0">
-              <a:solidFill>
-                <a:srgbClr val="FFFFFF"/>
-              </a:solidFill>
-            </a:endParaRPr>
-          </a:p>
-        </p:txBody>
-      </p:sp>
     </p:spTree>
     <p:extLst>
       <p:ext uri="{BB962C8B-B14F-4D97-AF65-F5344CB8AC3E}">
-        <p14:creationId xmlns:p14="http://schemas.microsoft.com/office/powerpoint/2010/main" val="2672312400"/>
+        <p14:creationId xmlns:p14="http://schemas.microsoft.com/office/powerpoint/2010/main" val="4223881699"/>
       </p:ext>
     </p:extLst>
   </p:cSld>
@@ -25054,14 +25235,6 @@
 <file path=ppt/slides/slide62.xml><?xml version="1.0" encoding="utf-8"?>
 <p:sld xmlns:a="http://schemas.openxmlformats.org/drawingml/2006/main" xmlns:r="http://schemas.openxmlformats.org/officeDocument/2006/relationships" xmlns:p="http://schemas.openxmlformats.org/presentationml/2006/main">
   <p:cSld>
-    <p:bg>
-      <p:bgPr>
-        <a:solidFill>
-          <a:schemeClr val="bg1"/>
-        </a:solidFill>
-        <a:effectLst/>
-      </p:bgPr>
-    </p:bg>
     <p:spTree>
       <p:nvGrpSpPr>
         <p:cNvPr id="1" name=""/>
@@ -25076,193 +25249,12 @@
           <a:chExt cx="0" cy="0"/>
         </a:xfrm>
       </p:grpSpPr>
-      <p:sp useBgFill="1">
-        <p:nvSpPr>
-          <p:cNvPr id="26" name="!!BGRectangle">
-            <a:extLst>
-              <a:ext uri="{FF2B5EF4-FFF2-40B4-BE49-F238E27FC236}">
-                <a16:creationId xmlns:a16="http://schemas.microsoft.com/office/drawing/2014/main" id="{9CC67894-1D18-43E0-B8E1-ECF37EB0D4B5}"/>
-              </a:ext>
-              <a:ext uri="{C183D7F6-B498-43B3-948B-1728B52AA6E4}">
-                <adec:decorative xmlns:adec="http://schemas.microsoft.com/office/drawing/2017/decorative" val="1"/>
-              </a:ext>
-            </a:extLst>
-          </p:cNvPr>
-          <p:cNvSpPr>
-            <a:spLocks noGrp="1" noRot="1" noChangeAspect="1" noMove="1" noResize="1" noEditPoints="1" noAdjustHandles="1" noChangeArrowheads="1" noChangeShapeType="1" noTextEdit="1"/>
-          </p:cNvSpPr>
-          <p:nvPr>
-            <p:extLst>
-              <p:ext uri="{386F3935-93C4-4BCD-93E2-E3B085C9AB24}">
-                <p16:designElem xmlns:p16="http://schemas.microsoft.com/office/powerpoint/2015/main" val="1"/>
-              </p:ext>
-            </p:extLst>
-          </p:nvPr>
-        </p:nvSpPr>
-        <p:spPr>
-          <a:xfrm>
-            <a:off x="3048" y="-6182"/>
-            <a:ext cx="12188952" cy="6858000"/>
-          </a:xfrm>
-          <a:prstGeom prst="rect">
-            <a:avLst/>
-          </a:prstGeom>
-          <a:ln>
-            <a:noFill/>
-          </a:ln>
-        </p:spPr>
-        <p:style>
-          <a:lnRef idx="2">
-            <a:schemeClr val="accent1">
-              <a:shade val="50000"/>
-            </a:schemeClr>
-          </a:lnRef>
-          <a:fillRef idx="1">
-            <a:schemeClr val="accent1"/>
-          </a:fillRef>
-          <a:effectRef idx="0">
-            <a:schemeClr val="accent1"/>
-          </a:effectRef>
-          <a:fontRef idx="minor">
-            <a:schemeClr val="lt1"/>
-          </a:fontRef>
-        </p:style>
-        <p:txBody>
-          <a:bodyPr rtlCol="0" anchor="ctr"/>
-          <a:lstStyle/>
-          <a:p>
-            <a:pPr marL="0" marR="0" lvl="0" indent="0" algn="ctr" defTabSz="914400" rtl="0" eaLnBrk="1" fontAlgn="auto" latinLnBrk="0" hangingPunct="1">
-              <a:lnSpc>
-                <a:spcPct val="100000"/>
-              </a:lnSpc>
-              <a:spcBef>
-                <a:spcPts val="0"/>
-              </a:spcBef>
-              <a:spcAft>
-                <a:spcPts val="0"/>
-              </a:spcAft>
-              <a:buClrTx/>
-              <a:buSzTx/>
-              <a:buFontTx/>
-              <a:buNone/>
-              <a:tabLst/>
-              <a:defRPr/>
-            </a:pPr>
-            <a:endParaRPr kumimoji="0" lang="en-US" sz="1800" b="0" i="0" u="none" strike="noStrike" kern="1200" cap="none" spc="0" normalizeH="0" baseline="0" noProof="0">
-              <a:ln>
-                <a:noFill/>
-              </a:ln>
-              <a:solidFill>
-                <a:prstClr val="white"/>
-              </a:solidFill>
-              <a:effectLst/>
-              <a:uLnTx/>
-              <a:uFillTx/>
-              <a:latin typeface="Calibri" panose="020F0502020204030204"/>
-              <a:ea typeface="+mn-ea"/>
-              <a:cs typeface="+mn-cs"/>
-            </a:endParaRPr>
-          </a:p>
-        </p:txBody>
-      </p:sp>
-      <p:sp>
-        <p:nvSpPr>
-          <p:cNvPr id="28" name="Rectangle 27">
-            <a:extLst>
-              <a:ext uri="{FF2B5EF4-FFF2-40B4-BE49-F238E27FC236}">
-                <a16:creationId xmlns:a16="http://schemas.microsoft.com/office/drawing/2014/main" id="{A13E3398-4840-4DA1-B674-51AE569B24F9}"/>
-              </a:ext>
-              <a:ext uri="{C183D7F6-B498-43B3-948B-1728B52AA6E4}">
-                <adec:decorative xmlns:adec="http://schemas.microsoft.com/office/drawing/2017/decorative" val="1"/>
-              </a:ext>
-            </a:extLst>
-          </p:cNvPr>
-          <p:cNvSpPr>
-            <a:spLocks noGrp="1" noRot="1" noChangeAspect="1" noMove="1" noResize="1" noEditPoints="1" noAdjustHandles="1" noChangeArrowheads="1" noChangeShapeType="1" noTextEdit="1"/>
-          </p:cNvSpPr>
-          <p:nvPr>
-            <p:extLst>
-              <p:ext uri="{386F3935-93C4-4BCD-93E2-E3B085C9AB24}">
-                <p16:designElem xmlns:p16="http://schemas.microsoft.com/office/powerpoint/2015/main" val="1"/>
-              </p:ext>
-            </p:extLst>
-          </p:nvPr>
-        </p:nvSpPr>
-        <p:spPr>
-          <a:xfrm>
-            <a:off x="0" y="0"/>
-            <a:ext cx="12188952" cy="6858000"/>
-          </a:xfrm>
-          <a:prstGeom prst="rect">
-            <a:avLst/>
-          </a:prstGeom>
-          <a:solidFill>
-            <a:srgbClr val="000000"/>
-          </a:solidFill>
-          <a:ln>
-            <a:noFill/>
-          </a:ln>
-        </p:spPr>
-        <p:style>
-          <a:lnRef idx="2">
-            <a:schemeClr val="accent1">
-              <a:shade val="50000"/>
-            </a:schemeClr>
-          </a:lnRef>
-          <a:fillRef idx="1">
-            <a:schemeClr val="accent1"/>
-          </a:fillRef>
-          <a:effectRef idx="0">
-            <a:schemeClr val="accent1"/>
-          </a:effectRef>
-          <a:fontRef idx="minor">
-            <a:schemeClr val="lt1"/>
-          </a:fontRef>
-        </p:style>
-        <p:txBody>
-          <a:bodyPr rtlCol="0" anchor="ctr"/>
-          <a:lstStyle/>
-          <a:p>
-            <a:pPr marL="0" marR="0" lvl="0" indent="0" algn="ctr" defTabSz="914400" rtl="0" eaLnBrk="1" fontAlgn="auto" latinLnBrk="0" hangingPunct="1">
-              <a:lnSpc>
-                <a:spcPct val="100000"/>
-              </a:lnSpc>
-              <a:spcBef>
-                <a:spcPts val="0"/>
-              </a:spcBef>
-              <a:spcAft>
-                <a:spcPts val="0"/>
-              </a:spcAft>
-              <a:buClrTx/>
-              <a:buSzTx/>
-              <a:buFontTx/>
-              <a:buNone/>
-              <a:tabLst/>
-              <a:defRPr/>
-            </a:pPr>
-            <a:endParaRPr kumimoji="0" lang="en-US" sz="1800" b="0" i="0" u="none" strike="noStrike" kern="1200" cap="none" spc="0" normalizeH="0" baseline="0" noProof="0">
-              <a:ln>
-                <a:noFill/>
-              </a:ln>
-              <a:solidFill>
-                <a:prstClr val="white"/>
-              </a:solidFill>
-              <a:effectLst/>
-              <a:uLnTx/>
-              <a:uFillTx/>
-              <a:latin typeface="Calibri" panose="020F0502020204030204"/>
-              <a:ea typeface="+mn-ea"/>
-              <a:cs typeface="+mn-cs"/>
-            </a:endParaRPr>
-          </a:p>
-        </p:txBody>
-      </p:sp>
       <p:pic>
         <p:nvPicPr>
-          <p:cNvPr id="5" name="Picture 4" descr="Logo&#10;&#10;Description automatically generated">
-            <a:extLst>
-              <a:ext uri="{FF2B5EF4-FFF2-40B4-BE49-F238E27FC236}">
-                <a16:creationId xmlns:a16="http://schemas.microsoft.com/office/drawing/2014/main" id="{1485635D-4D96-E6AD-65A7-BBB6DBDB904F}"/>
+          <p:cNvPr id="3" name="Picture 2" descr="Table&#10;&#10;Description automatically generated">
+            <a:extLst>
+              <a:ext uri="{FF2B5EF4-FFF2-40B4-BE49-F238E27FC236}">
+                <a16:creationId xmlns:a16="http://schemas.microsoft.com/office/drawing/2014/main" id="{E485D4A4-EA7B-8814-60B5-A1BED2AA010D}"/>
               </a:ext>
             </a:extLst>
           </p:cNvPr>
@@ -25271,235 +25263,32 @@
           </p:cNvPicPr>
           <p:nvPr/>
         </p:nvPicPr>
-        <p:blipFill rotWithShape="1">
+        <p:blipFill>
           <a:blip r:embed="rId2">
-            <a:alphaModFix amt="50000"/>
-            <a:extLst>
-              <a:ext uri="{BEBA8EAE-BF5A-486C-A8C5-ECC9F3942E4B}">
-                <a14:imgProps xmlns:a14="http://schemas.microsoft.com/office/drawing/2010/main">
-                  <a14:imgLayer r:embed="rId3">
-                    <a14:imgEffect>
-                      <a14:sharpenSoften amount="-20000"/>
-                    </a14:imgEffect>
-                    <a14:imgEffect>
-                      <a14:brightnessContrast bright="-30000"/>
-                    </a14:imgEffect>
-                  </a14:imgLayer>
-                </a14:imgProps>
-              </a:ext>
+            <a:extLst>
               <a:ext uri="{28A0092B-C50C-407E-A947-70E740481C1C}">
                 <a14:useLocalDpi xmlns:a14="http://schemas.microsoft.com/office/drawing/2010/main" val="0"/>
               </a:ext>
             </a:extLst>
           </a:blip>
-          <a:srcRect t="17370" r="-2" b="26379"/>
-          <a:stretch/>
+          <a:stretch>
+            <a:fillRect/>
+          </a:stretch>
         </p:blipFill>
         <p:spPr>
           <a:xfrm>
-            <a:off x="-3048" y="1"/>
-            <a:ext cx="12191980" cy="6857999"/>
+            <a:off x="518334" y="156706"/>
+            <a:ext cx="11155332" cy="6544588"/>
           </a:xfrm>
           <a:prstGeom prst="rect">
             <a:avLst/>
           </a:prstGeom>
         </p:spPr>
       </p:pic>
-      <p:sp>
-        <p:nvSpPr>
-          <p:cNvPr id="2" name="Title 1">
-            <a:extLst>
-              <a:ext uri="{FF2B5EF4-FFF2-40B4-BE49-F238E27FC236}">
-                <a16:creationId xmlns:a16="http://schemas.microsoft.com/office/drawing/2014/main" id="{57542169-E59A-481B-15D1-67FB940F43E9}"/>
-              </a:ext>
-            </a:extLst>
-          </p:cNvPr>
-          <p:cNvSpPr>
-            <a:spLocks noGrp="1"/>
-          </p:cNvSpPr>
-          <p:nvPr>
-            <p:ph type="title"/>
-          </p:nvPr>
-        </p:nvSpPr>
-        <p:spPr>
-          <a:xfrm>
-            <a:off x="943276" y="712268"/>
-            <a:ext cx="10410524" cy="1193533"/>
-          </a:xfrm>
-        </p:spPr>
-        <p:txBody>
-          <a:bodyPr>
-            <a:normAutofit/>
-          </a:bodyPr>
-          <a:lstStyle/>
-          <a:p>
-            <a:r>
-              <a:rPr lang="pt-BR" sz="6500" b="1" dirty="0">
-                <a:solidFill>
-                  <a:srgbClr val="FFFFFF"/>
-                </a:solidFill>
-              </a:rPr>
-              <a:t>DEMONSTRAÇÃO FUNCIONAL</a:t>
-            </a:r>
-            <a:endParaRPr lang="en-US" sz="6500" b="1" dirty="0">
-              <a:solidFill>
-                <a:srgbClr val="FFFFFF"/>
-              </a:solidFill>
-            </a:endParaRPr>
-          </a:p>
-        </p:txBody>
-      </p:sp>
-      <p:sp>
-        <p:nvSpPr>
-          <p:cNvPr id="30" name="!!Line">
-            <a:extLst>
-              <a:ext uri="{FF2B5EF4-FFF2-40B4-BE49-F238E27FC236}">
-                <a16:creationId xmlns:a16="http://schemas.microsoft.com/office/drawing/2014/main" id="{83306AB0-8BF5-43D5-B5E2-C53EA0783845}"/>
-              </a:ext>
-              <a:ext uri="{C183D7F6-B498-43B3-948B-1728B52AA6E4}">
-                <adec:decorative xmlns:adec="http://schemas.microsoft.com/office/drawing/2017/decorative" val="1"/>
-              </a:ext>
-            </a:extLst>
-          </p:cNvPr>
-          <p:cNvSpPr>
-            <a:spLocks noGrp="1" noRot="1" noChangeAspect="1" noMove="1" noResize="1" noEditPoints="1" noAdjustHandles="1" noChangeArrowheads="1" noChangeShapeType="1" noTextEdit="1"/>
-          </p:cNvSpPr>
-          <p:nvPr>
-            <p:extLst>
-              <p:ext uri="{386F3935-93C4-4BCD-93E2-E3B085C9AB24}">
-                <p16:designElem xmlns:p16="http://schemas.microsoft.com/office/powerpoint/2015/main" val="1"/>
-              </p:ext>
-            </p:extLst>
-          </p:nvPr>
-        </p:nvSpPr>
-        <p:spPr>
-          <a:xfrm>
-            <a:off x="762000" y="826324"/>
-            <a:ext cx="27432" cy="914400"/>
-          </a:xfrm>
-          <a:prstGeom prst="rect">
-            <a:avLst/>
-          </a:prstGeom>
-          <a:solidFill>
-            <a:srgbClr val="FFFFFF"/>
-          </a:solidFill>
-          <a:ln>
-            <a:noFill/>
-          </a:ln>
-        </p:spPr>
-        <p:style>
-          <a:lnRef idx="2">
-            <a:schemeClr val="accent1">
-              <a:shade val="50000"/>
-            </a:schemeClr>
-          </a:lnRef>
-          <a:fillRef idx="1">
-            <a:schemeClr val="accent1"/>
-          </a:fillRef>
-          <a:effectRef idx="0">
-            <a:schemeClr val="accent1"/>
-          </a:effectRef>
-          <a:fontRef idx="minor">
-            <a:schemeClr val="lt1"/>
-          </a:fontRef>
-        </p:style>
-        <p:txBody>
-          <a:bodyPr rtlCol="0" anchor="ctr"/>
-          <a:lstStyle/>
-          <a:p>
-            <a:pPr marL="0" marR="0" lvl="0" indent="0" algn="ctr" defTabSz="914400" rtl="0" eaLnBrk="1" fontAlgn="auto" latinLnBrk="0" hangingPunct="1">
-              <a:lnSpc>
-                <a:spcPct val="100000"/>
-              </a:lnSpc>
-              <a:spcBef>
-                <a:spcPts val="0"/>
-              </a:spcBef>
-              <a:spcAft>
-                <a:spcPts val="0"/>
-              </a:spcAft>
-              <a:buClrTx/>
-              <a:buSzTx/>
-              <a:buFontTx/>
-              <a:buNone/>
-              <a:tabLst/>
-              <a:defRPr/>
-            </a:pPr>
-            <a:endParaRPr kumimoji="0" lang="en-US" sz="1800" b="0" i="0" u="none" strike="noStrike" kern="1200" cap="none" spc="0" normalizeH="0" baseline="0" noProof="0">
-              <a:ln>
-                <a:noFill/>
-              </a:ln>
-              <a:solidFill>
-                <a:prstClr val="white"/>
-              </a:solidFill>
-              <a:effectLst/>
-              <a:uLnTx/>
-              <a:uFillTx/>
-              <a:latin typeface="Calibri" panose="020F0502020204030204"/>
-              <a:ea typeface="+mn-ea"/>
-              <a:cs typeface="+mn-cs"/>
-            </a:endParaRPr>
-          </a:p>
-        </p:txBody>
-      </p:sp>
-      <p:sp>
-        <p:nvSpPr>
-          <p:cNvPr id="3" name="Content Placeholder 2">
-            <a:extLst>
-              <a:ext uri="{FF2B5EF4-FFF2-40B4-BE49-F238E27FC236}">
-                <a16:creationId xmlns:a16="http://schemas.microsoft.com/office/drawing/2014/main" id="{83FCD086-7677-FA17-701D-63D5D7664A00}"/>
-              </a:ext>
-            </a:extLst>
-          </p:cNvPr>
-          <p:cNvSpPr>
-            <a:spLocks noGrp="1"/>
-          </p:cNvSpPr>
-          <p:nvPr>
-            <p:ph idx="1"/>
-          </p:nvPr>
-        </p:nvSpPr>
-        <p:spPr>
-          <a:xfrm>
-            <a:off x="943276" y="2236995"/>
-            <a:ext cx="10410524" cy="4126782"/>
-          </a:xfrm>
-        </p:spPr>
-        <p:txBody>
-          <a:bodyPr anchor="ctr">
-            <a:normAutofit/>
-          </a:bodyPr>
-          <a:lstStyle/>
-          <a:p>
-            <a:pPr marL="0" indent="0" algn="ctr">
-              <a:buNone/>
-            </a:pPr>
-            <a:r>
-              <a:rPr lang="pt-BR" sz="5000" dirty="0">
-                <a:solidFill>
-                  <a:srgbClr val="FFFFFF"/>
-                </a:solidFill>
-              </a:rPr>
-              <a:t>Front-</a:t>
-            </a:r>
-            <a:r>
-              <a:rPr lang="pt-BR" sz="5000" dirty="0" err="1">
-                <a:solidFill>
-                  <a:srgbClr val="FFFFFF"/>
-                </a:solidFill>
-              </a:rPr>
-              <a:t>end</a:t>
-            </a:r>
-            <a:endParaRPr lang="pt-BR" sz="5000" dirty="0">
-              <a:solidFill>
-                <a:srgbClr val="FFFFFF"/>
-              </a:solidFill>
-            </a:endParaRPr>
-          </a:p>
-        </p:txBody>
-      </p:sp>
     </p:spTree>
     <p:extLst>
       <p:ext uri="{BB962C8B-B14F-4D97-AF65-F5344CB8AC3E}">
-        <p14:creationId xmlns:p14="http://schemas.microsoft.com/office/powerpoint/2010/main" val="3521585858"/>
+        <p14:creationId xmlns:p14="http://schemas.microsoft.com/office/powerpoint/2010/main" val="978339327"/>
       </p:ext>
     </p:extLst>
   </p:cSld>
@@ -25542,7 +25331,7 @@
                 <a16:creationId xmlns:a16="http://schemas.microsoft.com/office/drawing/2014/main" id="{9CC67894-1D18-43E0-B8E1-ECF37EB0D4B5}"/>
               </a:ext>
               <a:ext uri="{C183D7F6-B498-43B3-948B-1728B52AA6E4}">
-                <adec:decorative xmlns:adec="http://schemas.microsoft.com/office/drawing/2017/decorative" val="1"/>
+                <adec:decorative xmlns:adec="http://schemas.microsoft.com/office/drawing/2017/decorative" xmlns="" val="1"/>
               </a:ext>
             </a:extLst>
           </p:cNvPr>
@@ -25631,7 +25420,7 @@
                 <a16:creationId xmlns:a16="http://schemas.microsoft.com/office/drawing/2014/main" id="{A13E3398-4840-4DA1-B674-51AE569B24F9}"/>
               </a:ext>
               <a:ext uri="{C183D7F6-B498-43B3-948B-1728B52AA6E4}">
-                <adec:decorative xmlns:adec="http://schemas.microsoft.com/office/drawing/2017/decorative" val="1"/>
+                <adec:decorative xmlns:adec="http://schemas.microsoft.com/office/drawing/2017/decorative" xmlns="" val="1"/>
               </a:ext>
             </a:extLst>
           </p:cNvPr>
@@ -25755,7 +25544,7 @@
         </p:blipFill>
         <p:spPr>
           <a:xfrm>
-            <a:off x="-3028" y="6182"/>
+            <a:off x="-3048" y="1"/>
             <a:ext cx="12191980" cy="6857999"/>
           </a:xfrm>
           <a:prstGeom prst="rect">
@@ -25797,7 +25586,7 @@
                   <a:srgbClr val="FFFFFF"/>
                 </a:solidFill>
               </a:rPr>
-              <a:t>CONCLUSÃO</a:t>
+              <a:t>DEMONSTRAÇÃO FUNCIONAL</a:t>
             </a:r>
             <a:endParaRPr lang="en-US" sz="6500" b="1" dirty="0">
               <a:solidFill>
@@ -25815,7 +25604,7 @@
                 <a16:creationId xmlns:a16="http://schemas.microsoft.com/office/drawing/2014/main" id="{83306AB0-8BF5-43D5-B5E2-C53EA0783845}"/>
               </a:ext>
               <a:ext uri="{C183D7F6-B498-43B3-948B-1728B52AA6E4}">
-                <adec:decorative xmlns:adec="http://schemas.microsoft.com/office/drawing/2017/decorative" val="1"/>
+                <adec:decorative xmlns:adec="http://schemas.microsoft.com/office/drawing/2017/decorative" xmlns="" val="1"/>
               </a:ext>
             </a:extLst>
           </p:cNvPr>
@@ -25927,41 +25716,37 @@
           </a:bodyPr>
           <a:lstStyle/>
           <a:p>
+            <a:pPr marL="0" indent="0" algn="ctr">
+              <a:buNone/>
+            </a:pPr>
             <a:r>
               <a:rPr lang="pt-BR" sz="5000" dirty="0">
                 <a:solidFill>
                   <a:srgbClr val="FFFFFF"/>
                 </a:solidFill>
               </a:rPr>
-              <a:t>União da equipe</a:t>
-            </a:r>
-          </a:p>
-          <a:p>
-            <a:r>
-              <a:rPr lang="pt-BR" sz="5000" dirty="0">
+              <a:t>Back-</a:t>
+            </a:r>
+            <a:r>
+              <a:rPr lang="pt-BR" sz="5000" dirty="0" err="1">
                 <a:solidFill>
                   <a:srgbClr val="FFFFFF"/>
                 </a:solidFill>
               </a:rPr>
-              <a:t>Organização de tempo</a:t>
-            </a:r>
-          </a:p>
-          <a:p>
-            <a:r>
-              <a:rPr lang="pt-BR" sz="5000" dirty="0">
-                <a:solidFill>
-                  <a:srgbClr val="FFFFFF"/>
-                </a:solidFill>
-              </a:rPr>
-              <a:t>Conhecimento adquirido</a:t>
-            </a:r>
+              <a:t>end</a:t>
+            </a:r>
+            <a:endParaRPr lang="pt-BR" sz="5000" dirty="0">
+              <a:solidFill>
+                <a:srgbClr val="FFFFFF"/>
+              </a:solidFill>
+            </a:endParaRPr>
           </a:p>
         </p:txBody>
       </p:sp>
     </p:spTree>
     <p:extLst>
       <p:ext uri="{BB962C8B-B14F-4D97-AF65-F5344CB8AC3E}">
-        <p14:creationId xmlns:p14="http://schemas.microsoft.com/office/powerpoint/2010/main" val="2155276036"/>
+        <p14:creationId xmlns:p14="http://schemas.microsoft.com/office/powerpoint/2010/main" val="2672312400"/>
       </p:ext>
     </p:extLst>
   </p:cSld>
@@ -26004,7 +25789,7 @@
                 <a16:creationId xmlns:a16="http://schemas.microsoft.com/office/drawing/2014/main" id="{9CC67894-1D18-43E0-B8E1-ECF37EB0D4B5}"/>
               </a:ext>
               <a:ext uri="{C183D7F6-B498-43B3-948B-1728B52AA6E4}">
-                <adec:decorative xmlns:adec="http://schemas.microsoft.com/office/drawing/2017/decorative" val="1"/>
+                <adec:decorative xmlns:adec="http://schemas.microsoft.com/office/drawing/2017/decorative" xmlns="" val="1"/>
               </a:ext>
             </a:extLst>
           </p:cNvPr>
@@ -26093,7 +25878,7 @@
                 <a16:creationId xmlns:a16="http://schemas.microsoft.com/office/drawing/2014/main" id="{A13E3398-4840-4DA1-B674-51AE569B24F9}"/>
               </a:ext>
               <a:ext uri="{C183D7F6-B498-43B3-948B-1728B52AA6E4}">
-                <adec:decorative xmlns:adec="http://schemas.microsoft.com/office/drawing/2017/decorative" val="1"/>
+                <adec:decorative xmlns:adec="http://schemas.microsoft.com/office/drawing/2017/decorative" xmlns="" val="1"/>
               </a:ext>
             </a:extLst>
           </p:cNvPr>
@@ -26259,7 +26044,7 @@
                   <a:srgbClr val="FFFFFF"/>
                 </a:solidFill>
               </a:rPr>
-              <a:t>REFERÊNCIAS</a:t>
+              <a:t>DEMONSTRAÇÃO FUNCIONAL</a:t>
             </a:r>
             <a:endParaRPr lang="en-US" sz="6500" b="1" dirty="0">
               <a:solidFill>
@@ -26277,7 +26062,927 @@
                 <a16:creationId xmlns:a16="http://schemas.microsoft.com/office/drawing/2014/main" id="{83306AB0-8BF5-43D5-B5E2-C53EA0783845}"/>
               </a:ext>
               <a:ext uri="{C183D7F6-B498-43B3-948B-1728B52AA6E4}">
-                <adec:decorative xmlns:adec="http://schemas.microsoft.com/office/drawing/2017/decorative" val="1"/>
+                <adec:decorative xmlns:adec="http://schemas.microsoft.com/office/drawing/2017/decorative" xmlns="" val="1"/>
+              </a:ext>
+            </a:extLst>
+          </p:cNvPr>
+          <p:cNvSpPr>
+            <a:spLocks noGrp="1" noRot="1" noChangeAspect="1" noMove="1" noResize="1" noEditPoints="1" noAdjustHandles="1" noChangeArrowheads="1" noChangeShapeType="1" noTextEdit="1"/>
+          </p:cNvSpPr>
+          <p:nvPr>
+            <p:extLst>
+              <p:ext uri="{386F3935-93C4-4BCD-93E2-E3B085C9AB24}">
+                <p16:designElem xmlns:p16="http://schemas.microsoft.com/office/powerpoint/2015/main" val="1"/>
+              </p:ext>
+            </p:extLst>
+          </p:nvPr>
+        </p:nvSpPr>
+        <p:spPr>
+          <a:xfrm>
+            <a:off x="762000" y="826324"/>
+            <a:ext cx="27432" cy="914400"/>
+          </a:xfrm>
+          <a:prstGeom prst="rect">
+            <a:avLst/>
+          </a:prstGeom>
+          <a:solidFill>
+            <a:srgbClr val="FFFFFF"/>
+          </a:solidFill>
+          <a:ln>
+            <a:noFill/>
+          </a:ln>
+        </p:spPr>
+        <p:style>
+          <a:lnRef idx="2">
+            <a:schemeClr val="accent1">
+              <a:shade val="50000"/>
+            </a:schemeClr>
+          </a:lnRef>
+          <a:fillRef idx="1">
+            <a:schemeClr val="accent1"/>
+          </a:fillRef>
+          <a:effectRef idx="0">
+            <a:schemeClr val="accent1"/>
+          </a:effectRef>
+          <a:fontRef idx="minor">
+            <a:schemeClr val="lt1"/>
+          </a:fontRef>
+        </p:style>
+        <p:txBody>
+          <a:bodyPr rtlCol="0" anchor="ctr"/>
+          <a:lstStyle/>
+          <a:p>
+            <a:pPr marL="0" marR="0" lvl="0" indent="0" algn="ctr" defTabSz="914400" rtl="0" eaLnBrk="1" fontAlgn="auto" latinLnBrk="0" hangingPunct="1">
+              <a:lnSpc>
+                <a:spcPct val="100000"/>
+              </a:lnSpc>
+              <a:spcBef>
+                <a:spcPts val="0"/>
+              </a:spcBef>
+              <a:spcAft>
+                <a:spcPts val="0"/>
+              </a:spcAft>
+              <a:buClrTx/>
+              <a:buSzTx/>
+              <a:buFontTx/>
+              <a:buNone/>
+              <a:tabLst/>
+              <a:defRPr/>
+            </a:pPr>
+            <a:endParaRPr kumimoji="0" lang="en-US" sz="1800" b="0" i="0" u="none" strike="noStrike" kern="1200" cap="none" spc="0" normalizeH="0" baseline="0" noProof="0">
+              <a:ln>
+                <a:noFill/>
+              </a:ln>
+              <a:solidFill>
+                <a:prstClr val="white"/>
+              </a:solidFill>
+              <a:effectLst/>
+              <a:uLnTx/>
+              <a:uFillTx/>
+              <a:latin typeface="Calibri" panose="020F0502020204030204"/>
+              <a:ea typeface="+mn-ea"/>
+              <a:cs typeface="+mn-cs"/>
+            </a:endParaRPr>
+          </a:p>
+        </p:txBody>
+      </p:sp>
+      <p:sp>
+        <p:nvSpPr>
+          <p:cNvPr id="3" name="Content Placeholder 2">
+            <a:extLst>
+              <a:ext uri="{FF2B5EF4-FFF2-40B4-BE49-F238E27FC236}">
+                <a16:creationId xmlns:a16="http://schemas.microsoft.com/office/drawing/2014/main" id="{83FCD086-7677-FA17-701D-63D5D7664A00}"/>
+              </a:ext>
+            </a:extLst>
+          </p:cNvPr>
+          <p:cNvSpPr>
+            <a:spLocks noGrp="1"/>
+          </p:cNvSpPr>
+          <p:nvPr>
+            <p:ph idx="1"/>
+          </p:nvPr>
+        </p:nvSpPr>
+        <p:spPr>
+          <a:xfrm>
+            <a:off x="943276" y="2236995"/>
+            <a:ext cx="10410524" cy="4126782"/>
+          </a:xfrm>
+        </p:spPr>
+        <p:txBody>
+          <a:bodyPr anchor="ctr">
+            <a:normAutofit/>
+          </a:bodyPr>
+          <a:lstStyle/>
+          <a:p>
+            <a:pPr marL="0" indent="0" algn="ctr">
+              <a:buNone/>
+            </a:pPr>
+            <a:r>
+              <a:rPr lang="pt-BR" sz="5000" dirty="0">
+                <a:solidFill>
+                  <a:srgbClr val="FFFFFF"/>
+                </a:solidFill>
+              </a:rPr>
+              <a:t>Front-</a:t>
+            </a:r>
+            <a:r>
+              <a:rPr lang="pt-BR" sz="5000" dirty="0" err="1">
+                <a:solidFill>
+                  <a:srgbClr val="FFFFFF"/>
+                </a:solidFill>
+              </a:rPr>
+              <a:t>end</a:t>
+            </a:r>
+            <a:endParaRPr lang="pt-BR" sz="5000" dirty="0">
+              <a:solidFill>
+                <a:srgbClr val="FFFFFF"/>
+              </a:solidFill>
+            </a:endParaRPr>
+          </a:p>
+        </p:txBody>
+      </p:sp>
+    </p:spTree>
+    <p:extLst>
+      <p:ext uri="{BB962C8B-B14F-4D97-AF65-F5344CB8AC3E}">
+        <p14:creationId xmlns:p14="http://schemas.microsoft.com/office/powerpoint/2010/main" val="3521585858"/>
+      </p:ext>
+    </p:extLst>
+  </p:cSld>
+  <p:clrMapOvr>
+    <a:masterClrMapping/>
+  </p:clrMapOvr>
+</p:sld>
+</file>
+
+<file path=ppt/slides/slide65.xml><?xml version="1.0" encoding="utf-8"?>
+<p:sld xmlns:a="http://schemas.openxmlformats.org/drawingml/2006/main" xmlns:r="http://schemas.openxmlformats.org/officeDocument/2006/relationships" xmlns:p="http://schemas.openxmlformats.org/presentationml/2006/main">
+  <p:cSld>
+    <p:bg>
+      <p:bgPr>
+        <a:solidFill>
+          <a:schemeClr val="bg1"/>
+        </a:solidFill>
+        <a:effectLst/>
+      </p:bgPr>
+    </p:bg>
+    <p:spTree>
+      <p:nvGrpSpPr>
+        <p:cNvPr id="1" name=""/>
+        <p:cNvGrpSpPr/>
+        <p:nvPr/>
+      </p:nvGrpSpPr>
+      <p:grpSpPr>
+        <a:xfrm>
+          <a:off x="0" y="0"/>
+          <a:ext cx="0" cy="0"/>
+          <a:chOff x="0" y="0"/>
+          <a:chExt cx="0" cy="0"/>
+        </a:xfrm>
+      </p:grpSpPr>
+      <p:sp useBgFill="1">
+        <p:nvSpPr>
+          <p:cNvPr id="26" name="!!BGRectangle">
+            <a:extLst>
+              <a:ext uri="{FF2B5EF4-FFF2-40B4-BE49-F238E27FC236}">
+                <a16:creationId xmlns:a16="http://schemas.microsoft.com/office/drawing/2014/main" id="{9CC67894-1D18-43E0-B8E1-ECF37EB0D4B5}"/>
+              </a:ext>
+              <a:ext uri="{C183D7F6-B498-43B3-948B-1728B52AA6E4}">
+                <adec:decorative xmlns:adec="http://schemas.microsoft.com/office/drawing/2017/decorative" xmlns="" val="1"/>
+              </a:ext>
+            </a:extLst>
+          </p:cNvPr>
+          <p:cNvSpPr>
+            <a:spLocks noGrp="1" noRot="1" noChangeAspect="1" noMove="1" noResize="1" noEditPoints="1" noAdjustHandles="1" noChangeArrowheads="1" noChangeShapeType="1" noTextEdit="1"/>
+          </p:cNvSpPr>
+          <p:nvPr>
+            <p:extLst>
+              <p:ext uri="{386F3935-93C4-4BCD-93E2-E3B085C9AB24}">
+                <p16:designElem xmlns:p16="http://schemas.microsoft.com/office/powerpoint/2015/main" val="1"/>
+              </p:ext>
+            </p:extLst>
+          </p:nvPr>
+        </p:nvSpPr>
+        <p:spPr>
+          <a:xfrm>
+            <a:off x="3048" y="-6182"/>
+            <a:ext cx="12188952" cy="6858000"/>
+          </a:xfrm>
+          <a:prstGeom prst="rect">
+            <a:avLst/>
+          </a:prstGeom>
+          <a:ln>
+            <a:noFill/>
+          </a:ln>
+        </p:spPr>
+        <p:style>
+          <a:lnRef idx="2">
+            <a:schemeClr val="accent1">
+              <a:shade val="50000"/>
+            </a:schemeClr>
+          </a:lnRef>
+          <a:fillRef idx="1">
+            <a:schemeClr val="accent1"/>
+          </a:fillRef>
+          <a:effectRef idx="0">
+            <a:schemeClr val="accent1"/>
+          </a:effectRef>
+          <a:fontRef idx="minor">
+            <a:schemeClr val="lt1"/>
+          </a:fontRef>
+        </p:style>
+        <p:txBody>
+          <a:bodyPr rtlCol="0" anchor="ctr"/>
+          <a:lstStyle/>
+          <a:p>
+            <a:pPr marL="0" marR="0" lvl="0" indent="0" algn="ctr" defTabSz="914400" rtl="0" eaLnBrk="1" fontAlgn="auto" latinLnBrk="0" hangingPunct="1">
+              <a:lnSpc>
+                <a:spcPct val="100000"/>
+              </a:lnSpc>
+              <a:spcBef>
+                <a:spcPts val="0"/>
+              </a:spcBef>
+              <a:spcAft>
+                <a:spcPts val="0"/>
+              </a:spcAft>
+              <a:buClrTx/>
+              <a:buSzTx/>
+              <a:buFontTx/>
+              <a:buNone/>
+              <a:tabLst/>
+              <a:defRPr/>
+            </a:pPr>
+            <a:endParaRPr kumimoji="0" lang="en-US" sz="1800" b="0" i="0" u="none" strike="noStrike" kern="1200" cap="none" spc="0" normalizeH="0" baseline="0" noProof="0">
+              <a:ln>
+                <a:noFill/>
+              </a:ln>
+              <a:solidFill>
+                <a:prstClr val="white"/>
+              </a:solidFill>
+              <a:effectLst/>
+              <a:uLnTx/>
+              <a:uFillTx/>
+              <a:latin typeface="Calibri" panose="020F0502020204030204"/>
+              <a:ea typeface="+mn-ea"/>
+              <a:cs typeface="+mn-cs"/>
+            </a:endParaRPr>
+          </a:p>
+        </p:txBody>
+      </p:sp>
+      <p:sp>
+        <p:nvSpPr>
+          <p:cNvPr id="28" name="Rectangle 27">
+            <a:extLst>
+              <a:ext uri="{FF2B5EF4-FFF2-40B4-BE49-F238E27FC236}">
+                <a16:creationId xmlns:a16="http://schemas.microsoft.com/office/drawing/2014/main" id="{A13E3398-4840-4DA1-B674-51AE569B24F9}"/>
+              </a:ext>
+              <a:ext uri="{C183D7F6-B498-43B3-948B-1728B52AA6E4}">
+                <adec:decorative xmlns:adec="http://schemas.microsoft.com/office/drawing/2017/decorative" xmlns="" val="1"/>
+              </a:ext>
+            </a:extLst>
+          </p:cNvPr>
+          <p:cNvSpPr>
+            <a:spLocks noGrp="1" noRot="1" noChangeAspect="1" noMove="1" noResize="1" noEditPoints="1" noAdjustHandles="1" noChangeArrowheads="1" noChangeShapeType="1" noTextEdit="1"/>
+          </p:cNvSpPr>
+          <p:nvPr>
+            <p:extLst>
+              <p:ext uri="{386F3935-93C4-4BCD-93E2-E3B085C9AB24}">
+                <p16:designElem xmlns:p16="http://schemas.microsoft.com/office/powerpoint/2015/main" val="1"/>
+              </p:ext>
+            </p:extLst>
+          </p:nvPr>
+        </p:nvSpPr>
+        <p:spPr>
+          <a:xfrm>
+            <a:off x="0" y="0"/>
+            <a:ext cx="12188952" cy="6858000"/>
+          </a:xfrm>
+          <a:prstGeom prst="rect">
+            <a:avLst/>
+          </a:prstGeom>
+          <a:solidFill>
+            <a:srgbClr val="000000"/>
+          </a:solidFill>
+          <a:ln>
+            <a:noFill/>
+          </a:ln>
+        </p:spPr>
+        <p:style>
+          <a:lnRef idx="2">
+            <a:schemeClr val="accent1">
+              <a:shade val="50000"/>
+            </a:schemeClr>
+          </a:lnRef>
+          <a:fillRef idx="1">
+            <a:schemeClr val="accent1"/>
+          </a:fillRef>
+          <a:effectRef idx="0">
+            <a:schemeClr val="accent1"/>
+          </a:effectRef>
+          <a:fontRef idx="minor">
+            <a:schemeClr val="lt1"/>
+          </a:fontRef>
+        </p:style>
+        <p:txBody>
+          <a:bodyPr rtlCol="0" anchor="ctr"/>
+          <a:lstStyle/>
+          <a:p>
+            <a:pPr marL="0" marR="0" lvl="0" indent="0" algn="ctr" defTabSz="914400" rtl="0" eaLnBrk="1" fontAlgn="auto" latinLnBrk="0" hangingPunct="1">
+              <a:lnSpc>
+                <a:spcPct val="100000"/>
+              </a:lnSpc>
+              <a:spcBef>
+                <a:spcPts val="0"/>
+              </a:spcBef>
+              <a:spcAft>
+                <a:spcPts val="0"/>
+              </a:spcAft>
+              <a:buClrTx/>
+              <a:buSzTx/>
+              <a:buFontTx/>
+              <a:buNone/>
+              <a:tabLst/>
+              <a:defRPr/>
+            </a:pPr>
+            <a:endParaRPr kumimoji="0" lang="en-US" sz="1800" b="0" i="0" u="none" strike="noStrike" kern="1200" cap="none" spc="0" normalizeH="0" baseline="0" noProof="0">
+              <a:ln>
+                <a:noFill/>
+              </a:ln>
+              <a:solidFill>
+                <a:prstClr val="white"/>
+              </a:solidFill>
+              <a:effectLst/>
+              <a:uLnTx/>
+              <a:uFillTx/>
+              <a:latin typeface="Calibri" panose="020F0502020204030204"/>
+              <a:ea typeface="+mn-ea"/>
+              <a:cs typeface="+mn-cs"/>
+            </a:endParaRPr>
+          </a:p>
+        </p:txBody>
+      </p:sp>
+      <p:pic>
+        <p:nvPicPr>
+          <p:cNvPr id="5" name="Picture 4" descr="Logo&#10;&#10;Description automatically generated">
+            <a:extLst>
+              <a:ext uri="{FF2B5EF4-FFF2-40B4-BE49-F238E27FC236}">
+                <a16:creationId xmlns:a16="http://schemas.microsoft.com/office/drawing/2014/main" id="{1485635D-4D96-E6AD-65A7-BBB6DBDB904F}"/>
+              </a:ext>
+            </a:extLst>
+          </p:cNvPr>
+          <p:cNvPicPr>
+            <a:picLocks noChangeAspect="1"/>
+          </p:cNvPicPr>
+          <p:nvPr/>
+        </p:nvPicPr>
+        <p:blipFill rotWithShape="1">
+          <a:blip r:embed="rId2">
+            <a:alphaModFix amt="50000"/>
+            <a:extLst>
+              <a:ext uri="{BEBA8EAE-BF5A-486C-A8C5-ECC9F3942E4B}">
+                <a14:imgProps xmlns:a14="http://schemas.microsoft.com/office/drawing/2010/main">
+                  <a14:imgLayer r:embed="rId3">
+                    <a14:imgEffect>
+                      <a14:sharpenSoften amount="-20000"/>
+                    </a14:imgEffect>
+                    <a14:imgEffect>
+                      <a14:brightnessContrast bright="-30000"/>
+                    </a14:imgEffect>
+                  </a14:imgLayer>
+                </a14:imgProps>
+              </a:ext>
+              <a:ext uri="{28A0092B-C50C-407E-A947-70E740481C1C}">
+                <a14:useLocalDpi xmlns:a14="http://schemas.microsoft.com/office/drawing/2010/main" val="0"/>
+              </a:ext>
+            </a:extLst>
+          </a:blip>
+          <a:srcRect t="17370" r="-2" b="26379"/>
+          <a:stretch/>
+        </p:blipFill>
+        <p:spPr>
+          <a:xfrm>
+            <a:off x="-3028" y="6182"/>
+            <a:ext cx="12191980" cy="6857999"/>
+          </a:xfrm>
+          <a:prstGeom prst="rect">
+            <a:avLst/>
+          </a:prstGeom>
+        </p:spPr>
+      </p:pic>
+      <p:sp>
+        <p:nvSpPr>
+          <p:cNvPr id="2" name="Title 1">
+            <a:extLst>
+              <a:ext uri="{FF2B5EF4-FFF2-40B4-BE49-F238E27FC236}">
+                <a16:creationId xmlns:a16="http://schemas.microsoft.com/office/drawing/2014/main" id="{57542169-E59A-481B-15D1-67FB940F43E9}"/>
+              </a:ext>
+            </a:extLst>
+          </p:cNvPr>
+          <p:cNvSpPr>
+            <a:spLocks noGrp="1"/>
+          </p:cNvSpPr>
+          <p:nvPr>
+            <p:ph type="title"/>
+          </p:nvPr>
+        </p:nvSpPr>
+        <p:spPr>
+          <a:xfrm>
+            <a:off x="943276" y="712268"/>
+            <a:ext cx="10410524" cy="1193533"/>
+          </a:xfrm>
+        </p:spPr>
+        <p:txBody>
+          <a:bodyPr>
+            <a:normAutofit/>
+          </a:bodyPr>
+          <a:lstStyle/>
+          <a:p>
+            <a:r>
+              <a:rPr lang="pt-BR" sz="6500" b="1" dirty="0">
+                <a:solidFill>
+                  <a:srgbClr val="FFFFFF"/>
+                </a:solidFill>
+              </a:rPr>
+              <a:t>CONCLUSÃO</a:t>
+            </a:r>
+            <a:endParaRPr lang="en-US" sz="6500" b="1" dirty="0">
+              <a:solidFill>
+                <a:srgbClr val="FFFFFF"/>
+              </a:solidFill>
+            </a:endParaRPr>
+          </a:p>
+        </p:txBody>
+      </p:sp>
+      <p:sp>
+        <p:nvSpPr>
+          <p:cNvPr id="30" name="!!Line">
+            <a:extLst>
+              <a:ext uri="{FF2B5EF4-FFF2-40B4-BE49-F238E27FC236}">
+                <a16:creationId xmlns:a16="http://schemas.microsoft.com/office/drawing/2014/main" id="{83306AB0-8BF5-43D5-B5E2-C53EA0783845}"/>
+              </a:ext>
+              <a:ext uri="{C183D7F6-B498-43B3-948B-1728B52AA6E4}">
+                <adec:decorative xmlns:adec="http://schemas.microsoft.com/office/drawing/2017/decorative" xmlns="" val="1"/>
+              </a:ext>
+            </a:extLst>
+          </p:cNvPr>
+          <p:cNvSpPr>
+            <a:spLocks noGrp="1" noRot="1" noChangeAspect="1" noMove="1" noResize="1" noEditPoints="1" noAdjustHandles="1" noChangeArrowheads="1" noChangeShapeType="1" noTextEdit="1"/>
+          </p:cNvSpPr>
+          <p:nvPr>
+            <p:extLst>
+              <p:ext uri="{386F3935-93C4-4BCD-93E2-E3B085C9AB24}">
+                <p16:designElem xmlns:p16="http://schemas.microsoft.com/office/powerpoint/2015/main" val="1"/>
+              </p:ext>
+            </p:extLst>
+          </p:nvPr>
+        </p:nvSpPr>
+        <p:spPr>
+          <a:xfrm>
+            <a:off x="762000" y="826324"/>
+            <a:ext cx="27432" cy="914400"/>
+          </a:xfrm>
+          <a:prstGeom prst="rect">
+            <a:avLst/>
+          </a:prstGeom>
+          <a:solidFill>
+            <a:srgbClr val="FFFFFF"/>
+          </a:solidFill>
+          <a:ln>
+            <a:noFill/>
+          </a:ln>
+        </p:spPr>
+        <p:style>
+          <a:lnRef idx="2">
+            <a:schemeClr val="accent1">
+              <a:shade val="50000"/>
+            </a:schemeClr>
+          </a:lnRef>
+          <a:fillRef idx="1">
+            <a:schemeClr val="accent1"/>
+          </a:fillRef>
+          <a:effectRef idx="0">
+            <a:schemeClr val="accent1"/>
+          </a:effectRef>
+          <a:fontRef idx="minor">
+            <a:schemeClr val="lt1"/>
+          </a:fontRef>
+        </p:style>
+        <p:txBody>
+          <a:bodyPr rtlCol="0" anchor="ctr"/>
+          <a:lstStyle/>
+          <a:p>
+            <a:pPr marL="0" marR="0" lvl="0" indent="0" algn="ctr" defTabSz="914400" rtl="0" eaLnBrk="1" fontAlgn="auto" latinLnBrk="0" hangingPunct="1">
+              <a:lnSpc>
+                <a:spcPct val="100000"/>
+              </a:lnSpc>
+              <a:spcBef>
+                <a:spcPts val="0"/>
+              </a:spcBef>
+              <a:spcAft>
+                <a:spcPts val="0"/>
+              </a:spcAft>
+              <a:buClrTx/>
+              <a:buSzTx/>
+              <a:buFontTx/>
+              <a:buNone/>
+              <a:tabLst/>
+              <a:defRPr/>
+            </a:pPr>
+            <a:endParaRPr kumimoji="0" lang="en-US" sz="1800" b="0" i="0" u="none" strike="noStrike" kern="1200" cap="none" spc="0" normalizeH="0" baseline="0" noProof="0">
+              <a:ln>
+                <a:noFill/>
+              </a:ln>
+              <a:solidFill>
+                <a:prstClr val="white"/>
+              </a:solidFill>
+              <a:effectLst/>
+              <a:uLnTx/>
+              <a:uFillTx/>
+              <a:latin typeface="Calibri" panose="020F0502020204030204"/>
+              <a:ea typeface="+mn-ea"/>
+              <a:cs typeface="+mn-cs"/>
+            </a:endParaRPr>
+          </a:p>
+        </p:txBody>
+      </p:sp>
+      <p:sp>
+        <p:nvSpPr>
+          <p:cNvPr id="3" name="Content Placeholder 2">
+            <a:extLst>
+              <a:ext uri="{FF2B5EF4-FFF2-40B4-BE49-F238E27FC236}">
+                <a16:creationId xmlns:a16="http://schemas.microsoft.com/office/drawing/2014/main" id="{83FCD086-7677-FA17-701D-63D5D7664A00}"/>
+              </a:ext>
+            </a:extLst>
+          </p:cNvPr>
+          <p:cNvSpPr>
+            <a:spLocks noGrp="1"/>
+          </p:cNvSpPr>
+          <p:nvPr>
+            <p:ph idx="1"/>
+          </p:nvPr>
+        </p:nvSpPr>
+        <p:spPr>
+          <a:xfrm>
+            <a:off x="943276" y="2236995"/>
+            <a:ext cx="10410524" cy="4126782"/>
+          </a:xfrm>
+        </p:spPr>
+        <p:txBody>
+          <a:bodyPr anchor="ctr">
+            <a:normAutofit/>
+          </a:bodyPr>
+          <a:lstStyle/>
+          <a:p>
+            <a:r>
+              <a:rPr lang="pt-BR" sz="5000" dirty="0">
+                <a:solidFill>
+                  <a:srgbClr val="FFFFFF"/>
+                </a:solidFill>
+              </a:rPr>
+              <a:t>União da equipe</a:t>
+            </a:r>
+          </a:p>
+          <a:p>
+            <a:r>
+              <a:rPr lang="pt-BR" sz="5000" dirty="0">
+                <a:solidFill>
+                  <a:srgbClr val="FFFFFF"/>
+                </a:solidFill>
+              </a:rPr>
+              <a:t>Organização de tempo</a:t>
+            </a:r>
+          </a:p>
+          <a:p>
+            <a:r>
+              <a:rPr lang="pt-BR" sz="5000" dirty="0">
+                <a:solidFill>
+                  <a:srgbClr val="FFFFFF"/>
+                </a:solidFill>
+              </a:rPr>
+              <a:t>Conhecimento adquirido</a:t>
+            </a:r>
+          </a:p>
+        </p:txBody>
+      </p:sp>
+    </p:spTree>
+    <p:extLst>
+      <p:ext uri="{BB962C8B-B14F-4D97-AF65-F5344CB8AC3E}">
+        <p14:creationId xmlns:p14="http://schemas.microsoft.com/office/powerpoint/2010/main" val="2155276036"/>
+      </p:ext>
+    </p:extLst>
+  </p:cSld>
+  <p:clrMapOvr>
+    <a:masterClrMapping/>
+  </p:clrMapOvr>
+</p:sld>
+</file>
+
+<file path=ppt/slides/slide66.xml><?xml version="1.0" encoding="utf-8"?>
+<p:sld xmlns:a="http://schemas.openxmlformats.org/drawingml/2006/main" xmlns:r="http://schemas.openxmlformats.org/officeDocument/2006/relationships" xmlns:p="http://schemas.openxmlformats.org/presentationml/2006/main">
+  <p:cSld>
+    <p:bg>
+      <p:bgPr>
+        <a:solidFill>
+          <a:schemeClr val="bg1"/>
+        </a:solidFill>
+        <a:effectLst/>
+      </p:bgPr>
+    </p:bg>
+    <p:spTree>
+      <p:nvGrpSpPr>
+        <p:cNvPr id="1" name=""/>
+        <p:cNvGrpSpPr/>
+        <p:nvPr/>
+      </p:nvGrpSpPr>
+      <p:grpSpPr>
+        <a:xfrm>
+          <a:off x="0" y="0"/>
+          <a:ext cx="0" cy="0"/>
+          <a:chOff x="0" y="0"/>
+          <a:chExt cx="0" cy="0"/>
+        </a:xfrm>
+      </p:grpSpPr>
+      <p:sp useBgFill="1">
+        <p:nvSpPr>
+          <p:cNvPr id="26" name="!!BGRectangle">
+            <a:extLst>
+              <a:ext uri="{FF2B5EF4-FFF2-40B4-BE49-F238E27FC236}">
+                <a16:creationId xmlns:a16="http://schemas.microsoft.com/office/drawing/2014/main" id="{9CC67894-1D18-43E0-B8E1-ECF37EB0D4B5}"/>
+              </a:ext>
+              <a:ext uri="{C183D7F6-B498-43B3-948B-1728B52AA6E4}">
+                <adec:decorative xmlns:adec="http://schemas.microsoft.com/office/drawing/2017/decorative" xmlns="" val="1"/>
+              </a:ext>
+            </a:extLst>
+          </p:cNvPr>
+          <p:cNvSpPr>
+            <a:spLocks noGrp="1" noRot="1" noChangeAspect="1" noMove="1" noResize="1" noEditPoints="1" noAdjustHandles="1" noChangeArrowheads="1" noChangeShapeType="1" noTextEdit="1"/>
+          </p:cNvSpPr>
+          <p:nvPr>
+            <p:extLst>
+              <p:ext uri="{386F3935-93C4-4BCD-93E2-E3B085C9AB24}">
+                <p16:designElem xmlns:p16="http://schemas.microsoft.com/office/powerpoint/2015/main" val="1"/>
+              </p:ext>
+            </p:extLst>
+          </p:nvPr>
+        </p:nvSpPr>
+        <p:spPr>
+          <a:xfrm>
+            <a:off x="3048" y="-6182"/>
+            <a:ext cx="12188952" cy="6858000"/>
+          </a:xfrm>
+          <a:prstGeom prst="rect">
+            <a:avLst/>
+          </a:prstGeom>
+          <a:ln>
+            <a:noFill/>
+          </a:ln>
+        </p:spPr>
+        <p:style>
+          <a:lnRef idx="2">
+            <a:schemeClr val="accent1">
+              <a:shade val="50000"/>
+            </a:schemeClr>
+          </a:lnRef>
+          <a:fillRef idx="1">
+            <a:schemeClr val="accent1"/>
+          </a:fillRef>
+          <a:effectRef idx="0">
+            <a:schemeClr val="accent1"/>
+          </a:effectRef>
+          <a:fontRef idx="minor">
+            <a:schemeClr val="lt1"/>
+          </a:fontRef>
+        </p:style>
+        <p:txBody>
+          <a:bodyPr rtlCol="0" anchor="ctr"/>
+          <a:lstStyle/>
+          <a:p>
+            <a:pPr marL="0" marR="0" lvl="0" indent="0" algn="ctr" defTabSz="914400" rtl="0" eaLnBrk="1" fontAlgn="auto" latinLnBrk="0" hangingPunct="1">
+              <a:lnSpc>
+                <a:spcPct val="100000"/>
+              </a:lnSpc>
+              <a:spcBef>
+                <a:spcPts val="0"/>
+              </a:spcBef>
+              <a:spcAft>
+                <a:spcPts val="0"/>
+              </a:spcAft>
+              <a:buClrTx/>
+              <a:buSzTx/>
+              <a:buFontTx/>
+              <a:buNone/>
+              <a:tabLst/>
+              <a:defRPr/>
+            </a:pPr>
+            <a:endParaRPr kumimoji="0" lang="en-US" sz="1800" b="0" i="0" u="none" strike="noStrike" kern="1200" cap="none" spc="0" normalizeH="0" baseline="0" noProof="0">
+              <a:ln>
+                <a:noFill/>
+              </a:ln>
+              <a:solidFill>
+                <a:prstClr val="white"/>
+              </a:solidFill>
+              <a:effectLst/>
+              <a:uLnTx/>
+              <a:uFillTx/>
+              <a:latin typeface="Calibri" panose="020F0502020204030204"/>
+              <a:ea typeface="+mn-ea"/>
+              <a:cs typeface="+mn-cs"/>
+            </a:endParaRPr>
+          </a:p>
+        </p:txBody>
+      </p:sp>
+      <p:sp>
+        <p:nvSpPr>
+          <p:cNvPr id="28" name="Rectangle 27">
+            <a:extLst>
+              <a:ext uri="{FF2B5EF4-FFF2-40B4-BE49-F238E27FC236}">
+                <a16:creationId xmlns:a16="http://schemas.microsoft.com/office/drawing/2014/main" id="{A13E3398-4840-4DA1-B674-51AE569B24F9}"/>
+              </a:ext>
+              <a:ext uri="{C183D7F6-B498-43B3-948B-1728B52AA6E4}">
+                <adec:decorative xmlns:adec="http://schemas.microsoft.com/office/drawing/2017/decorative" xmlns="" val="1"/>
+              </a:ext>
+            </a:extLst>
+          </p:cNvPr>
+          <p:cNvSpPr>
+            <a:spLocks noGrp="1" noRot="1" noChangeAspect="1" noMove="1" noResize="1" noEditPoints="1" noAdjustHandles="1" noChangeArrowheads="1" noChangeShapeType="1" noTextEdit="1"/>
+          </p:cNvSpPr>
+          <p:nvPr>
+            <p:extLst>
+              <p:ext uri="{386F3935-93C4-4BCD-93E2-E3B085C9AB24}">
+                <p16:designElem xmlns:p16="http://schemas.microsoft.com/office/powerpoint/2015/main" val="1"/>
+              </p:ext>
+            </p:extLst>
+          </p:nvPr>
+        </p:nvSpPr>
+        <p:spPr>
+          <a:xfrm>
+            <a:off x="0" y="0"/>
+            <a:ext cx="12188952" cy="6858000"/>
+          </a:xfrm>
+          <a:prstGeom prst="rect">
+            <a:avLst/>
+          </a:prstGeom>
+          <a:solidFill>
+            <a:srgbClr val="000000"/>
+          </a:solidFill>
+          <a:ln>
+            <a:noFill/>
+          </a:ln>
+        </p:spPr>
+        <p:style>
+          <a:lnRef idx="2">
+            <a:schemeClr val="accent1">
+              <a:shade val="50000"/>
+            </a:schemeClr>
+          </a:lnRef>
+          <a:fillRef idx="1">
+            <a:schemeClr val="accent1"/>
+          </a:fillRef>
+          <a:effectRef idx="0">
+            <a:schemeClr val="accent1"/>
+          </a:effectRef>
+          <a:fontRef idx="minor">
+            <a:schemeClr val="lt1"/>
+          </a:fontRef>
+        </p:style>
+        <p:txBody>
+          <a:bodyPr rtlCol="0" anchor="ctr"/>
+          <a:lstStyle/>
+          <a:p>
+            <a:pPr marL="0" marR="0" lvl="0" indent="0" algn="ctr" defTabSz="914400" rtl="0" eaLnBrk="1" fontAlgn="auto" latinLnBrk="0" hangingPunct="1">
+              <a:lnSpc>
+                <a:spcPct val="100000"/>
+              </a:lnSpc>
+              <a:spcBef>
+                <a:spcPts val="0"/>
+              </a:spcBef>
+              <a:spcAft>
+                <a:spcPts val="0"/>
+              </a:spcAft>
+              <a:buClrTx/>
+              <a:buSzTx/>
+              <a:buFontTx/>
+              <a:buNone/>
+              <a:tabLst/>
+              <a:defRPr/>
+            </a:pPr>
+            <a:endParaRPr kumimoji="0" lang="en-US" sz="1800" b="0" i="0" u="none" strike="noStrike" kern="1200" cap="none" spc="0" normalizeH="0" baseline="0" noProof="0">
+              <a:ln>
+                <a:noFill/>
+              </a:ln>
+              <a:solidFill>
+                <a:prstClr val="white"/>
+              </a:solidFill>
+              <a:effectLst/>
+              <a:uLnTx/>
+              <a:uFillTx/>
+              <a:latin typeface="Calibri" panose="020F0502020204030204"/>
+              <a:ea typeface="+mn-ea"/>
+              <a:cs typeface="+mn-cs"/>
+            </a:endParaRPr>
+          </a:p>
+        </p:txBody>
+      </p:sp>
+      <p:pic>
+        <p:nvPicPr>
+          <p:cNvPr id="5" name="Picture 4" descr="Logo&#10;&#10;Description automatically generated">
+            <a:extLst>
+              <a:ext uri="{FF2B5EF4-FFF2-40B4-BE49-F238E27FC236}">
+                <a16:creationId xmlns:a16="http://schemas.microsoft.com/office/drawing/2014/main" id="{1485635D-4D96-E6AD-65A7-BBB6DBDB904F}"/>
+              </a:ext>
+            </a:extLst>
+          </p:cNvPr>
+          <p:cNvPicPr>
+            <a:picLocks noChangeAspect="1"/>
+          </p:cNvPicPr>
+          <p:nvPr/>
+        </p:nvPicPr>
+        <p:blipFill rotWithShape="1">
+          <a:blip r:embed="rId2">
+            <a:alphaModFix amt="50000"/>
+            <a:extLst>
+              <a:ext uri="{BEBA8EAE-BF5A-486C-A8C5-ECC9F3942E4B}">
+                <a14:imgProps xmlns:a14="http://schemas.microsoft.com/office/drawing/2010/main">
+                  <a14:imgLayer r:embed="rId3">
+                    <a14:imgEffect>
+                      <a14:sharpenSoften amount="-20000"/>
+                    </a14:imgEffect>
+                    <a14:imgEffect>
+                      <a14:brightnessContrast bright="-30000"/>
+                    </a14:imgEffect>
+                  </a14:imgLayer>
+                </a14:imgProps>
+              </a:ext>
+              <a:ext uri="{28A0092B-C50C-407E-A947-70E740481C1C}">
+                <a14:useLocalDpi xmlns:a14="http://schemas.microsoft.com/office/drawing/2010/main" val="0"/>
+              </a:ext>
+            </a:extLst>
+          </a:blip>
+          <a:srcRect t="17370" r="-2" b="26379"/>
+          <a:stretch/>
+        </p:blipFill>
+        <p:spPr>
+          <a:xfrm>
+            <a:off x="-3048" y="1"/>
+            <a:ext cx="12191980" cy="6857999"/>
+          </a:xfrm>
+          <a:prstGeom prst="rect">
+            <a:avLst/>
+          </a:prstGeom>
+        </p:spPr>
+      </p:pic>
+      <p:sp>
+        <p:nvSpPr>
+          <p:cNvPr id="2" name="Title 1">
+            <a:extLst>
+              <a:ext uri="{FF2B5EF4-FFF2-40B4-BE49-F238E27FC236}">
+                <a16:creationId xmlns:a16="http://schemas.microsoft.com/office/drawing/2014/main" id="{57542169-E59A-481B-15D1-67FB940F43E9}"/>
+              </a:ext>
+            </a:extLst>
+          </p:cNvPr>
+          <p:cNvSpPr>
+            <a:spLocks noGrp="1"/>
+          </p:cNvSpPr>
+          <p:nvPr>
+            <p:ph type="title"/>
+          </p:nvPr>
+        </p:nvSpPr>
+        <p:spPr>
+          <a:xfrm>
+            <a:off x="943276" y="712268"/>
+            <a:ext cx="10410524" cy="1193533"/>
+          </a:xfrm>
+        </p:spPr>
+        <p:txBody>
+          <a:bodyPr>
+            <a:normAutofit/>
+          </a:bodyPr>
+          <a:lstStyle/>
+          <a:p>
+            <a:r>
+              <a:rPr lang="pt-BR" sz="6500" b="1" dirty="0">
+                <a:solidFill>
+                  <a:srgbClr val="FFFFFF"/>
+                </a:solidFill>
+              </a:rPr>
+              <a:t>REFERÊNCIAS</a:t>
+            </a:r>
+            <a:endParaRPr lang="en-US" sz="6500" b="1" dirty="0">
+              <a:solidFill>
+                <a:srgbClr val="FFFFFF"/>
+              </a:solidFill>
+            </a:endParaRPr>
+          </a:p>
+        </p:txBody>
+      </p:sp>
+      <p:sp>
+        <p:nvSpPr>
+          <p:cNvPr id="30" name="!!Line">
+            <a:extLst>
+              <a:ext uri="{FF2B5EF4-FFF2-40B4-BE49-F238E27FC236}">
+                <a16:creationId xmlns:a16="http://schemas.microsoft.com/office/drawing/2014/main" id="{83306AB0-8BF5-43D5-B5E2-C53EA0783845}"/>
+              </a:ext>
+              <a:ext uri="{C183D7F6-B498-43B3-948B-1728B52AA6E4}">
+                <adec:decorative xmlns:adec="http://schemas.microsoft.com/office/drawing/2017/decorative" xmlns="" val="1"/>
               </a:ext>
             </a:extLst>
           </p:cNvPr>
@@ -26560,7 +27265,7 @@
                 <a16:creationId xmlns:a16="http://schemas.microsoft.com/office/drawing/2014/main" id="{42A4FC2C-047E-45A5-965D-8E1E3BF09BC6}"/>
               </a:ext>
               <a:ext uri="{C183D7F6-B498-43B3-948B-1728B52AA6E4}">
-                <adec:decorative xmlns:adec="http://schemas.microsoft.com/office/drawing/2017/decorative" val="1"/>
+                <adec:decorative xmlns:adec="http://schemas.microsoft.com/office/drawing/2017/decorative" xmlns="" val="1"/>
               </a:ext>
             </a:extLst>
           </p:cNvPr>
@@ -26782,7 +27487,7 @@
                 <a16:creationId xmlns:a16="http://schemas.microsoft.com/office/drawing/2014/main" id="{9CC67894-1D18-43E0-B8E1-ECF37EB0D4B5}"/>
               </a:ext>
               <a:ext uri="{C183D7F6-B498-43B3-948B-1728B52AA6E4}">
-                <adec:decorative xmlns:adec="http://schemas.microsoft.com/office/drawing/2017/decorative" val="1"/>
+                <adec:decorative xmlns:adec="http://schemas.microsoft.com/office/drawing/2017/decorative" xmlns="" val="1"/>
               </a:ext>
             </a:extLst>
           </p:cNvPr>
@@ -26871,7 +27576,7 @@
                 <a16:creationId xmlns:a16="http://schemas.microsoft.com/office/drawing/2014/main" id="{A13E3398-4840-4DA1-B674-51AE569B24F9}"/>
               </a:ext>
               <a:ext uri="{C183D7F6-B498-43B3-948B-1728B52AA6E4}">
-                <adec:decorative xmlns:adec="http://schemas.microsoft.com/office/drawing/2017/decorative" val="1"/>
+                <adec:decorative xmlns:adec="http://schemas.microsoft.com/office/drawing/2017/decorative" xmlns="" val="1"/>
               </a:ext>
             </a:extLst>
           </p:cNvPr>
@@ -27055,7 +27760,7 @@
                 <a16:creationId xmlns:a16="http://schemas.microsoft.com/office/drawing/2014/main" id="{83306AB0-8BF5-43D5-B5E2-C53EA0783845}"/>
               </a:ext>
               <a:ext uri="{C183D7F6-B498-43B3-948B-1728B52AA6E4}">
-                <adec:decorative xmlns:adec="http://schemas.microsoft.com/office/drawing/2017/decorative" val="1"/>
+                <adec:decorative xmlns:adec="http://schemas.microsoft.com/office/drawing/2017/decorative" xmlns="" val="1"/>
               </a:ext>
             </a:extLst>
           </p:cNvPr>
@@ -27232,7 +27937,7 @@
                 <a16:creationId xmlns:a16="http://schemas.microsoft.com/office/drawing/2014/main" id="{9CC67894-1D18-43E0-B8E1-ECF37EB0D4B5}"/>
               </a:ext>
               <a:ext uri="{C183D7F6-B498-43B3-948B-1728B52AA6E4}">
-                <adec:decorative xmlns:adec="http://schemas.microsoft.com/office/drawing/2017/decorative" val="1"/>
+                <adec:decorative xmlns:adec="http://schemas.microsoft.com/office/drawing/2017/decorative" xmlns="" val="1"/>
               </a:ext>
             </a:extLst>
           </p:cNvPr>
@@ -27321,7 +28026,7 @@
                 <a16:creationId xmlns:a16="http://schemas.microsoft.com/office/drawing/2014/main" id="{A13E3398-4840-4DA1-B674-51AE569B24F9}"/>
               </a:ext>
               <a:ext uri="{C183D7F6-B498-43B3-948B-1728B52AA6E4}">
-                <adec:decorative xmlns:adec="http://schemas.microsoft.com/office/drawing/2017/decorative" val="1"/>
+                <adec:decorative xmlns:adec="http://schemas.microsoft.com/office/drawing/2017/decorative" xmlns="" val="1"/>
               </a:ext>
             </a:extLst>
           </p:cNvPr>
@@ -27505,7 +28210,7 @@
                 <a16:creationId xmlns:a16="http://schemas.microsoft.com/office/drawing/2014/main" id="{83306AB0-8BF5-43D5-B5E2-C53EA0783845}"/>
               </a:ext>
               <a:ext uri="{C183D7F6-B498-43B3-948B-1728B52AA6E4}">
-                <adec:decorative xmlns:adec="http://schemas.microsoft.com/office/drawing/2017/decorative" val="1"/>
+                <adec:decorative xmlns:adec="http://schemas.microsoft.com/office/drawing/2017/decorative" xmlns="" val="1"/>
               </a:ext>
             </a:extLst>
           </p:cNvPr>

</xml_diff>